<commit_message>
Check Out some About Changes
</commit_message>
<xml_diff>
--- a/documents/projectmanagement/Praesentationen/Vorstellung_Zwischenpräsentation.pptx
+++ b/documents/projectmanagement/Praesentationen/Vorstellung_Zwischenpräsentation.pptx
@@ -5,7 +5,7 @@
     <p:sldMasterId id="2147483648" r:id="rId1"/>
   </p:sldMasterIdLst>
   <p:notesMasterIdLst>
-    <p:notesMasterId r:id="rId20"/>
+    <p:notesMasterId r:id="rId21"/>
   </p:notesMasterIdLst>
   <p:sldIdLst>
     <p:sldId id="256" r:id="rId2"/>
@@ -20,12 +20,13 @@
     <p:sldId id="294" r:id="rId11"/>
     <p:sldId id="295" r:id="rId12"/>
     <p:sldId id="296" r:id="rId13"/>
-    <p:sldId id="297" r:id="rId14"/>
-    <p:sldId id="298" r:id="rId15"/>
-    <p:sldId id="299" r:id="rId16"/>
-    <p:sldId id="283" r:id="rId17"/>
-    <p:sldId id="300" r:id="rId18"/>
-    <p:sldId id="301" r:id="rId19"/>
+    <p:sldId id="302" r:id="rId14"/>
+    <p:sldId id="297" r:id="rId15"/>
+    <p:sldId id="298" r:id="rId16"/>
+    <p:sldId id="299" r:id="rId17"/>
+    <p:sldId id="283" r:id="rId18"/>
+    <p:sldId id="300" r:id="rId19"/>
+    <p:sldId id="301" r:id="rId20"/>
   </p:sldIdLst>
   <p:sldSz cx="12192000" cy="6858000"/>
   <p:notesSz cx="6858000" cy="9144000"/>
@@ -8580,9 +8581,9 @@
     <dgm:cxn modelId="{02F477C1-D60F-4785-A437-2CC54409BEA4}" type="presOf" srcId="{8FB384A4-B9BF-4EC5-9C1C-B6BFEC622841}" destId="{5754D3EB-A4B5-4F8E-ACEE-5BE5839A8702}" srcOrd="1" destOrd="0" presId="urn:microsoft.com/office/officeart/2008/layout/NameandTitleOrganizationalChart"/>
     <dgm:cxn modelId="{0DF191E3-0653-4A09-965A-D076207850B4}" type="presOf" srcId="{E0B6B7C9-BBF0-4CCC-9CE6-EC53B3B5C75F}" destId="{A6E6D66C-F143-430D-BA5B-A7922A31C720}" srcOrd="0" destOrd="0" presId="urn:microsoft.com/office/officeart/2008/layout/NameandTitleOrganizationalChart"/>
     <dgm:cxn modelId="{1A027195-67EF-4296-93A0-E1BD3D89F91C}" srcId="{0F09778F-BBEF-40B3-B985-E6DBF854759D}" destId="{C5A982D7-B10A-48DB-A994-070FFA042A59}" srcOrd="2" destOrd="0" parTransId="{F6A2B9C7-7C7F-49A7-92DD-083ED8C3EEFA}" sibTransId="{BA77D3F0-5563-4943-BA88-E9E7997856FC}"/>
+    <dgm:cxn modelId="{F18AFCB7-5CCD-4E95-A240-857F8F1DCBD5}" type="presOf" srcId="{8FB384A4-B9BF-4EC5-9C1C-B6BFEC622841}" destId="{56C552A1-1526-468F-8DFA-EDCC362BCBF9}" srcOrd="0" destOrd="0" presId="urn:microsoft.com/office/officeart/2008/layout/NameandTitleOrganizationalChart"/>
+    <dgm:cxn modelId="{00598E0A-1055-46AE-A5BD-EA15BF9020F1}" type="presOf" srcId="{E2D8F2D1-985F-4FB0-9117-FA61BCC43327}" destId="{99C91090-6E27-4464-89C0-997C0F06F599}" srcOrd="0" destOrd="0" presId="urn:microsoft.com/office/officeart/2008/layout/NameandTitleOrganizationalChart"/>
     <dgm:cxn modelId="{4C701DFA-971B-4F33-AA75-AF0C1BE2FDA7}" type="presOf" srcId="{B0509BC5-6DC1-4E56-AB9A-621AFC941C95}" destId="{C11E0B58-073B-4A2B-BBC5-C01BFBEA3428}" srcOrd="0" destOrd="0" presId="urn:microsoft.com/office/officeart/2008/layout/NameandTitleOrganizationalChart"/>
-    <dgm:cxn modelId="{00598E0A-1055-46AE-A5BD-EA15BF9020F1}" type="presOf" srcId="{E2D8F2D1-985F-4FB0-9117-FA61BCC43327}" destId="{99C91090-6E27-4464-89C0-997C0F06F599}" srcOrd="0" destOrd="0" presId="urn:microsoft.com/office/officeart/2008/layout/NameandTitleOrganizationalChart"/>
-    <dgm:cxn modelId="{F18AFCB7-5CCD-4E95-A240-857F8F1DCBD5}" type="presOf" srcId="{8FB384A4-B9BF-4EC5-9C1C-B6BFEC622841}" destId="{56C552A1-1526-468F-8DFA-EDCC362BCBF9}" srcOrd="0" destOrd="0" presId="urn:microsoft.com/office/officeart/2008/layout/NameandTitleOrganizationalChart"/>
     <dgm:cxn modelId="{F1E4E460-0AB9-49A3-8644-7E40A08FD112}" type="presOf" srcId="{625FC5B7-CB32-4AC2-B0C9-9F2291C899B4}" destId="{AA108A4A-CB1F-4119-ACA6-B636185CFB0E}" srcOrd="0" destOrd="0" presId="urn:microsoft.com/office/officeart/2008/layout/NameandTitleOrganizationalChart"/>
     <dgm:cxn modelId="{256DC1A2-6B92-42D2-A9C4-10FE4808A5EB}" type="presParOf" srcId="{2FB1EF04-A957-411E-8A9B-C0CA7FA67425}" destId="{BB20D88C-7D7D-4EF2-AF1B-221070122E98}" srcOrd="0" destOrd="0" presId="urn:microsoft.com/office/officeart/2008/layout/NameandTitleOrganizationalChart"/>
     <dgm:cxn modelId="{2C268A4D-893A-4684-B048-B7C02CD88CD6}" type="presParOf" srcId="{BB20D88C-7D7D-4EF2-AF1B-221070122E98}" destId="{F3EE9C39-9A08-4F36-B2D4-F4E056031828}" srcOrd="0" destOrd="0" presId="urn:microsoft.com/office/officeart/2008/layout/NameandTitleOrganizationalChart"/>
@@ -9206,21 +9207,21 @@
     </dgm:pt>
   </dgm:ptLst>
   <dgm:cxnLst>
+    <dgm:cxn modelId="{44C56E3F-36B0-4030-AA3C-D88BC78AF595}" type="presOf" srcId="{86DB323A-73DC-4D24-A083-62E001995050}" destId="{35C2A99A-00D9-4873-BF91-57CC5CDD6420}" srcOrd="0" destOrd="0" presId="urn:microsoft.com/office/officeart/2005/8/layout/radial4"/>
+    <dgm:cxn modelId="{8EEFC20C-60BA-4D7F-9C94-258E82EA25BE}" type="presOf" srcId="{408FBC27-3C08-474B-96FC-24A7BAF44899}" destId="{068D7405-A6C9-45DD-A710-1DEB6B3AB9DA}" srcOrd="0" destOrd="0" presId="urn:microsoft.com/office/officeart/2005/8/layout/radial4"/>
+    <dgm:cxn modelId="{A9954CE5-562C-4280-9B91-0CEFCF670A2B}" type="presOf" srcId="{12C43100-EEF3-4FE1-AF2F-1BFF73DD3DB9}" destId="{FB4358FC-C359-4CA7-8DC8-E68F921B6C35}" srcOrd="0" destOrd="0" presId="urn:microsoft.com/office/officeart/2005/8/layout/radial4"/>
+    <dgm:cxn modelId="{8D1EF1AB-79A4-478B-B770-55D66312AEAE}" srcId="{85D3EFA7-8BDB-4A5A-882A-EDBF94BF3494}" destId="{86DB323A-73DC-4D24-A083-62E001995050}" srcOrd="0" destOrd="0" parTransId="{1598B80F-D235-4DD7-8B2C-88306356BAA1}" sibTransId="{194954D0-B6E5-4F2C-81EB-002B2BB93D55}"/>
+    <dgm:cxn modelId="{4CE2F67E-3E30-4454-B48D-03235F5DAEF8}" type="presOf" srcId="{B7247DFC-D355-448B-9214-6AA0E881009C}" destId="{3E011A6B-79B3-4D46-95F0-A0F03807531F}" srcOrd="0" destOrd="0" presId="urn:microsoft.com/office/officeart/2005/8/layout/radial4"/>
+    <dgm:cxn modelId="{850F2AF4-9E0C-4B6D-BEC2-EBFCB38F10C1}" type="presOf" srcId="{3142E19D-54ED-4D5F-B1C8-751D212DB0FB}" destId="{C893210D-4879-4DD5-B088-5D8E5992D57B}" srcOrd="0" destOrd="0" presId="urn:microsoft.com/office/officeart/2005/8/layout/radial4"/>
+    <dgm:cxn modelId="{AB5F8FDB-9F37-41C2-83A5-57BDA5977CF2}" type="presOf" srcId="{7AAA3B19-FAC3-4C62-9309-B2DD2BE4A6BC}" destId="{E44501EB-77DB-44A8-9500-C483F073DCB5}" srcOrd="0" destOrd="0" presId="urn:microsoft.com/office/officeart/2005/8/layout/radial4"/>
+    <dgm:cxn modelId="{DBEB4342-59D7-4AFB-92E3-AE5121EE78D4}" type="presOf" srcId="{85D3EFA7-8BDB-4A5A-882A-EDBF94BF3494}" destId="{E0431947-E99A-4790-BD89-FBCD5D78E100}" srcOrd="0" destOrd="0" presId="urn:microsoft.com/office/officeart/2005/8/layout/radial4"/>
+    <dgm:cxn modelId="{271925B9-B006-4FBB-AF8C-D8E63A32A165}" srcId="{86DB323A-73DC-4D24-A083-62E001995050}" destId="{7AAA3B19-FAC3-4C62-9309-B2DD2BE4A6BC}" srcOrd="1" destOrd="0" parTransId="{12C43100-EEF3-4FE1-AF2F-1BFF73DD3DB9}" sibTransId="{F2515C0F-FC73-44BE-A318-8DC9050BDBC3}"/>
+    <dgm:cxn modelId="{1298C251-7E4A-4B07-B619-5F579856FDB5}" srcId="{86DB323A-73DC-4D24-A083-62E001995050}" destId="{3349D365-30DD-46AC-9A03-A8D9A349A53E}" srcOrd="3" destOrd="0" parTransId="{3142E19D-54ED-4D5F-B1C8-751D212DB0FB}" sibTransId="{D9B85E9A-5C03-4B03-A981-2FB9DB12BCBE}"/>
+    <dgm:cxn modelId="{09FA4538-A37D-45CF-ABE7-F72A988FA6C8}" type="presOf" srcId="{69A049EF-51F8-4472-AB1D-9DD24EA9510C}" destId="{BD417E97-5549-4F53-AAFC-AE0DAE8D6740}" srcOrd="0" destOrd="0" presId="urn:microsoft.com/office/officeart/2005/8/layout/radial4"/>
+    <dgm:cxn modelId="{F3A3C72E-D9AC-4A08-9938-81F7E4BC44ED}" type="presOf" srcId="{F8A5DA11-9B74-489C-A302-07D714D9CD5B}" destId="{D40C343F-E9CC-4AE5-8A3B-5C8E2B9D3B89}" srcOrd="0" destOrd="0" presId="urn:microsoft.com/office/officeart/2005/8/layout/radial4"/>
+    <dgm:cxn modelId="{3DCC5B69-02D3-424C-93D2-6136BAD4C4A2}" srcId="{86DB323A-73DC-4D24-A083-62E001995050}" destId="{B7247DFC-D355-448B-9214-6AA0E881009C}" srcOrd="0" destOrd="0" parTransId="{F8A5DA11-9B74-489C-A302-07D714D9CD5B}" sibTransId="{52D7B1D1-5A0E-4AA5-9DD4-1AFC8D56C813}"/>
     <dgm:cxn modelId="{6B01D823-465C-4A8C-9BF1-B5C07707C5B9}" srcId="{86DB323A-73DC-4D24-A083-62E001995050}" destId="{69A049EF-51F8-4472-AB1D-9DD24EA9510C}" srcOrd="2" destOrd="0" parTransId="{408FBC27-3C08-474B-96FC-24A7BAF44899}" sibTransId="{FFBC999E-A277-4A3B-AD02-C85FC1C1DF44}"/>
-    <dgm:cxn modelId="{8EEFC20C-60BA-4D7F-9C94-258E82EA25BE}" type="presOf" srcId="{408FBC27-3C08-474B-96FC-24A7BAF44899}" destId="{068D7405-A6C9-45DD-A710-1DEB6B3AB9DA}" srcOrd="0" destOrd="0" presId="urn:microsoft.com/office/officeart/2005/8/layout/radial4"/>
-    <dgm:cxn modelId="{44C56E3F-36B0-4030-AA3C-D88BC78AF595}" type="presOf" srcId="{86DB323A-73DC-4D24-A083-62E001995050}" destId="{35C2A99A-00D9-4873-BF91-57CC5CDD6420}" srcOrd="0" destOrd="0" presId="urn:microsoft.com/office/officeart/2005/8/layout/radial4"/>
-    <dgm:cxn modelId="{271925B9-B006-4FBB-AF8C-D8E63A32A165}" srcId="{86DB323A-73DC-4D24-A083-62E001995050}" destId="{7AAA3B19-FAC3-4C62-9309-B2DD2BE4A6BC}" srcOrd="1" destOrd="0" parTransId="{12C43100-EEF3-4FE1-AF2F-1BFF73DD3DB9}" sibTransId="{F2515C0F-FC73-44BE-A318-8DC9050BDBC3}"/>
-    <dgm:cxn modelId="{850F2AF4-9E0C-4B6D-BEC2-EBFCB38F10C1}" type="presOf" srcId="{3142E19D-54ED-4D5F-B1C8-751D212DB0FB}" destId="{C893210D-4879-4DD5-B088-5D8E5992D57B}" srcOrd="0" destOrd="0" presId="urn:microsoft.com/office/officeart/2005/8/layout/radial4"/>
-    <dgm:cxn modelId="{4CE2F67E-3E30-4454-B48D-03235F5DAEF8}" type="presOf" srcId="{B7247DFC-D355-448B-9214-6AA0E881009C}" destId="{3E011A6B-79B3-4D46-95F0-A0F03807531F}" srcOrd="0" destOrd="0" presId="urn:microsoft.com/office/officeart/2005/8/layout/radial4"/>
-    <dgm:cxn modelId="{AB5F8FDB-9F37-41C2-83A5-57BDA5977CF2}" type="presOf" srcId="{7AAA3B19-FAC3-4C62-9309-B2DD2BE4A6BC}" destId="{E44501EB-77DB-44A8-9500-C483F073DCB5}" srcOrd="0" destOrd="0" presId="urn:microsoft.com/office/officeart/2005/8/layout/radial4"/>
-    <dgm:cxn modelId="{09FA4538-A37D-45CF-ABE7-F72A988FA6C8}" type="presOf" srcId="{69A049EF-51F8-4472-AB1D-9DD24EA9510C}" destId="{BD417E97-5549-4F53-AAFC-AE0DAE8D6740}" srcOrd="0" destOrd="0" presId="urn:microsoft.com/office/officeart/2005/8/layout/radial4"/>
-    <dgm:cxn modelId="{8D1EF1AB-79A4-478B-B770-55D66312AEAE}" srcId="{85D3EFA7-8BDB-4A5A-882A-EDBF94BF3494}" destId="{86DB323A-73DC-4D24-A083-62E001995050}" srcOrd="0" destOrd="0" parTransId="{1598B80F-D235-4DD7-8B2C-88306356BAA1}" sibTransId="{194954D0-B6E5-4F2C-81EB-002B2BB93D55}"/>
     <dgm:cxn modelId="{CB570A2F-4AC4-4DFF-BD1F-18A57C9ADFCE}" type="presOf" srcId="{3349D365-30DD-46AC-9A03-A8D9A349A53E}" destId="{D8484C4E-C79B-412F-9987-C2485DB65F27}" srcOrd="0" destOrd="0" presId="urn:microsoft.com/office/officeart/2005/8/layout/radial4"/>
-    <dgm:cxn modelId="{3DCC5B69-02D3-424C-93D2-6136BAD4C4A2}" srcId="{86DB323A-73DC-4D24-A083-62E001995050}" destId="{B7247DFC-D355-448B-9214-6AA0E881009C}" srcOrd="0" destOrd="0" parTransId="{F8A5DA11-9B74-489C-A302-07D714D9CD5B}" sibTransId="{52D7B1D1-5A0E-4AA5-9DD4-1AFC8D56C813}"/>
-    <dgm:cxn modelId="{DBEB4342-59D7-4AFB-92E3-AE5121EE78D4}" type="presOf" srcId="{85D3EFA7-8BDB-4A5A-882A-EDBF94BF3494}" destId="{E0431947-E99A-4790-BD89-FBCD5D78E100}" srcOrd="0" destOrd="0" presId="urn:microsoft.com/office/officeart/2005/8/layout/radial4"/>
-    <dgm:cxn modelId="{1298C251-7E4A-4B07-B619-5F579856FDB5}" srcId="{86DB323A-73DC-4D24-A083-62E001995050}" destId="{3349D365-30DD-46AC-9A03-A8D9A349A53E}" srcOrd="3" destOrd="0" parTransId="{3142E19D-54ED-4D5F-B1C8-751D212DB0FB}" sibTransId="{D9B85E9A-5C03-4B03-A981-2FB9DB12BCBE}"/>
-    <dgm:cxn modelId="{F3A3C72E-D9AC-4A08-9938-81F7E4BC44ED}" type="presOf" srcId="{F8A5DA11-9B74-489C-A302-07D714D9CD5B}" destId="{D40C343F-E9CC-4AE5-8A3B-5C8E2B9D3B89}" srcOrd="0" destOrd="0" presId="urn:microsoft.com/office/officeart/2005/8/layout/radial4"/>
-    <dgm:cxn modelId="{A9954CE5-562C-4280-9B91-0CEFCF670A2B}" type="presOf" srcId="{12C43100-EEF3-4FE1-AF2F-1BFF73DD3DB9}" destId="{FB4358FC-C359-4CA7-8DC8-E68F921B6C35}" srcOrd="0" destOrd="0" presId="urn:microsoft.com/office/officeart/2005/8/layout/radial4"/>
     <dgm:cxn modelId="{69E4204F-7204-47A3-8ACB-1BF93741FCE3}" type="presParOf" srcId="{E0431947-E99A-4790-BD89-FBCD5D78E100}" destId="{35C2A99A-00D9-4873-BF91-57CC5CDD6420}" srcOrd="0" destOrd="0" presId="urn:microsoft.com/office/officeart/2005/8/layout/radial4"/>
     <dgm:cxn modelId="{A92947EF-2D05-44EA-BFAD-67E7614504ED}" type="presParOf" srcId="{E0431947-E99A-4790-BD89-FBCD5D78E100}" destId="{D40C343F-E9CC-4AE5-8A3B-5C8E2B9D3B89}" srcOrd="1" destOrd="0" presId="urn:microsoft.com/office/officeart/2005/8/layout/radial4"/>
     <dgm:cxn modelId="{9795D822-FF72-455E-BEE9-E38DC6473993}" type="presParOf" srcId="{E0431947-E99A-4790-BD89-FBCD5D78E100}" destId="{3E011A6B-79B3-4D46-95F0-A0F03807531F}" srcOrd="2" destOrd="0" presId="urn:microsoft.com/office/officeart/2005/8/layout/radial4"/>
@@ -9567,8 +9568,8 @@
     <dgm:cxn modelId="{BD993B81-1D95-4E91-8B5E-772D2D5F68DB}" srcId="{0BB6C27D-9D64-4FFF-9836-096D8CD69F09}" destId="{EADE6E56-A019-4A25-8A0D-21A1E3889A40}" srcOrd="1" destOrd="0" parTransId="{9A63B6ED-A5B9-4CAE-8060-FBB964693B54}" sibTransId="{D026890A-AC44-4D89-A54B-42146397CA84}"/>
     <dgm:cxn modelId="{CD1D1145-7180-4E93-845B-7DA6E5A66C91}" type="presOf" srcId="{140F605A-B3EE-40AA-9BA0-F78384070D77}" destId="{B3CE29ED-D69D-44AD-9614-7EE3561E11D2}" srcOrd="0" destOrd="0" presId="urn:microsoft.com/office/officeart/2005/8/layout/radial4"/>
     <dgm:cxn modelId="{8263F422-EBB6-4B39-80DB-723EBA4AAD32}" srcId="{0BB6C27D-9D64-4FFF-9836-096D8CD69F09}" destId="{E3E65B24-862E-45E8-8D9F-5ECEA26D10E5}" srcOrd="3" destOrd="0" parTransId="{68A1E429-C542-4B03-B8E8-430C11C2204F}" sibTransId="{F4081BFD-D6EF-4E00-8C4C-C38AB2DCFB42}"/>
+    <dgm:cxn modelId="{862CB6F9-9507-4CEA-ABEF-D8E85FF56967}" type="presOf" srcId="{7D7A7806-31E2-402B-9E67-0D7336DDA317}" destId="{9C66E5C0-B7AC-4F67-9EB9-CBBD96993DA7}" srcOrd="0" destOrd="0" presId="urn:microsoft.com/office/officeart/2005/8/layout/radial4"/>
     <dgm:cxn modelId="{D753CB8A-F947-4B85-A72B-E5112B267428}" type="presOf" srcId="{E3E65B24-862E-45E8-8D9F-5ECEA26D10E5}" destId="{C490B8C4-50D2-48E6-B0D1-CA9A70DDDFC0}" srcOrd="0" destOrd="0" presId="urn:microsoft.com/office/officeart/2005/8/layout/radial4"/>
-    <dgm:cxn modelId="{862CB6F9-9507-4CEA-ABEF-D8E85FF56967}" type="presOf" srcId="{7D7A7806-31E2-402B-9E67-0D7336DDA317}" destId="{9C66E5C0-B7AC-4F67-9EB9-CBBD96993DA7}" srcOrd="0" destOrd="0" presId="urn:microsoft.com/office/officeart/2005/8/layout/radial4"/>
     <dgm:cxn modelId="{2AE17C07-46FC-4B77-B010-981CB0399BA1}" srcId="{0BB6C27D-9D64-4FFF-9836-096D8CD69F09}" destId="{2870FDFC-9108-4E75-ABC9-66BC9917D334}" srcOrd="2" destOrd="0" parTransId="{6A812863-3600-4A4C-98FB-3AA0BBC6063B}" sibTransId="{1EED0C6C-8D73-4F0B-8FD9-4DBBF129075C}"/>
     <dgm:cxn modelId="{8EEF13F1-142E-4DBC-AF68-66D51EE3BC70}" srcId="{0BB6C27D-9D64-4FFF-9836-096D8CD69F09}" destId="{D98431F8-145D-411B-97B7-C58B114C273B}" srcOrd="0" destOrd="0" parTransId="{7D4D3F03-1F50-435B-B268-7188694FB2D2}" sibTransId="{9318EB6E-7506-4D4E-98F2-07E3F7830D81}"/>
     <dgm:cxn modelId="{9D8B340A-DE17-4EFB-9C6D-AEF3B7EF8005}" srcId="{7D65DA9D-956B-4051-9D98-A96D4823FBAC}" destId="{0BB6C27D-9D64-4FFF-9836-096D8CD69F09}" srcOrd="0" destOrd="0" parTransId="{1B7DA0E3-5143-45A8-9F95-4CC5A149CFB4}" sibTransId="{2F5045E9-E75F-42E6-A2FC-5F752BE2B1AD}"/>
@@ -9858,8 +9859,8 @@
     <dgm:cxn modelId="{C1AB0D29-248A-4CA2-92DE-2D6EB30E8CE4}" srcId="{561FE539-A991-4074-885A-1650A5A7F96C}" destId="{400F5DA8-4C98-4BAB-935B-8936E214EAEA}" srcOrd="0" destOrd="0" parTransId="{0755A32A-A3E2-44C4-B55F-4FD0ADC823D1}" sibTransId="{8E75CAC5-2B3C-4996-BD35-F7C4C439710B}"/>
     <dgm:cxn modelId="{6A70561D-1F7A-4DBC-8ED6-7EDE627C100D}" type="presOf" srcId="{561FE539-A991-4074-885A-1650A5A7F96C}" destId="{B3117A50-E8BF-46CF-8C14-1EBC00723B95}" srcOrd="0" destOrd="0" presId="urn:microsoft.com/office/officeart/2005/8/layout/radial4"/>
     <dgm:cxn modelId="{85B29F81-FD8B-4495-B928-040E2BB73275}" type="presOf" srcId="{569830DE-75F3-4EC5-81E6-B51CDF5AEFD3}" destId="{760F937C-1523-417E-A53E-3D2EFB9F95E9}" srcOrd="0" destOrd="0" presId="urn:microsoft.com/office/officeart/2005/8/layout/radial4"/>
+    <dgm:cxn modelId="{B0973B27-5AB5-463C-9CEF-CCA7FE26C9F3}" type="presOf" srcId="{B6997B91-8B9F-48D2-8787-9DA110490AAE}" destId="{4CBB4B81-FEE7-4AE1-8CD0-8C351405FCD7}" srcOrd="0" destOrd="0" presId="urn:microsoft.com/office/officeart/2005/8/layout/radial4"/>
     <dgm:cxn modelId="{881DF7C4-BF1F-4965-AFA5-2CF574C2AB33}" srcId="{561FE539-A991-4074-885A-1650A5A7F96C}" destId="{913A5083-9666-4336-AF40-AC23BF226603}" srcOrd="1" destOrd="0" parTransId="{231CE4A1-1617-48DC-87AB-9461C325FE79}" sibTransId="{31BE0D61-5502-48CF-AA0C-2D7D33727D42}"/>
-    <dgm:cxn modelId="{B0973B27-5AB5-463C-9CEF-CCA7FE26C9F3}" type="presOf" srcId="{B6997B91-8B9F-48D2-8787-9DA110490AAE}" destId="{4CBB4B81-FEE7-4AE1-8CD0-8C351405FCD7}" srcOrd="0" destOrd="0" presId="urn:microsoft.com/office/officeart/2005/8/layout/radial4"/>
     <dgm:cxn modelId="{ABC1059E-D58F-42BD-A031-D4B38F9BC8D9}" type="presOf" srcId="{0755A32A-A3E2-44C4-B55F-4FD0ADC823D1}" destId="{916F4358-E35E-46DA-B4A9-76278C3F2E84}" srcOrd="0" destOrd="0" presId="urn:microsoft.com/office/officeart/2005/8/layout/radial4"/>
     <dgm:cxn modelId="{E0909908-44EF-44E2-BF8B-74BB932371F6}" type="presOf" srcId="{79CDD4FA-DC9B-42B9-98F8-7738CD66D167}" destId="{0BE08164-50A1-47F4-BDB3-0D30DCF4D43E}" srcOrd="0" destOrd="0" presId="urn:microsoft.com/office/officeart/2005/8/layout/radial4"/>
     <dgm:cxn modelId="{3838A4A0-76C2-4A6F-868E-41B33C896765}" type="presOf" srcId="{400F5DA8-4C98-4BAB-935B-8936E214EAEA}" destId="{4103098B-A997-472B-AE53-C7509EE15D97}" srcOrd="0" destOrd="0" presId="urn:microsoft.com/office/officeart/2005/8/layout/radial4"/>
@@ -10160,20 +10161,20 @@
   </dgm:ptLst>
   <dgm:cxnLst>
     <dgm:cxn modelId="{6C02EFAE-F10B-4E5D-A455-6BAE18CBBB14}" type="presOf" srcId="{6E06F5D9-3C1E-4948-A43F-99770C631C27}" destId="{9715E5A8-2F5C-429F-A697-3013872FF4C6}" srcOrd="0" destOrd="0" presId="urn:microsoft.com/office/officeart/2005/8/layout/radial4"/>
+    <dgm:cxn modelId="{B40E6CE2-334D-4952-9452-DAAE82A99937}" srcId="{7D64BD01-F2F3-42B4-A85B-F6B7650D2A15}" destId="{D05D7831-E90F-48BB-8B63-A5409E6846C0}" srcOrd="1" destOrd="0" parTransId="{F0059158-5592-4DB2-9716-A3AF52AAEA27}" sibTransId="{461E4E85-088A-4A8F-B7B0-811C8EF224BB}"/>
+    <dgm:cxn modelId="{D3EAE60B-E361-472F-ADF3-2EE4013449D8}" type="presOf" srcId="{7D64BD01-F2F3-42B4-A85B-F6B7650D2A15}" destId="{C43696EE-3BB3-4938-A44B-A95E856EDC76}" srcOrd="0" destOrd="0" presId="urn:microsoft.com/office/officeart/2005/8/layout/radial4"/>
     <dgm:cxn modelId="{3C657CCA-AD79-444F-B01A-47862E9EF7FA}" srcId="{7D64BD01-F2F3-42B4-A85B-F6B7650D2A15}" destId="{11688FA9-63E0-469F-8BD0-088A07034869}" srcOrd="0" destOrd="0" parTransId="{6E06F5D9-3C1E-4948-A43F-99770C631C27}" sibTransId="{90A50889-58DC-46FD-AF35-FABC78927385}"/>
+    <dgm:cxn modelId="{BAD28262-3270-4EA4-8B7A-B7DCDDC059DD}" type="presOf" srcId="{F0059158-5592-4DB2-9716-A3AF52AAEA27}" destId="{1AD8D178-3145-4916-82B1-8D32FB4B90BD}" srcOrd="0" destOrd="0" presId="urn:microsoft.com/office/officeart/2005/8/layout/radial4"/>
+    <dgm:cxn modelId="{EE558AAD-9858-4997-80A5-84218B49763D}" srcId="{7D64BD01-F2F3-42B4-A85B-F6B7650D2A15}" destId="{4EFD4A64-F8B4-40D2-9EFF-B46DD1A9D596}" srcOrd="3" destOrd="0" parTransId="{7BC0CB46-75A2-421E-BC9A-C00622759EEE}" sibTransId="{DF339FA6-4D1A-49B2-8F1B-5F7803FE567C}"/>
     <dgm:cxn modelId="{FBBB485C-9DEC-4255-B484-FD416A0B7C8E}" srcId="{7D64BD01-F2F3-42B4-A85B-F6B7650D2A15}" destId="{9159C01F-816B-46CA-A151-ACCC50DCBC1E}" srcOrd="2" destOrd="0" parTransId="{0F0138D7-79C2-4134-A99E-2B5893B66DEB}" sibTransId="{F93C638F-5790-448E-9A47-D8248E93F58C}"/>
+    <dgm:cxn modelId="{A89E9584-4226-4EDE-BF27-90CB1FC5F150}" srcId="{26F91D23-6CE2-494C-A3F4-FBCD3CBC2740}" destId="{7D64BD01-F2F3-42B4-A85B-F6B7650D2A15}" srcOrd="0" destOrd="0" parTransId="{15813DC2-753B-403B-8A9D-C38DA698153A}" sibTransId="{004FBAEB-97E7-412D-A4A4-CB4C4DE6C17B}"/>
     <dgm:cxn modelId="{D8FFB8CD-0115-438B-88EB-59EECC26F539}" type="presOf" srcId="{26F91D23-6CE2-494C-A3F4-FBCD3CBC2740}" destId="{D2E6A61E-14E0-475E-AE58-21A849B5E6E3}" srcOrd="0" destOrd="0" presId="urn:microsoft.com/office/officeart/2005/8/layout/radial4"/>
-    <dgm:cxn modelId="{BAD28262-3270-4EA4-8B7A-B7DCDDC059DD}" type="presOf" srcId="{F0059158-5592-4DB2-9716-A3AF52AAEA27}" destId="{1AD8D178-3145-4916-82B1-8D32FB4B90BD}" srcOrd="0" destOrd="0" presId="urn:microsoft.com/office/officeart/2005/8/layout/radial4"/>
-    <dgm:cxn modelId="{B40E6CE2-334D-4952-9452-DAAE82A99937}" srcId="{7D64BD01-F2F3-42B4-A85B-F6B7650D2A15}" destId="{D05D7831-E90F-48BB-8B63-A5409E6846C0}" srcOrd="1" destOrd="0" parTransId="{F0059158-5592-4DB2-9716-A3AF52AAEA27}" sibTransId="{461E4E85-088A-4A8F-B7B0-811C8EF224BB}"/>
+    <dgm:cxn modelId="{93BEB9D8-1C89-41C7-863E-161D5AAE0095}" type="presOf" srcId="{9159C01F-816B-46CA-A151-ACCC50DCBC1E}" destId="{1D47C688-4EFB-4E18-9996-DEFE508D22D5}" srcOrd="0" destOrd="0" presId="urn:microsoft.com/office/officeart/2005/8/layout/radial4"/>
     <dgm:cxn modelId="{FD09E449-5DAE-4806-A7FD-489A7B7106CB}" type="presOf" srcId="{11688FA9-63E0-469F-8BD0-088A07034869}" destId="{A59FAD39-B0DF-4A5F-8563-BA88AC477DAD}" srcOrd="0" destOrd="0" presId="urn:microsoft.com/office/officeart/2005/8/layout/radial4"/>
     <dgm:cxn modelId="{D4505881-35D7-47AB-BCA0-B017BA1EC3E5}" type="presOf" srcId="{0F0138D7-79C2-4134-A99E-2B5893B66DEB}" destId="{1C8674FB-CF45-4C42-9F46-DD377618B6FB}" srcOrd="0" destOrd="0" presId="urn:microsoft.com/office/officeart/2005/8/layout/radial4"/>
-    <dgm:cxn modelId="{EE558AAD-9858-4997-80A5-84218B49763D}" srcId="{7D64BD01-F2F3-42B4-A85B-F6B7650D2A15}" destId="{4EFD4A64-F8B4-40D2-9EFF-B46DD1A9D596}" srcOrd="3" destOrd="0" parTransId="{7BC0CB46-75A2-421E-BC9A-C00622759EEE}" sibTransId="{DF339FA6-4D1A-49B2-8F1B-5F7803FE567C}"/>
-    <dgm:cxn modelId="{0C188155-757F-45C7-80D9-2ECFEF3DF57B}" type="presOf" srcId="{D05D7831-E90F-48BB-8B63-A5409E6846C0}" destId="{B4F55543-BC9D-4791-AE45-19F06CE380B9}" srcOrd="0" destOrd="0" presId="urn:microsoft.com/office/officeart/2005/8/layout/radial4"/>
-    <dgm:cxn modelId="{93BEB9D8-1C89-41C7-863E-161D5AAE0095}" type="presOf" srcId="{9159C01F-816B-46CA-A151-ACCC50DCBC1E}" destId="{1D47C688-4EFB-4E18-9996-DEFE508D22D5}" srcOrd="0" destOrd="0" presId="urn:microsoft.com/office/officeart/2005/8/layout/radial4"/>
     <dgm:cxn modelId="{1B9E1892-2BD3-4CE6-A976-3F19FDA46B7B}" type="presOf" srcId="{7BC0CB46-75A2-421E-BC9A-C00622759EEE}" destId="{D96C1190-EB41-4103-9237-B84B7933F0EB}" srcOrd="0" destOrd="0" presId="urn:microsoft.com/office/officeart/2005/8/layout/radial4"/>
     <dgm:cxn modelId="{EF8958CD-BADF-49D2-97C2-D7300CCF1B7B}" type="presOf" srcId="{4EFD4A64-F8B4-40D2-9EFF-B46DD1A9D596}" destId="{FB1504C7-8869-42E3-873F-722A851BA5D6}" srcOrd="0" destOrd="0" presId="urn:microsoft.com/office/officeart/2005/8/layout/radial4"/>
-    <dgm:cxn modelId="{A89E9584-4226-4EDE-BF27-90CB1FC5F150}" srcId="{26F91D23-6CE2-494C-A3F4-FBCD3CBC2740}" destId="{7D64BD01-F2F3-42B4-A85B-F6B7650D2A15}" srcOrd="0" destOrd="0" parTransId="{15813DC2-753B-403B-8A9D-C38DA698153A}" sibTransId="{004FBAEB-97E7-412D-A4A4-CB4C4DE6C17B}"/>
-    <dgm:cxn modelId="{D3EAE60B-E361-472F-ADF3-2EE4013449D8}" type="presOf" srcId="{7D64BD01-F2F3-42B4-A85B-F6B7650D2A15}" destId="{C43696EE-3BB3-4938-A44B-A95E856EDC76}" srcOrd="0" destOrd="0" presId="urn:microsoft.com/office/officeart/2005/8/layout/radial4"/>
+    <dgm:cxn modelId="{0C188155-757F-45C7-80D9-2ECFEF3DF57B}" type="presOf" srcId="{D05D7831-E90F-48BB-8B63-A5409E6846C0}" destId="{B4F55543-BC9D-4791-AE45-19F06CE380B9}" srcOrd="0" destOrd="0" presId="urn:microsoft.com/office/officeart/2005/8/layout/radial4"/>
     <dgm:cxn modelId="{CB9A4620-54A9-4D35-936C-40C5C0CE8270}" type="presParOf" srcId="{D2E6A61E-14E0-475E-AE58-21A849B5E6E3}" destId="{C43696EE-3BB3-4938-A44B-A95E856EDC76}" srcOrd="0" destOrd="0" presId="urn:microsoft.com/office/officeart/2005/8/layout/radial4"/>
     <dgm:cxn modelId="{10973847-555C-4A96-ABED-CE7F22CA4856}" type="presParOf" srcId="{D2E6A61E-14E0-475E-AE58-21A849B5E6E3}" destId="{9715E5A8-2F5C-429F-A697-3013872FF4C6}" srcOrd="1" destOrd="0" presId="urn:microsoft.com/office/officeart/2005/8/layout/radial4"/>
     <dgm:cxn modelId="{7E8D8C88-62A3-40AC-B7DD-3B03CF1D478D}" type="presParOf" srcId="{D2E6A61E-14E0-475E-AE58-21A849B5E6E3}" destId="{A59FAD39-B0DF-4A5F-8563-BA88AC477DAD}" srcOrd="2" destOrd="0" presId="urn:microsoft.com/office/officeart/2005/8/layout/radial4"/>
@@ -10823,19 +10824,19 @@
     </dgm:pt>
   </dgm:ptLst>
   <dgm:cxnLst>
-    <dgm:cxn modelId="{E2540AB1-564D-48E0-AD74-6CD8C66467AC}" type="presOf" srcId="{B0625C4A-9A50-414B-9344-808CA61DF517}" destId="{E5D9ACF9-4A40-43B3-B920-B7F4E448361C}" srcOrd="0" destOrd="0" presId="urn:microsoft.com/office/officeart/2005/8/layout/hProcess11"/>
-    <dgm:cxn modelId="{AB120058-C6EC-410A-A843-0D87F604CFC7}" srcId="{BC2E6930-4DA2-4B15-8062-12688CFD5ABC}" destId="{CC6CBDEE-60C3-4661-B8E4-89B8D030373F}" srcOrd="0" destOrd="0" parTransId="{79BFBA0B-6A2C-4593-AEC6-6DAD7095259A}" sibTransId="{8D205875-BAC2-46D1-8128-BC92663E8137}"/>
-    <dgm:cxn modelId="{94248993-4E29-4330-A27C-BCF279F35B3B}" srcId="{BC2E6930-4DA2-4B15-8062-12688CFD5ABC}" destId="{095C0132-3802-4D7D-98D1-6DA387EE4A21}" srcOrd="1" destOrd="0" parTransId="{7B41CC7A-F38B-4DB5-9403-707712FE7B39}" sibTransId="{E46E812A-D0D7-4118-AB2C-6213118383F6}"/>
-    <dgm:cxn modelId="{AE195F71-927A-4382-A79F-0073B34BC08E}" type="presOf" srcId="{0B513B94-3213-41A1-AEFE-52232191C456}" destId="{5E297B2E-D491-48B0-83AA-6FDC1B681C83}" srcOrd="0" destOrd="0" presId="urn:microsoft.com/office/officeart/2005/8/layout/hProcess11"/>
+    <dgm:cxn modelId="{3D762082-87AD-49D0-A079-B1EBBB43CDC8}" srcId="{BC2E6930-4DA2-4B15-8062-12688CFD5ABC}" destId="{0B513B94-3213-41A1-AEFE-52232191C456}" srcOrd="4" destOrd="0" parTransId="{21175FC0-AA98-4219-8BD3-A4D61C766F78}" sibTransId="{0684219A-FF49-4B75-994B-457DA60801AA}"/>
     <dgm:cxn modelId="{23506853-0D21-4AA0-B149-9B5BE0CA69AE}" type="presOf" srcId="{095C0132-3802-4D7D-98D1-6DA387EE4A21}" destId="{1D1F8A79-1321-4ADD-8E78-529A7E622FC4}" srcOrd="0" destOrd="0" presId="urn:microsoft.com/office/officeart/2005/8/layout/hProcess11"/>
     <dgm:cxn modelId="{219D3028-4725-4360-B4C2-CE78D6803D37}" type="presOf" srcId="{CC6CBDEE-60C3-4661-B8E4-89B8D030373F}" destId="{774B0A9C-B8A0-4DFC-AD06-68639EBA96D8}" srcOrd="0" destOrd="0" presId="urn:microsoft.com/office/officeart/2005/8/layout/hProcess11"/>
+    <dgm:cxn modelId="{AE195F71-927A-4382-A79F-0073B34BC08E}" type="presOf" srcId="{0B513B94-3213-41A1-AEFE-52232191C456}" destId="{5E297B2E-D491-48B0-83AA-6FDC1B681C83}" srcOrd="0" destOrd="0" presId="urn:microsoft.com/office/officeart/2005/8/layout/hProcess11"/>
+    <dgm:cxn modelId="{94248993-4E29-4330-A27C-BCF279F35B3B}" srcId="{BC2E6930-4DA2-4B15-8062-12688CFD5ABC}" destId="{095C0132-3802-4D7D-98D1-6DA387EE4A21}" srcOrd="1" destOrd="0" parTransId="{7B41CC7A-F38B-4DB5-9403-707712FE7B39}" sibTransId="{E46E812A-D0D7-4118-AB2C-6213118383F6}"/>
+    <dgm:cxn modelId="{E949B7A7-D106-4356-947A-14DAA787C5D2}" srcId="{BC2E6930-4DA2-4B15-8062-12688CFD5ABC}" destId="{3802C7D7-5C6D-4841-B248-16900F5B4D23}" srcOrd="2" destOrd="0" parTransId="{8A3B8CFD-99D4-4091-8498-3B37468A295A}" sibTransId="{900ED00C-6666-4FA1-A50D-EC8E5F8D090E}"/>
+    <dgm:cxn modelId="{51D11045-613D-4377-8746-F547B7EBC736}" type="presOf" srcId="{6D278E1D-1986-409C-950A-4B65D0BB53BA}" destId="{FC1765AA-8827-4A3B-96DE-B9AF3E19190A}" srcOrd="0" destOrd="0" presId="urn:microsoft.com/office/officeart/2005/8/layout/hProcess11"/>
+    <dgm:cxn modelId="{AB120058-C6EC-410A-A843-0D87F604CFC7}" srcId="{BC2E6930-4DA2-4B15-8062-12688CFD5ABC}" destId="{CC6CBDEE-60C3-4661-B8E4-89B8D030373F}" srcOrd="0" destOrd="0" parTransId="{79BFBA0B-6A2C-4593-AEC6-6DAD7095259A}" sibTransId="{8D205875-BAC2-46D1-8128-BC92663E8137}"/>
+    <dgm:cxn modelId="{E2540AB1-564D-48E0-AD74-6CD8C66467AC}" type="presOf" srcId="{B0625C4A-9A50-414B-9344-808CA61DF517}" destId="{E5D9ACF9-4A40-43B3-B920-B7F4E448361C}" srcOrd="0" destOrd="0" presId="urn:microsoft.com/office/officeart/2005/8/layout/hProcess11"/>
     <dgm:cxn modelId="{458127A4-517A-4C14-AA77-3DE570058E3D}" srcId="{BC2E6930-4DA2-4B15-8062-12688CFD5ABC}" destId="{6D278E1D-1986-409C-950A-4B65D0BB53BA}" srcOrd="3" destOrd="0" parTransId="{3A8176D2-1DCB-4573-A487-86A366E46E68}" sibTransId="{3F41771E-8C2D-4DE7-8D4D-CE86FFA5E14C}"/>
-    <dgm:cxn modelId="{51D11045-613D-4377-8746-F547B7EBC736}" type="presOf" srcId="{6D278E1D-1986-409C-950A-4B65D0BB53BA}" destId="{FC1765AA-8827-4A3B-96DE-B9AF3E19190A}" srcOrd="0" destOrd="0" presId="urn:microsoft.com/office/officeart/2005/8/layout/hProcess11"/>
-    <dgm:cxn modelId="{3D762082-87AD-49D0-A079-B1EBBB43CDC8}" srcId="{BC2E6930-4DA2-4B15-8062-12688CFD5ABC}" destId="{0B513B94-3213-41A1-AEFE-52232191C456}" srcOrd="4" destOrd="0" parTransId="{21175FC0-AA98-4219-8BD3-A4D61C766F78}" sibTransId="{0684219A-FF49-4B75-994B-457DA60801AA}"/>
     <dgm:cxn modelId="{EBAC9868-F871-4981-A24C-E966DBBF3240}" srcId="{BC2E6930-4DA2-4B15-8062-12688CFD5ABC}" destId="{B0625C4A-9A50-414B-9344-808CA61DF517}" srcOrd="5" destOrd="0" parTransId="{590DB25E-05B7-4BE5-B1A4-864DB9788211}" sibTransId="{A2931129-A6D3-4041-B136-79743CCC4F76}"/>
+    <dgm:cxn modelId="{74A2E75B-B9B3-483D-A71F-3F765248464C}" type="presOf" srcId="{BC2E6930-4DA2-4B15-8062-12688CFD5ABC}" destId="{870D8E2B-136D-4CE8-A2A2-6EE7A6A2949E}" srcOrd="0" destOrd="0" presId="urn:microsoft.com/office/officeart/2005/8/layout/hProcess11"/>
     <dgm:cxn modelId="{56AB8D4D-C242-4223-96DF-61C81632F962}" type="presOf" srcId="{3802C7D7-5C6D-4841-B248-16900F5B4D23}" destId="{41512C52-1D47-4393-B7F5-16C4AEE46519}" srcOrd="0" destOrd="0" presId="urn:microsoft.com/office/officeart/2005/8/layout/hProcess11"/>
-    <dgm:cxn modelId="{74A2E75B-B9B3-483D-A71F-3F765248464C}" type="presOf" srcId="{BC2E6930-4DA2-4B15-8062-12688CFD5ABC}" destId="{870D8E2B-136D-4CE8-A2A2-6EE7A6A2949E}" srcOrd="0" destOrd="0" presId="urn:microsoft.com/office/officeart/2005/8/layout/hProcess11"/>
-    <dgm:cxn modelId="{E949B7A7-D106-4356-947A-14DAA787C5D2}" srcId="{BC2E6930-4DA2-4B15-8062-12688CFD5ABC}" destId="{3802C7D7-5C6D-4841-B248-16900F5B4D23}" srcOrd="2" destOrd="0" parTransId="{8A3B8CFD-99D4-4091-8498-3B37468A295A}" sibTransId="{900ED00C-6666-4FA1-A50D-EC8E5F8D090E}"/>
     <dgm:cxn modelId="{3C81375A-999C-428E-91F6-42E05C5204F6}" type="presParOf" srcId="{870D8E2B-136D-4CE8-A2A2-6EE7A6A2949E}" destId="{ABF35378-3AF2-433D-B180-3F88BE73DA1C}" srcOrd="0" destOrd="0" presId="urn:microsoft.com/office/officeart/2005/8/layout/hProcess11"/>
     <dgm:cxn modelId="{506935BB-F596-48CF-89FF-E1BF2929B486}" type="presParOf" srcId="{870D8E2B-136D-4CE8-A2A2-6EE7A6A2949E}" destId="{AB01A04C-A344-48DB-AADA-50B1315C38F0}" srcOrd="1" destOrd="0" presId="urn:microsoft.com/office/officeart/2005/8/layout/hProcess11"/>
     <dgm:cxn modelId="{5FDD7DC7-5D9D-433B-8C3D-A26FCC297826}" type="presParOf" srcId="{AB01A04C-A344-48DB-AADA-50B1315C38F0}" destId="{724C8452-67F9-42B9-9E38-3ED73331F05A}" srcOrd="0" destOrd="0" presId="urn:microsoft.com/office/officeart/2005/8/layout/hProcess11"/>
@@ -30141,7 +30142,7 @@
           <a:p>
             <a:fld id="{BC5D3495-D642-4B9C-A4D9-ABBA71EA56ED}" type="datetimeFigureOut">
               <a:rPr lang="de-DE" smtClean="0"/>
-              <a:t>14.08.2016</a:t>
+              <a:t>15.08.2016</a:t>
             </a:fld>
             <a:endParaRPr lang="de-DE"/>
           </a:p>
@@ -30537,7 +30538,7 @@
           <a:p>
             <a:fld id="{939A55D9-6AB2-4364-AE5A-4B2CFFB043C1}" type="datetimeFigureOut">
               <a:rPr lang="de-DE" smtClean="0"/>
-              <a:t>14.08.2016</a:t>
+              <a:t>15.08.2016</a:t>
             </a:fld>
             <a:endParaRPr lang="de-DE"/>
           </a:p>
@@ -30705,7 +30706,7 @@
           <a:p>
             <a:fld id="{939A55D9-6AB2-4364-AE5A-4B2CFFB043C1}" type="datetimeFigureOut">
               <a:rPr lang="de-DE" smtClean="0"/>
-              <a:t>14.08.2016</a:t>
+              <a:t>15.08.2016</a:t>
             </a:fld>
             <a:endParaRPr lang="de-DE"/>
           </a:p>
@@ -30883,7 +30884,7 @@
           <a:p>
             <a:fld id="{939A55D9-6AB2-4364-AE5A-4B2CFFB043C1}" type="datetimeFigureOut">
               <a:rPr lang="de-DE" smtClean="0"/>
-              <a:t>14.08.2016</a:t>
+              <a:t>15.08.2016</a:t>
             </a:fld>
             <a:endParaRPr lang="de-DE"/>
           </a:p>
@@ -31051,7 +31052,7 @@
           <a:p>
             <a:fld id="{939A55D9-6AB2-4364-AE5A-4B2CFFB043C1}" type="datetimeFigureOut">
               <a:rPr lang="de-DE" smtClean="0"/>
-              <a:t>14.08.2016</a:t>
+              <a:t>15.08.2016</a:t>
             </a:fld>
             <a:endParaRPr lang="de-DE"/>
           </a:p>
@@ -31296,7 +31297,7 @@
           <a:p>
             <a:fld id="{939A55D9-6AB2-4364-AE5A-4B2CFFB043C1}" type="datetimeFigureOut">
               <a:rPr lang="de-DE" smtClean="0"/>
-              <a:t>14.08.2016</a:t>
+              <a:t>15.08.2016</a:t>
             </a:fld>
             <a:endParaRPr lang="de-DE"/>
           </a:p>
@@ -31525,7 +31526,7 @@
           <a:p>
             <a:fld id="{939A55D9-6AB2-4364-AE5A-4B2CFFB043C1}" type="datetimeFigureOut">
               <a:rPr lang="de-DE" smtClean="0"/>
-              <a:t>14.08.2016</a:t>
+              <a:t>15.08.2016</a:t>
             </a:fld>
             <a:endParaRPr lang="de-DE"/>
           </a:p>
@@ -31889,7 +31890,7 @@
           <a:p>
             <a:fld id="{939A55D9-6AB2-4364-AE5A-4B2CFFB043C1}" type="datetimeFigureOut">
               <a:rPr lang="de-DE" smtClean="0"/>
-              <a:t>14.08.2016</a:t>
+              <a:t>15.08.2016</a:t>
             </a:fld>
             <a:endParaRPr lang="de-DE"/>
           </a:p>
@@ -32006,7 +32007,7 @@
           <a:p>
             <a:fld id="{939A55D9-6AB2-4364-AE5A-4B2CFFB043C1}" type="datetimeFigureOut">
               <a:rPr lang="de-DE" smtClean="0"/>
-              <a:t>14.08.2016</a:t>
+              <a:t>15.08.2016</a:t>
             </a:fld>
             <a:endParaRPr lang="de-DE"/>
           </a:p>
@@ -32101,7 +32102,7 @@
           <a:p>
             <a:fld id="{939A55D9-6AB2-4364-AE5A-4B2CFFB043C1}" type="datetimeFigureOut">
               <a:rPr lang="de-DE" smtClean="0"/>
-              <a:t>14.08.2016</a:t>
+              <a:t>15.08.2016</a:t>
             </a:fld>
             <a:endParaRPr lang="de-DE"/>
           </a:p>
@@ -32376,7 +32377,7 @@
           <a:p>
             <a:fld id="{939A55D9-6AB2-4364-AE5A-4B2CFFB043C1}" type="datetimeFigureOut">
               <a:rPr lang="de-DE" smtClean="0"/>
-              <a:t>14.08.2016</a:t>
+              <a:t>15.08.2016</a:t>
             </a:fld>
             <a:endParaRPr lang="de-DE"/>
           </a:p>
@@ -32628,7 +32629,7 @@
           <a:p>
             <a:fld id="{939A55D9-6AB2-4364-AE5A-4B2CFFB043C1}" type="datetimeFigureOut">
               <a:rPr lang="de-DE" smtClean="0"/>
-              <a:t>14.08.2016</a:t>
+              <a:t>15.08.2016</a:t>
             </a:fld>
             <a:endParaRPr lang="de-DE"/>
           </a:p>
@@ -32839,7 +32840,7 @@
           <a:p>
             <a:fld id="{939A55D9-6AB2-4364-AE5A-4B2CFFB043C1}" type="datetimeFigureOut">
               <a:rPr lang="de-DE" smtClean="0"/>
-              <a:t>14.08.2016</a:t>
+              <a:t>15.08.2016</a:t>
             </a:fld>
             <a:endParaRPr lang="de-DE"/>
           </a:p>
@@ -33869,6 +33870,72 @@
           <a:chExt cx="0" cy="0"/>
         </a:xfrm>
       </p:grpSpPr>
+      <p:sp>
+        <p:nvSpPr>
+          <p:cNvPr id="3" name="Inhaltsplatzhalter 2"/>
+          <p:cNvSpPr>
+            <a:spLocks noGrp="1"/>
+          </p:cNvSpPr>
+          <p:nvPr>
+            <p:ph idx="1"/>
+          </p:nvPr>
+        </p:nvSpPr>
+        <p:spPr>
+          <a:xfrm>
+            <a:off x="877389" y="2374264"/>
+            <a:ext cx="10515600" cy="4351338"/>
+          </a:xfrm>
+        </p:spPr>
+        <p:txBody>
+          <a:bodyPr>
+            <a:normAutofit/>
+          </a:bodyPr>
+          <a:lstStyle/>
+          <a:p>
+            <a:pPr marL="0" indent="0">
+              <a:buNone/>
+            </a:pPr>
+            <a:r>
+              <a:rPr lang="de-DE" sz="8800" dirty="0">
+                <a:solidFill>
+                  <a:srgbClr val="FF0000"/>
+                </a:solidFill>
+              </a:rPr>
+              <a:t> = 100% Projekterfolg</a:t>
+            </a:r>
+          </a:p>
+        </p:txBody>
+      </p:sp>
+    </p:spTree>
+    <p:extLst>
+      <p:ext uri="{BB962C8B-B14F-4D97-AF65-F5344CB8AC3E}">
+        <p14:creationId xmlns:p14="http://schemas.microsoft.com/office/powerpoint/2010/main" val="2126111590"/>
+      </p:ext>
+    </p:extLst>
+  </p:cSld>
+  <p:clrMapOvr>
+    <a:masterClrMapping/>
+  </p:clrMapOvr>
+</p:sld>
+</file>
+
+<file path=ppt/slides/slide14.xml><?xml version="1.0" encoding="utf-8"?>
+<p:sld xmlns:a="http://schemas.openxmlformats.org/drawingml/2006/main" xmlns:r="http://schemas.openxmlformats.org/officeDocument/2006/relationships" xmlns:p="http://schemas.openxmlformats.org/presentationml/2006/main">
+  <p:cSld>
+    <p:spTree>
+      <p:nvGrpSpPr>
+        <p:cNvPr id="1" name=""/>
+        <p:cNvGrpSpPr/>
+        <p:nvPr/>
+      </p:nvGrpSpPr>
+      <p:grpSpPr>
+        <a:xfrm>
+          <a:off x="0" y="0"/>
+          <a:ext cx="0" cy="0"/>
+          <a:chOff x="0" y="0"/>
+          <a:chExt cx="0" cy="0"/>
+        </a:xfrm>
+      </p:grpSpPr>
       <p:pic>
         <p:nvPicPr>
           <p:cNvPr id="4098" name="Picture 2" descr="http://www.webdesign-wuest.de/images/konzept.jpg"/>
@@ -34019,7 +34086,7 @@
 </p:sld>
 </file>
 
-<file path=ppt/slides/slide14.xml><?xml version="1.0" encoding="utf-8"?>
+<file path=ppt/slides/slide15.xml><?xml version="1.0" encoding="utf-8"?>
 <p:sld xmlns:a="http://schemas.openxmlformats.org/drawingml/2006/main" xmlns:r="http://schemas.openxmlformats.org/officeDocument/2006/relationships" xmlns:p="http://schemas.openxmlformats.org/presentationml/2006/main">
   <p:cSld>
     <p:spTree>
@@ -34139,7 +34206,7 @@
 </p:sld>
 </file>
 
-<file path=ppt/slides/slide15.xml><?xml version="1.0" encoding="utf-8"?>
+<file path=ppt/slides/slide16.xml><?xml version="1.0" encoding="utf-8"?>
 <p:sld xmlns:a="http://schemas.openxmlformats.org/drawingml/2006/main" xmlns:r="http://schemas.openxmlformats.org/officeDocument/2006/relationships" xmlns:p="http://schemas.openxmlformats.org/presentationml/2006/main">
   <p:cSld>
     <p:spTree>
@@ -34345,7 +34412,7 @@
 </p:sld>
 </file>
 
-<file path=ppt/slides/slide16.xml><?xml version="1.0" encoding="utf-8"?>
+<file path=ppt/slides/slide17.xml><?xml version="1.0" encoding="utf-8"?>
 <p:sld xmlns:a="http://schemas.openxmlformats.org/drawingml/2006/main" xmlns:r="http://schemas.openxmlformats.org/officeDocument/2006/relationships" xmlns:p="http://schemas.openxmlformats.org/presentationml/2006/main">
   <p:cSld>
     <p:spTree>
@@ -34598,7 +34665,7 @@
 </p:sld>
 </file>
 
-<file path=ppt/slides/slide17.xml><?xml version="1.0" encoding="utf-8"?>
+<file path=ppt/slides/slide18.xml><?xml version="1.0" encoding="utf-8"?>
 <p:sld xmlns:a="http://schemas.openxmlformats.org/drawingml/2006/main" xmlns:r="http://schemas.openxmlformats.org/officeDocument/2006/relationships" xmlns:p="http://schemas.openxmlformats.org/presentationml/2006/main">
   <p:cSld>
     <p:spTree>
@@ -34765,7 +34832,7 @@
 </p:sld>
 </file>
 
-<file path=ppt/slides/slide18.xml><?xml version="1.0" encoding="utf-8"?>
+<file path=ppt/slides/slide19.xml><?xml version="1.0" encoding="utf-8"?>
 <p:sld xmlns:a="http://schemas.openxmlformats.org/drawingml/2006/main" xmlns:r="http://schemas.openxmlformats.org/officeDocument/2006/relationships" xmlns:p="http://schemas.openxmlformats.org/presentationml/2006/main">
   <p:cSld>
     <p:spTree>
@@ -34801,7 +34868,6 @@
               <a:rPr lang="de-DE"/>
               <a:t>Technik</a:t>
             </a:r>
-            <a:endParaRPr lang="de-DE"/>
           </a:p>
         </p:txBody>
       </p:sp>

</xml_diff>

<commit_message>
Meine Änderungen an der Präsi
</commit_message>
<xml_diff>
--- a/documents/projectmanagement/Praesentationen/Vorstellung_Zwischenpräsentation.pptx
+++ b/documents/projectmanagement/Praesentationen/Vorstellung_Zwischenpräsentation.pptx
@@ -8331,6 +8331,13 @@
         </dgm:presLayoutVars>
       </dgm:prSet>
       <dgm:spPr/>
+      <dgm:t>
+        <a:bodyPr/>
+        <a:lstStyle/>
+        <a:p>
+          <a:endParaRPr lang="de-DE"/>
+        </a:p>
+      </dgm:t>
     </dgm:pt>
     <dgm:pt modelId="{BB20D88C-7D7D-4EF2-AF1B-221070122E98}" type="pres">
       <dgm:prSet presAssocID="{0F09778F-BBEF-40B3-B985-E6DBF854759D}" presName="hierRoot1" presStyleCnt="0">
@@ -8352,6 +8359,13 @@
         </dgm:presLayoutVars>
       </dgm:prSet>
       <dgm:spPr/>
+      <dgm:t>
+        <a:bodyPr/>
+        <a:lstStyle/>
+        <a:p>
+          <a:endParaRPr lang="de-DE"/>
+        </a:p>
+      </dgm:t>
     </dgm:pt>
     <dgm:pt modelId="{C11E0B58-073B-4A2B-BBC5-C01BFBEA3428}" type="pres">
       <dgm:prSet presAssocID="{0F09778F-BBEF-40B3-B985-E6DBF854759D}" presName="titleText1" presStyleLbl="fgAcc0" presStyleIdx="0" presStyleCnt="1">
@@ -8361,10 +8375,24 @@
         </dgm:presLayoutVars>
       </dgm:prSet>
       <dgm:spPr/>
+      <dgm:t>
+        <a:bodyPr/>
+        <a:lstStyle/>
+        <a:p>
+          <a:endParaRPr lang="de-DE"/>
+        </a:p>
+      </dgm:t>
     </dgm:pt>
     <dgm:pt modelId="{F844D984-EFDC-4B39-9025-690279C86CA2}" type="pres">
       <dgm:prSet presAssocID="{0F09778F-BBEF-40B3-B985-E6DBF854759D}" presName="rootConnector1" presStyleLbl="node1" presStyleIdx="0" presStyleCnt="4"/>
       <dgm:spPr/>
+      <dgm:t>
+        <a:bodyPr/>
+        <a:lstStyle/>
+        <a:p>
+          <a:endParaRPr lang="de-DE"/>
+        </a:p>
+      </dgm:t>
     </dgm:pt>
     <dgm:pt modelId="{9BBEE396-BE17-4700-982F-2CC4F4BB8ABB}" type="pres">
       <dgm:prSet presAssocID="{0F09778F-BBEF-40B3-B985-E6DBF854759D}" presName="hierChild2" presStyleCnt="0"/>
@@ -8373,6 +8401,13 @@
     <dgm:pt modelId="{99C91090-6E27-4464-89C0-997C0F06F599}" type="pres">
       <dgm:prSet presAssocID="{E2D8F2D1-985F-4FB0-9117-FA61BCC43327}" presName="Name37" presStyleLbl="parChTrans1D2" presStyleIdx="0" presStyleCnt="4"/>
       <dgm:spPr/>
+      <dgm:t>
+        <a:bodyPr/>
+        <a:lstStyle/>
+        <a:p>
+          <a:endParaRPr lang="de-DE"/>
+        </a:p>
+      </dgm:t>
     </dgm:pt>
     <dgm:pt modelId="{ED176194-5E34-4E6D-8B10-3DF5B560B062}" type="pres">
       <dgm:prSet presAssocID="{8FB384A4-B9BF-4EC5-9C1C-B6BFEC622841}" presName="hierRoot2" presStyleCnt="0">
@@ -8394,6 +8429,13 @@
         </dgm:presLayoutVars>
       </dgm:prSet>
       <dgm:spPr/>
+      <dgm:t>
+        <a:bodyPr/>
+        <a:lstStyle/>
+        <a:p>
+          <a:endParaRPr lang="de-DE"/>
+        </a:p>
+      </dgm:t>
     </dgm:pt>
     <dgm:pt modelId="{79751DA8-13B7-4D83-ACA4-8878A25675F6}" type="pres">
       <dgm:prSet presAssocID="{8FB384A4-B9BF-4EC5-9C1C-B6BFEC622841}" presName="titleText2" presStyleLbl="fgAcc1" presStyleIdx="0" presStyleCnt="4">
@@ -8403,10 +8445,24 @@
         </dgm:presLayoutVars>
       </dgm:prSet>
       <dgm:spPr/>
+      <dgm:t>
+        <a:bodyPr/>
+        <a:lstStyle/>
+        <a:p>
+          <a:endParaRPr lang="de-DE"/>
+        </a:p>
+      </dgm:t>
     </dgm:pt>
     <dgm:pt modelId="{5754D3EB-A4B5-4F8E-ACEE-5BE5839A8702}" type="pres">
       <dgm:prSet presAssocID="{8FB384A4-B9BF-4EC5-9C1C-B6BFEC622841}" presName="rootConnector" presStyleLbl="node2" presStyleIdx="0" presStyleCnt="0"/>
       <dgm:spPr/>
+      <dgm:t>
+        <a:bodyPr/>
+        <a:lstStyle/>
+        <a:p>
+          <a:endParaRPr lang="de-DE"/>
+        </a:p>
+      </dgm:t>
     </dgm:pt>
     <dgm:pt modelId="{A3FC9434-0B84-4C2C-8667-3B5EF3DC629B}" type="pres">
       <dgm:prSet presAssocID="{8FB384A4-B9BF-4EC5-9C1C-B6BFEC622841}" presName="hierChild4" presStyleCnt="0"/>
@@ -8419,6 +8475,13 @@
     <dgm:pt modelId="{3FF96185-B363-4A39-AD01-53645593D8A4}" type="pres">
       <dgm:prSet presAssocID="{E9C74C32-28B6-4CFF-AAF5-AF42CCD95C5F}" presName="Name37" presStyleLbl="parChTrans1D2" presStyleIdx="1" presStyleCnt="4"/>
       <dgm:spPr/>
+      <dgm:t>
+        <a:bodyPr/>
+        <a:lstStyle/>
+        <a:p>
+          <a:endParaRPr lang="de-DE"/>
+        </a:p>
+      </dgm:t>
     </dgm:pt>
     <dgm:pt modelId="{B2D59023-D456-4A26-ADAE-C5A4E4BA8DA8}" type="pres">
       <dgm:prSet presAssocID="{E66688AD-2279-489D-8DF6-D8D10FC6BEBE}" presName="hierRoot2" presStyleCnt="0">
@@ -8440,6 +8503,13 @@
         </dgm:presLayoutVars>
       </dgm:prSet>
       <dgm:spPr/>
+      <dgm:t>
+        <a:bodyPr/>
+        <a:lstStyle/>
+        <a:p>
+          <a:endParaRPr lang="de-DE"/>
+        </a:p>
+      </dgm:t>
     </dgm:pt>
     <dgm:pt modelId="{A6E6D66C-F143-430D-BA5B-A7922A31C720}" type="pres">
       <dgm:prSet presAssocID="{E66688AD-2279-489D-8DF6-D8D10FC6BEBE}" presName="titleText2" presStyleLbl="fgAcc1" presStyleIdx="1" presStyleCnt="4">
@@ -8449,10 +8519,24 @@
         </dgm:presLayoutVars>
       </dgm:prSet>
       <dgm:spPr/>
+      <dgm:t>
+        <a:bodyPr/>
+        <a:lstStyle/>
+        <a:p>
+          <a:endParaRPr lang="de-DE"/>
+        </a:p>
+      </dgm:t>
     </dgm:pt>
     <dgm:pt modelId="{C018365D-E358-4743-AAF2-CB7AF1FB0701}" type="pres">
       <dgm:prSet presAssocID="{E66688AD-2279-489D-8DF6-D8D10FC6BEBE}" presName="rootConnector" presStyleLbl="node2" presStyleIdx="0" presStyleCnt="0"/>
       <dgm:spPr/>
+      <dgm:t>
+        <a:bodyPr/>
+        <a:lstStyle/>
+        <a:p>
+          <a:endParaRPr lang="de-DE"/>
+        </a:p>
+      </dgm:t>
     </dgm:pt>
     <dgm:pt modelId="{CD834D7C-B613-4934-91A9-0A79441ECE01}" type="pres">
       <dgm:prSet presAssocID="{E66688AD-2279-489D-8DF6-D8D10FC6BEBE}" presName="hierChild4" presStyleCnt="0"/>
@@ -8465,6 +8549,13 @@
     <dgm:pt modelId="{C1AAD226-9BF2-492F-A8C9-045E664A4F5B}" type="pres">
       <dgm:prSet presAssocID="{F6A2B9C7-7C7F-49A7-92DD-083ED8C3EEFA}" presName="Name37" presStyleLbl="parChTrans1D2" presStyleIdx="2" presStyleCnt="4"/>
       <dgm:spPr/>
+      <dgm:t>
+        <a:bodyPr/>
+        <a:lstStyle/>
+        <a:p>
+          <a:endParaRPr lang="de-DE"/>
+        </a:p>
+      </dgm:t>
     </dgm:pt>
     <dgm:pt modelId="{1EB8B713-8CE5-4696-91CF-7A739B1EE670}" type="pres">
       <dgm:prSet presAssocID="{C5A982D7-B10A-48DB-A994-070FFA042A59}" presName="hierRoot2" presStyleCnt="0">
@@ -8486,6 +8577,13 @@
         </dgm:presLayoutVars>
       </dgm:prSet>
       <dgm:spPr/>
+      <dgm:t>
+        <a:bodyPr/>
+        <a:lstStyle/>
+        <a:p>
+          <a:endParaRPr lang="de-DE"/>
+        </a:p>
+      </dgm:t>
     </dgm:pt>
     <dgm:pt modelId="{ABE1D576-D2DF-442A-A70C-FD84633ED43D}" type="pres">
       <dgm:prSet presAssocID="{C5A982D7-B10A-48DB-A994-070FFA042A59}" presName="titleText2" presStyleLbl="fgAcc1" presStyleIdx="2" presStyleCnt="4">
@@ -8495,10 +8593,24 @@
         </dgm:presLayoutVars>
       </dgm:prSet>
       <dgm:spPr/>
+      <dgm:t>
+        <a:bodyPr/>
+        <a:lstStyle/>
+        <a:p>
+          <a:endParaRPr lang="de-DE"/>
+        </a:p>
+      </dgm:t>
     </dgm:pt>
     <dgm:pt modelId="{D42DBD0F-F1BF-4F55-9DA5-1A32E25F8999}" type="pres">
       <dgm:prSet presAssocID="{C5A982D7-B10A-48DB-A994-070FFA042A59}" presName="rootConnector" presStyleLbl="node2" presStyleIdx="0" presStyleCnt="0"/>
       <dgm:spPr/>
+      <dgm:t>
+        <a:bodyPr/>
+        <a:lstStyle/>
+        <a:p>
+          <a:endParaRPr lang="de-DE"/>
+        </a:p>
+      </dgm:t>
     </dgm:pt>
     <dgm:pt modelId="{4FC27DF5-9A5A-411F-8B0D-C55AA0879A49}" type="pres">
       <dgm:prSet presAssocID="{C5A982D7-B10A-48DB-A994-070FFA042A59}" presName="hierChild4" presStyleCnt="0"/>
@@ -8511,6 +8623,13 @@
     <dgm:pt modelId="{1D074A26-9B81-4881-8190-4CD463733753}" type="pres">
       <dgm:prSet presAssocID="{7C7CD673-F1F5-4AD6-A4EF-B2C014BCF8FE}" presName="Name37" presStyleLbl="parChTrans1D2" presStyleIdx="3" presStyleCnt="4"/>
       <dgm:spPr/>
+      <dgm:t>
+        <a:bodyPr/>
+        <a:lstStyle/>
+        <a:p>
+          <a:endParaRPr lang="de-DE"/>
+        </a:p>
+      </dgm:t>
     </dgm:pt>
     <dgm:pt modelId="{C40108FC-0137-4712-8F9F-42015DBCBBE6}" type="pres">
       <dgm:prSet presAssocID="{625FC5B7-CB32-4AC2-B0C9-9F2291C899B4}" presName="hierRoot2" presStyleCnt="0">
@@ -8532,6 +8651,13 @@
         </dgm:presLayoutVars>
       </dgm:prSet>
       <dgm:spPr/>
+      <dgm:t>
+        <a:bodyPr/>
+        <a:lstStyle/>
+        <a:p>
+          <a:endParaRPr lang="de-DE"/>
+        </a:p>
+      </dgm:t>
     </dgm:pt>
     <dgm:pt modelId="{CDA81E17-E728-46F3-AD2E-E6AD46D9BBD8}" type="pres">
       <dgm:prSet presAssocID="{625FC5B7-CB32-4AC2-B0C9-9F2291C899B4}" presName="titleText2" presStyleLbl="fgAcc1" presStyleIdx="3" presStyleCnt="4">
@@ -8541,10 +8667,24 @@
         </dgm:presLayoutVars>
       </dgm:prSet>
       <dgm:spPr/>
+      <dgm:t>
+        <a:bodyPr/>
+        <a:lstStyle/>
+        <a:p>
+          <a:endParaRPr lang="de-DE"/>
+        </a:p>
+      </dgm:t>
     </dgm:pt>
     <dgm:pt modelId="{AA417ABE-CB46-4973-8E11-1381D382E711}" type="pres">
       <dgm:prSet presAssocID="{625FC5B7-CB32-4AC2-B0C9-9F2291C899B4}" presName="rootConnector" presStyleLbl="node2" presStyleIdx="0" presStyleCnt="0"/>
       <dgm:spPr/>
+      <dgm:t>
+        <a:bodyPr/>
+        <a:lstStyle/>
+        <a:p>
+          <a:endParaRPr lang="de-DE"/>
+        </a:p>
+      </dgm:t>
     </dgm:pt>
     <dgm:pt modelId="{50C78DB7-7513-4002-90E1-B86A6572163A}" type="pres">
       <dgm:prSet presAssocID="{625FC5B7-CB32-4AC2-B0C9-9F2291C899B4}" presName="hierChild4" presStyleCnt="0"/>
@@ -8838,14 +8978,35 @@
         </dgm:presLayoutVars>
       </dgm:prSet>
       <dgm:spPr/>
+      <dgm:t>
+        <a:bodyPr/>
+        <a:lstStyle/>
+        <a:p>
+          <a:endParaRPr lang="de-DE"/>
+        </a:p>
+      </dgm:t>
     </dgm:pt>
     <dgm:pt modelId="{CDFC9BC9-18E0-46C4-855F-D6D43C6F42CE}" type="pres">
       <dgm:prSet presAssocID="{67B0C7C9-29A4-4A33-ABF6-27D6DD264A26}" presName="sibTrans" presStyleLbl="sibTrans2D1" presStyleIdx="0" presStyleCnt="4"/>
       <dgm:spPr/>
+      <dgm:t>
+        <a:bodyPr/>
+        <a:lstStyle/>
+        <a:p>
+          <a:endParaRPr lang="de-DE"/>
+        </a:p>
+      </dgm:t>
     </dgm:pt>
     <dgm:pt modelId="{A60DF141-9675-41CE-846F-FFF96525AF1A}" type="pres">
       <dgm:prSet presAssocID="{67B0C7C9-29A4-4A33-ABF6-27D6DD264A26}" presName="connectorText" presStyleLbl="sibTrans2D1" presStyleIdx="0" presStyleCnt="4"/>
       <dgm:spPr/>
+      <dgm:t>
+        <a:bodyPr/>
+        <a:lstStyle/>
+        <a:p>
+          <a:endParaRPr lang="de-DE"/>
+        </a:p>
+      </dgm:t>
     </dgm:pt>
     <dgm:pt modelId="{95A1D884-B507-477E-8FA7-EC26F36D96CB}" type="pres">
       <dgm:prSet presAssocID="{C25B03C4-0051-448D-8229-16EE6859C555}" presName="node" presStyleLbl="node1" presStyleIdx="1" presStyleCnt="5">
@@ -8854,14 +9015,35 @@
         </dgm:presLayoutVars>
       </dgm:prSet>
       <dgm:spPr/>
+      <dgm:t>
+        <a:bodyPr/>
+        <a:lstStyle/>
+        <a:p>
+          <a:endParaRPr lang="de-DE"/>
+        </a:p>
+      </dgm:t>
     </dgm:pt>
     <dgm:pt modelId="{D089CC68-5571-41C6-AE4F-9EC473A665E3}" type="pres">
       <dgm:prSet presAssocID="{8E323399-BDA5-4F69-9DFD-E9325D43AD51}" presName="sibTrans" presStyleLbl="sibTrans2D1" presStyleIdx="1" presStyleCnt="4"/>
       <dgm:spPr/>
+      <dgm:t>
+        <a:bodyPr/>
+        <a:lstStyle/>
+        <a:p>
+          <a:endParaRPr lang="de-DE"/>
+        </a:p>
+      </dgm:t>
     </dgm:pt>
     <dgm:pt modelId="{BA176905-4783-402D-8D7A-5E1653F05E13}" type="pres">
       <dgm:prSet presAssocID="{8E323399-BDA5-4F69-9DFD-E9325D43AD51}" presName="connectorText" presStyleLbl="sibTrans2D1" presStyleIdx="1" presStyleCnt="4"/>
       <dgm:spPr/>
+      <dgm:t>
+        <a:bodyPr/>
+        <a:lstStyle/>
+        <a:p>
+          <a:endParaRPr lang="de-DE"/>
+        </a:p>
+      </dgm:t>
     </dgm:pt>
     <dgm:pt modelId="{BB174CA1-7CD2-46AD-B29C-B9F5BB7EA064}" type="pres">
       <dgm:prSet presAssocID="{6382B778-7381-439D-A2A1-6122F4DF9632}" presName="node" presStyleLbl="node1" presStyleIdx="2" presStyleCnt="5">
@@ -8870,14 +9052,35 @@
         </dgm:presLayoutVars>
       </dgm:prSet>
       <dgm:spPr/>
+      <dgm:t>
+        <a:bodyPr/>
+        <a:lstStyle/>
+        <a:p>
+          <a:endParaRPr lang="de-DE"/>
+        </a:p>
+      </dgm:t>
     </dgm:pt>
     <dgm:pt modelId="{ACE42F0E-8FA7-49AA-9A82-364EA1F509A1}" type="pres">
       <dgm:prSet presAssocID="{2BC67C2E-C495-4D91-925A-8D698E0396F2}" presName="sibTrans" presStyleLbl="sibTrans2D1" presStyleIdx="2" presStyleCnt="4"/>
       <dgm:spPr/>
+      <dgm:t>
+        <a:bodyPr/>
+        <a:lstStyle/>
+        <a:p>
+          <a:endParaRPr lang="de-DE"/>
+        </a:p>
+      </dgm:t>
     </dgm:pt>
     <dgm:pt modelId="{FDEE9D0D-E0FD-4F1A-B204-FAE08DC0C6DC}" type="pres">
       <dgm:prSet presAssocID="{2BC67C2E-C495-4D91-925A-8D698E0396F2}" presName="connectorText" presStyleLbl="sibTrans2D1" presStyleIdx="2" presStyleCnt="4"/>
       <dgm:spPr/>
+      <dgm:t>
+        <a:bodyPr/>
+        <a:lstStyle/>
+        <a:p>
+          <a:endParaRPr lang="de-DE"/>
+        </a:p>
+      </dgm:t>
     </dgm:pt>
     <dgm:pt modelId="{8A1D632A-105E-48A3-9429-E62C2379FEF7}" type="pres">
       <dgm:prSet presAssocID="{827D6214-358D-424B-9F54-AF23819BC946}" presName="node" presStyleLbl="node1" presStyleIdx="3" presStyleCnt="5">
@@ -8886,14 +9089,35 @@
         </dgm:presLayoutVars>
       </dgm:prSet>
       <dgm:spPr/>
+      <dgm:t>
+        <a:bodyPr/>
+        <a:lstStyle/>
+        <a:p>
+          <a:endParaRPr lang="de-DE"/>
+        </a:p>
+      </dgm:t>
     </dgm:pt>
     <dgm:pt modelId="{4B1E4722-2BAD-48CF-AB15-4DDDCDE143CE}" type="pres">
       <dgm:prSet presAssocID="{951E90CF-25EF-4FC8-A2C2-AA0DE1D80379}" presName="sibTrans" presStyleLbl="sibTrans2D1" presStyleIdx="3" presStyleCnt="4"/>
       <dgm:spPr/>
+      <dgm:t>
+        <a:bodyPr/>
+        <a:lstStyle/>
+        <a:p>
+          <a:endParaRPr lang="de-DE"/>
+        </a:p>
+      </dgm:t>
     </dgm:pt>
     <dgm:pt modelId="{0B814EE3-D208-48F4-8633-767EADAC3B97}" type="pres">
       <dgm:prSet presAssocID="{951E90CF-25EF-4FC8-A2C2-AA0DE1D80379}" presName="connectorText" presStyleLbl="sibTrans2D1" presStyleIdx="3" presStyleCnt="4"/>
       <dgm:spPr/>
+      <dgm:t>
+        <a:bodyPr/>
+        <a:lstStyle/>
+        <a:p>
+          <a:endParaRPr lang="de-DE"/>
+        </a:p>
+      </dgm:t>
     </dgm:pt>
     <dgm:pt modelId="{490552E8-260E-47EF-A3BC-019A6D67A44E}" type="pres">
       <dgm:prSet presAssocID="{46C56666-60C9-46EC-B86B-C38D49853D78}" presName="node" presStyleLbl="node1" presStyleIdx="4" presStyleCnt="5">
@@ -8902,6 +9126,13 @@
         </dgm:presLayoutVars>
       </dgm:prSet>
       <dgm:spPr/>
+      <dgm:t>
+        <a:bodyPr/>
+        <a:lstStyle/>
+        <a:p>
+          <a:endParaRPr lang="de-DE"/>
+        </a:p>
+      </dgm:t>
     </dgm:pt>
   </dgm:ptLst>
   <dgm:cxnLst>
@@ -9152,14 +9383,35 @@
         </dgm:presLayoutVars>
       </dgm:prSet>
       <dgm:spPr/>
+      <dgm:t>
+        <a:bodyPr/>
+        <a:lstStyle/>
+        <a:p>
+          <a:endParaRPr lang="de-DE"/>
+        </a:p>
+      </dgm:t>
     </dgm:pt>
     <dgm:pt modelId="{35C2A99A-00D9-4873-BF91-57CC5CDD6420}" type="pres">
       <dgm:prSet presAssocID="{86DB323A-73DC-4D24-A083-62E001995050}" presName="centerShape" presStyleLbl="node0" presStyleIdx="0" presStyleCnt="1"/>
       <dgm:spPr/>
+      <dgm:t>
+        <a:bodyPr/>
+        <a:lstStyle/>
+        <a:p>
+          <a:endParaRPr lang="de-DE"/>
+        </a:p>
+      </dgm:t>
     </dgm:pt>
     <dgm:pt modelId="{D40C343F-E9CC-4AE5-8A3B-5C8E2B9D3B89}" type="pres">
       <dgm:prSet presAssocID="{F8A5DA11-9B74-489C-A302-07D714D9CD5B}" presName="parTrans" presStyleLbl="bgSibTrans2D1" presStyleIdx="0" presStyleCnt="4"/>
       <dgm:spPr/>
+      <dgm:t>
+        <a:bodyPr/>
+        <a:lstStyle/>
+        <a:p>
+          <a:endParaRPr lang="de-DE"/>
+        </a:p>
+      </dgm:t>
     </dgm:pt>
     <dgm:pt modelId="{3E011A6B-79B3-4D46-95F0-A0F03807531F}" type="pres">
       <dgm:prSet presAssocID="{B7247DFC-D355-448B-9214-6AA0E881009C}" presName="node" presStyleLbl="node1" presStyleIdx="0" presStyleCnt="4">
@@ -9168,10 +9420,24 @@
         </dgm:presLayoutVars>
       </dgm:prSet>
       <dgm:spPr/>
+      <dgm:t>
+        <a:bodyPr/>
+        <a:lstStyle/>
+        <a:p>
+          <a:endParaRPr lang="de-DE"/>
+        </a:p>
+      </dgm:t>
     </dgm:pt>
     <dgm:pt modelId="{FB4358FC-C359-4CA7-8DC8-E68F921B6C35}" type="pres">
       <dgm:prSet presAssocID="{12C43100-EEF3-4FE1-AF2F-1BFF73DD3DB9}" presName="parTrans" presStyleLbl="bgSibTrans2D1" presStyleIdx="1" presStyleCnt="4"/>
       <dgm:spPr/>
+      <dgm:t>
+        <a:bodyPr/>
+        <a:lstStyle/>
+        <a:p>
+          <a:endParaRPr lang="de-DE"/>
+        </a:p>
+      </dgm:t>
     </dgm:pt>
     <dgm:pt modelId="{E44501EB-77DB-44A8-9500-C483F073DCB5}" type="pres">
       <dgm:prSet presAssocID="{7AAA3B19-FAC3-4C62-9309-B2DD2BE4A6BC}" presName="node" presStyleLbl="node1" presStyleIdx="1" presStyleCnt="4">
@@ -9180,10 +9446,24 @@
         </dgm:presLayoutVars>
       </dgm:prSet>
       <dgm:spPr/>
+      <dgm:t>
+        <a:bodyPr/>
+        <a:lstStyle/>
+        <a:p>
+          <a:endParaRPr lang="de-DE"/>
+        </a:p>
+      </dgm:t>
     </dgm:pt>
     <dgm:pt modelId="{068D7405-A6C9-45DD-A710-1DEB6B3AB9DA}" type="pres">
       <dgm:prSet presAssocID="{408FBC27-3C08-474B-96FC-24A7BAF44899}" presName="parTrans" presStyleLbl="bgSibTrans2D1" presStyleIdx="2" presStyleCnt="4"/>
       <dgm:spPr/>
+      <dgm:t>
+        <a:bodyPr/>
+        <a:lstStyle/>
+        <a:p>
+          <a:endParaRPr lang="de-DE"/>
+        </a:p>
+      </dgm:t>
     </dgm:pt>
     <dgm:pt modelId="{BD417E97-5549-4F53-AAFC-AE0DAE8D6740}" type="pres">
       <dgm:prSet presAssocID="{69A049EF-51F8-4472-AB1D-9DD24EA9510C}" presName="node" presStyleLbl="node1" presStyleIdx="2" presStyleCnt="4">
@@ -9192,10 +9472,24 @@
         </dgm:presLayoutVars>
       </dgm:prSet>
       <dgm:spPr/>
+      <dgm:t>
+        <a:bodyPr/>
+        <a:lstStyle/>
+        <a:p>
+          <a:endParaRPr lang="de-DE"/>
+        </a:p>
+      </dgm:t>
     </dgm:pt>
     <dgm:pt modelId="{C893210D-4879-4DD5-B088-5D8E5992D57B}" type="pres">
       <dgm:prSet presAssocID="{3142E19D-54ED-4D5F-B1C8-751D212DB0FB}" presName="parTrans" presStyleLbl="bgSibTrans2D1" presStyleIdx="3" presStyleCnt="4"/>
       <dgm:spPr/>
+      <dgm:t>
+        <a:bodyPr/>
+        <a:lstStyle/>
+        <a:p>
+          <a:endParaRPr lang="de-DE"/>
+        </a:p>
+      </dgm:t>
     </dgm:pt>
     <dgm:pt modelId="{D8484C4E-C79B-412F-9987-C2485DB65F27}" type="pres">
       <dgm:prSet presAssocID="{3349D365-30DD-46AC-9A03-A8D9A349A53E}" presName="node" presStyleLbl="node1" presStyleIdx="3" presStyleCnt="4">
@@ -9204,24 +9498,31 @@
         </dgm:presLayoutVars>
       </dgm:prSet>
       <dgm:spPr/>
+      <dgm:t>
+        <a:bodyPr/>
+        <a:lstStyle/>
+        <a:p>
+          <a:endParaRPr lang="de-DE"/>
+        </a:p>
+      </dgm:t>
     </dgm:pt>
   </dgm:ptLst>
   <dgm:cxnLst>
-    <dgm:cxn modelId="{850F2AF4-9E0C-4B6D-BEC2-EBFCB38F10C1}" type="presOf" srcId="{3142E19D-54ED-4D5F-B1C8-751D212DB0FB}" destId="{C893210D-4879-4DD5-B088-5D8E5992D57B}" srcOrd="0" destOrd="0" presId="urn:microsoft.com/office/officeart/2005/8/layout/radial4"/>
     <dgm:cxn modelId="{44C56E3F-36B0-4030-AA3C-D88BC78AF595}" type="presOf" srcId="{86DB323A-73DC-4D24-A083-62E001995050}" destId="{35C2A99A-00D9-4873-BF91-57CC5CDD6420}" srcOrd="0" destOrd="0" presId="urn:microsoft.com/office/officeart/2005/8/layout/radial4"/>
-    <dgm:cxn modelId="{3DCC5B69-02D3-424C-93D2-6136BAD4C4A2}" srcId="{86DB323A-73DC-4D24-A083-62E001995050}" destId="{B7247DFC-D355-448B-9214-6AA0E881009C}" srcOrd="0" destOrd="0" parTransId="{F8A5DA11-9B74-489C-A302-07D714D9CD5B}" sibTransId="{52D7B1D1-5A0E-4AA5-9DD4-1AFC8D56C813}"/>
-    <dgm:cxn modelId="{1298C251-7E4A-4B07-B619-5F579856FDB5}" srcId="{86DB323A-73DC-4D24-A083-62E001995050}" destId="{3349D365-30DD-46AC-9A03-A8D9A349A53E}" srcOrd="3" destOrd="0" parTransId="{3142E19D-54ED-4D5F-B1C8-751D212DB0FB}" sibTransId="{D9B85E9A-5C03-4B03-A981-2FB9DB12BCBE}"/>
     <dgm:cxn modelId="{8EEFC20C-60BA-4D7F-9C94-258E82EA25BE}" type="presOf" srcId="{408FBC27-3C08-474B-96FC-24A7BAF44899}" destId="{068D7405-A6C9-45DD-A710-1DEB6B3AB9DA}" srcOrd="0" destOrd="0" presId="urn:microsoft.com/office/officeart/2005/8/layout/radial4"/>
     <dgm:cxn modelId="{A9954CE5-562C-4280-9B91-0CEFCF670A2B}" type="presOf" srcId="{12C43100-EEF3-4FE1-AF2F-1BFF73DD3DB9}" destId="{FB4358FC-C359-4CA7-8DC8-E68F921B6C35}" srcOrd="0" destOrd="0" presId="urn:microsoft.com/office/officeart/2005/8/layout/radial4"/>
+    <dgm:cxn modelId="{8D1EF1AB-79A4-478B-B770-55D66312AEAE}" srcId="{85D3EFA7-8BDB-4A5A-882A-EDBF94BF3494}" destId="{86DB323A-73DC-4D24-A083-62E001995050}" srcOrd="0" destOrd="0" parTransId="{1598B80F-D235-4DD7-8B2C-88306356BAA1}" sibTransId="{194954D0-B6E5-4F2C-81EB-002B2BB93D55}"/>
+    <dgm:cxn modelId="{4CE2F67E-3E30-4454-B48D-03235F5DAEF8}" type="presOf" srcId="{B7247DFC-D355-448B-9214-6AA0E881009C}" destId="{3E011A6B-79B3-4D46-95F0-A0F03807531F}" srcOrd="0" destOrd="0" presId="urn:microsoft.com/office/officeart/2005/8/layout/radial4"/>
+    <dgm:cxn modelId="{850F2AF4-9E0C-4B6D-BEC2-EBFCB38F10C1}" type="presOf" srcId="{3142E19D-54ED-4D5F-B1C8-751D212DB0FB}" destId="{C893210D-4879-4DD5-B088-5D8E5992D57B}" srcOrd="0" destOrd="0" presId="urn:microsoft.com/office/officeart/2005/8/layout/radial4"/>
+    <dgm:cxn modelId="{AB5F8FDB-9F37-41C2-83A5-57BDA5977CF2}" type="presOf" srcId="{7AAA3B19-FAC3-4C62-9309-B2DD2BE4A6BC}" destId="{E44501EB-77DB-44A8-9500-C483F073DCB5}" srcOrd="0" destOrd="0" presId="urn:microsoft.com/office/officeart/2005/8/layout/radial4"/>
+    <dgm:cxn modelId="{DBEB4342-59D7-4AFB-92E3-AE5121EE78D4}" type="presOf" srcId="{85D3EFA7-8BDB-4A5A-882A-EDBF94BF3494}" destId="{E0431947-E99A-4790-BD89-FBCD5D78E100}" srcOrd="0" destOrd="0" presId="urn:microsoft.com/office/officeart/2005/8/layout/radial4"/>
+    <dgm:cxn modelId="{271925B9-B006-4FBB-AF8C-D8E63A32A165}" srcId="{86DB323A-73DC-4D24-A083-62E001995050}" destId="{7AAA3B19-FAC3-4C62-9309-B2DD2BE4A6BC}" srcOrd="1" destOrd="0" parTransId="{12C43100-EEF3-4FE1-AF2F-1BFF73DD3DB9}" sibTransId="{F2515C0F-FC73-44BE-A318-8DC9050BDBC3}"/>
+    <dgm:cxn modelId="{1298C251-7E4A-4B07-B619-5F579856FDB5}" srcId="{86DB323A-73DC-4D24-A083-62E001995050}" destId="{3349D365-30DD-46AC-9A03-A8D9A349A53E}" srcOrd="3" destOrd="0" parTransId="{3142E19D-54ED-4D5F-B1C8-751D212DB0FB}" sibTransId="{D9B85E9A-5C03-4B03-A981-2FB9DB12BCBE}"/>
     <dgm:cxn modelId="{09FA4538-A37D-45CF-ABE7-F72A988FA6C8}" type="presOf" srcId="{69A049EF-51F8-4472-AB1D-9DD24EA9510C}" destId="{BD417E97-5549-4F53-AAFC-AE0DAE8D6740}" srcOrd="0" destOrd="0" presId="urn:microsoft.com/office/officeart/2005/8/layout/radial4"/>
-    <dgm:cxn modelId="{4CE2F67E-3E30-4454-B48D-03235F5DAEF8}" type="presOf" srcId="{B7247DFC-D355-448B-9214-6AA0E881009C}" destId="{3E011A6B-79B3-4D46-95F0-A0F03807531F}" srcOrd="0" destOrd="0" presId="urn:microsoft.com/office/officeart/2005/8/layout/radial4"/>
-    <dgm:cxn modelId="{DBEB4342-59D7-4AFB-92E3-AE5121EE78D4}" type="presOf" srcId="{85D3EFA7-8BDB-4A5A-882A-EDBF94BF3494}" destId="{E0431947-E99A-4790-BD89-FBCD5D78E100}" srcOrd="0" destOrd="0" presId="urn:microsoft.com/office/officeart/2005/8/layout/radial4"/>
-    <dgm:cxn modelId="{8D1EF1AB-79A4-478B-B770-55D66312AEAE}" srcId="{85D3EFA7-8BDB-4A5A-882A-EDBF94BF3494}" destId="{86DB323A-73DC-4D24-A083-62E001995050}" srcOrd="0" destOrd="0" parTransId="{1598B80F-D235-4DD7-8B2C-88306356BAA1}" sibTransId="{194954D0-B6E5-4F2C-81EB-002B2BB93D55}"/>
+    <dgm:cxn modelId="{F3A3C72E-D9AC-4A08-9938-81F7E4BC44ED}" type="presOf" srcId="{F8A5DA11-9B74-489C-A302-07D714D9CD5B}" destId="{D40C343F-E9CC-4AE5-8A3B-5C8E2B9D3B89}" srcOrd="0" destOrd="0" presId="urn:microsoft.com/office/officeart/2005/8/layout/radial4"/>
+    <dgm:cxn modelId="{3DCC5B69-02D3-424C-93D2-6136BAD4C4A2}" srcId="{86DB323A-73DC-4D24-A083-62E001995050}" destId="{B7247DFC-D355-448B-9214-6AA0E881009C}" srcOrd="0" destOrd="0" parTransId="{F8A5DA11-9B74-489C-A302-07D714D9CD5B}" sibTransId="{52D7B1D1-5A0E-4AA5-9DD4-1AFC8D56C813}"/>
     <dgm:cxn modelId="{6B01D823-465C-4A8C-9BF1-B5C07707C5B9}" srcId="{86DB323A-73DC-4D24-A083-62E001995050}" destId="{69A049EF-51F8-4472-AB1D-9DD24EA9510C}" srcOrd="2" destOrd="0" parTransId="{408FBC27-3C08-474B-96FC-24A7BAF44899}" sibTransId="{FFBC999E-A277-4A3B-AD02-C85FC1C1DF44}"/>
-    <dgm:cxn modelId="{F3A3C72E-D9AC-4A08-9938-81F7E4BC44ED}" type="presOf" srcId="{F8A5DA11-9B74-489C-A302-07D714D9CD5B}" destId="{D40C343F-E9CC-4AE5-8A3B-5C8E2B9D3B89}" srcOrd="0" destOrd="0" presId="urn:microsoft.com/office/officeart/2005/8/layout/radial4"/>
     <dgm:cxn modelId="{CB570A2F-4AC4-4DFF-BD1F-18A57C9ADFCE}" type="presOf" srcId="{3349D365-30DD-46AC-9A03-A8D9A349A53E}" destId="{D8484C4E-C79B-412F-9987-C2485DB65F27}" srcOrd="0" destOrd="0" presId="urn:microsoft.com/office/officeart/2005/8/layout/radial4"/>
-    <dgm:cxn modelId="{271925B9-B006-4FBB-AF8C-D8E63A32A165}" srcId="{86DB323A-73DC-4D24-A083-62E001995050}" destId="{7AAA3B19-FAC3-4C62-9309-B2DD2BE4A6BC}" srcOrd="1" destOrd="0" parTransId="{12C43100-EEF3-4FE1-AF2F-1BFF73DD3DB9}" sibTransId="{F2515C0F-FC73-44BE-A318-8DC9050BDBC3}"/>
-    <dgm:cxn modelId="{AB5F8FDB-9F37-41C2-83A5-57BDA5977CF2}" type="presOf" srcId="{7AAA3B19-FAC3-4C62-9309-B2DD2BE4A6BC}" destId="{E44501EB-77DB-44A8-9500-C483F073DCB5}" srcOrd="0" destOrd="0" presId="urn:microsoft.com/office/officeart/2005/8/layout/radial4"/>
     <dgm:cxn modelId="{69E4204F-7204-47A3-8ACB-1BF93741FCE3}" type="presParOf" srcId="{E0431947-E99A-4790-BD89-FBCD5D78E100}" destId="{35C2A99A-00D9-4873-BF91-57CC5CDD6420}" srcOrd="0" destOrd="0" presId="urn:microsoft.com/office/officeart/2005/8/layout/radial4"/>
     <dgm:cxn modelId="{A92947EF-2D05-44EA-BFAD-67E7614504ED}" type="presParOf" srcId="{E0431947-E99A-4790-BD89-FBCD5D78E100}" destId="{D40C343F-E9CC-4AE5-8A3B-5C8E2B9D3B89}" srcOrd="1" destOrd="0" presId="urn:microsoft.com/office/officeart/2005/8/layout/radial4"/>
     <dgm:cxn modelId="{9795D822-FF72-455E-BEE9-E38DC6473993}" type="presParOf" srcId="{E0431947-E99A-4790-BD89-FBCD5D78E100}" destId="{3E011A6B-79B3-4D46-95F0-A0F03807531F}" srcOrd="2" destOrd="0" presId="urn:microsoft.com/office/officeart/2005/8/layout/radial4"/>
@@ -9293,20 +9594,20 @@
       </dgm:t>
     </dgm:pt>
     <dgm:pt modelId="{D98431F8-145D-411B-97B7-C58B114C273B}">
-      <dgm:prSet phldrT="[Text]"/>
+      <dgm:prSet phldrT="[Text]" custT="1"/>
       <dgm:spPr/>
       <dgm:t>
         <a:bodyPr/>
         <a:lstStyle/>
         <a:p>
           <a:r>
-            <a:rPr lang="de-DE" dirty="0"/>
+            <a:rPr lang="de-DE" sz="2000" dirty="0"/>
             <a:t>Ziele</a:t>
           </a:r>
         </a:p>
         <a:p>
           <a:r>
-            <a:rPr lang="de-DE" dirty="0"/>
+            <a:rPr lang="de-DE" sz="2000" dirty="0"/>
             <a:t>(SMART)</a:t>
           </a:r>
         </a:p>
@@ -9335,17 +9636,17 @@
       </dgm:t>
     </dgm:pt>
     <dgm:pt modelId="{2870FDFC-9108-4E75-ABC9-66BC9917D334}">
-      <dgm:prSet phldrT="[Text]"/>
+      <dgm:prSet phldrT="[Text]" custT="1"/>
       <dgm:spPr/>
       <dgm:t>
         <a:bodyPr/>
         <a:lstStyle/>
         <a:p>
           <a:r>
-            <a:rPr lang="de-DE" dirty="0" err="1"/>
+            <a:rPr lang="de-DE" sz="2000" dirty="0" err="1"/>
             <a:t>Stakeholderanalyse</a:t>
           </a:r>
-          <a:endParaRPr lang="de-DE" dirty="0"/>
+          <a:endParaRPr lang="de-DE" sz="2000" dirty="0"/>
         </a:p>
       </dgm:t>
     </dgm:pt>
@@ -9372,16 +9673,17 @@
       </dgm:t>
     </dgm:pt>
     <dgm:pt modelId="{E3E65B24-862E-45E8-8D9F-5ECEA26D10E5}">
-      <dgm:prSet phldrT="[Text]"/>
+      <dgm:prSet phldrT="[Text]" custT="1"/>
       <dgm:spPr/>
       <dgm:t>
         <a:bodyPr/>
         <a:lstStyle/>
         <a:p>
           <a:r>
-            <a:rPr lang="de-DE" dirty="0"/>
-            <a:t>Risikoanalyse</a:t>
+            <a:rPr lang="de-DE" sz="2000" dirty="0" smtClean="0"/>
+            <a:t>Risiko-analyse</a:t>
           </a:r>
+          <a:endParaRPr lang="de-DE" sz="2000" dirty="0"/>
         </a:p>
       </dgm:t>
     </dgm:pt>
@@ -9408,70 +9710,135 @@
       </dgm:t>
     </dgm:pt>
     <dgm:pt modelId="{817715F9-38B5-40C6-BCAE-C70947E17366}">
-      <dgm:prSet phldrT="[Text]"/>
+      <dgm:prSet phldrT="[Text]" custT="1"/>
       <dgm:spPr/>
       <dgm:t>
         <a:bodyPr/>
         <a:lstStyle/>
         <a:p>
           <a:r>
-            <a:rPr lang="de-DE" dirty="0"/>
-            <a:t>Kommunikationskonzept</a:t>
+            <a:rPr lang="de-DE" sz="2000" dirty="0" err="1" smtClean="0"/>
+            <a:t>Kommuni</a:t>
           </a:r>
+          <a:r>
+            <a:rPr lang="de-DE" sz="2000" dirty="0" smtClean="0"/>
+            <a:t>-kations-konzept</a:t>
+          </a:r>
+          <a:endParaRPr lang="de-DE" sz="2000" dirty="0"/>
         </a:p>
       </dgm:t>
     </dgm:pt>
     <dgm:pt modelId="{643BAEC5-F7FC-4982-9407-1D7297DF5B88}" type="parTrans" cxnId="{A001E04C-A665-479A-B245-D47936816015}">
       <dgm:prSet/>
       <dgm:spPr/>
+      <dgm:t>
+        <a:bodyPr/>
+        <a:lstStyle/>
+        <a:p>
+          <a:endParaRPr lang="de-DE"/>
+        </a:p>
+      </dgm:t>
     </dgm:pt>
     <dgm:pt modelId="{32AD5A36-B82F-404B-BAA1-714B00A4D55F}" type="sibTrans" cxnId="{A001E04C-A665-479A-B245-D47936816015}">
       <dgm:prSet/>
       <dgm:spPr/>
+      <dgm:t>
+        <a:bodyPr/>
+        <a:lstStyle/>
+        <a:p>
+          <a:endParaRPr lang="de-DE"/>
+        </a:p>
+      </dgm:t>
     </dgm:pt>
     <dgm:pt modelId="{140F605A-B3EE-40AA-9BA0-F78384070D77}">
-      <dgm:prSet phldrT="[Text]"/>
+      <dgm:prSet phldrT="[Text]" custT="1"/>
       <dgm:spPr/>
       <dgm:t>
         <a:bodyPr/>
         <a:lstStyle/>
         <a:p>
           <a:r>
-            <a:rPr lang="de-DE" dirty="0"/>
-            <a:t>Projektauftrag</a:t>
+            <a:rPr lang="de-DE" sz="2000" dirty="0" smtClean="0"/>
+            <a:t>Projekt-auftrag</a:t>
           </a:r>
+          <a:endParaRPr lang="de-DE" sz="2000" dirty="0"/>
         </a:p>
       </dgm:t>
     </dgm:pt>
     <dgm:pt modelId="{7D7A7806-31E2-402B-9E67-0D7336DDA317}" type="parTrans" cxnId="{962B480B-7BAE-464B-B7DA-B021B9F66935}">
       <dgm:prSet/>
       <dgm:spPr/>
+      <dgm:t>
+        <a:bodyPr/>
+        <a:lstStyle/>
+        <a:p>
+          <a:endParaRPr lang="de-DE"/>
+        </a:p>
+      </dgm:t>
     </dgm:pt>
     <dgm:pt modelId="{F2435A7A-42AA-4012-80D3-9FD3095547E6}" type="sibTrans" cxnId="{962B480B-7BAE-464B-B7DA-B021B9F66935}">
       <dgm:prSet/>
       <dgm:spPr/>
+      <dgm:t>
+        <a:bodyPr/>
+        <a:lstStyle/>
+        <a:p>
+          <a:endParaRPr lang="de-DE"/>
+        </a:p>
+      </dgm:t>
     </dgm:pt>
     <dgm:pt modelId="{EADE6E56-A019-4A25-8A0D-21A1E3889A40}">
-      <dgm:prSet phldrT="[Text]"/>
+      <dgm:prSet phldrT="[Text]" custT="1"/>
       <dgm:spPr/>
       <dgm:t>
         <a:bodyPr/>
         <a:lstStyle/>
         <a:p>
           <a:r>
-            <a:rPr lang="de-DE" dirty="0"/>
-            <a:t>Erstellung des Phasenplans</a:t>
+            <a:rPr lang="de-DE" sz="2000" dirty="0"/>
+            <a:t>Erstellung</a:t>
           </a:r>
+          <a:r>
+            <a:rPr lang="de-DE" sz="900" dirty="0"/>
+            <a:t> </a:t>
+          </a:r>
+          <a:r>
+            <a:rPr lang="de-DE" sz="2000" dirty="0"/>
+            <a:t>des</a:t>
+          </a:r>
+          <a:r>
+            <a:rPr lang="de-DE" sz="900" dirty="0"/>
+            <a:t> </a:t>
+          </a:r>
+          <a:r>
+            <a:rPr lang="de-DE" sz="2000" dirty="0" smtClean="0"/>
+            <a:t>Phasen-plans</a:t>
+          </a:r>
+          <a:endParaRPr lang="de-DE" sz="2000" dirty="0"/>
         </a:p>
       </dgm:t>
     </dgm:pt>
     <dgm:pt modelId="{9A63B6ED-A5B9-4CAE-8060-FBB964693B54}" type="parTrans" cxnId="{BD993B81-1D95-4E91-8B5E-772D2D5F68DB}">
       <dgm:prSet/>
       <dgm:spPr/>
+      <dgm:t>
+        <a:bodyPr/>
+        <a:lstStyle/>
+        <a:p>
+          <a:endParaRPr lang="de-DE"/>
+        </a:p>
+      </dgm:t>
     </dgm:pt>
     <dgm:pt modelId="{D026890A-AC44-4D89-A54B-42146397CA84}" type="sibTrans" cxnId="{BD993B81-1D95-4E91-8B5E-772D2D5F68DB}">
       <dgm:prSet/>
       <dgm:spPr/>
+      <dgm:t>
+        <a:bodyPr/>
+        <a:lstStyle/>
+        <a:p>
+          <a:endParaRPr lang="de-DE"/>
+        </a:p>
+      </dgm:t>
     </dgm:pt>
     <dgm:pt modelId="{53F32F93-D485-4A97-BB68-5EAE4B20CB40}" type="pres">
       <dgm:prSet presAssocID="{7D65DA9D-956B-4051-9D98-A96D4823FBAC}" presName="cycle" presStyleCnt="0">
@@ -9483,14 +9850,35 @@
         </dgm:presLayoutVars>
       </dgm:prSet>
       <dgm:spPr/>
+      <dgm:t>
+        <a:bodyPr/>
+        <a:lstStyle/>
+        <a:p>
+          <a:endParaRPr lang="de-DE"/>
+        </a:p>
+      </dgm:t>
     </dgm:pt>
     <dgm:pt modelId="{E184A5B7-63C2-4557-8E63-B6A5EDCC8CAF}" type="pres">
       <dgm:prSet presAssocID="{0BB6C27D-9D64-4FFF-9836-096D8CD69F09}" presName="centerShape" presStyleLbl="node0" presStyleIdx="0" presStyleCnt="1"/>
       <dgm:spPr/>
+      <dgm:t>
+        <a:bodyPr/>
+        <a:lstStyle/>
+        <a:p>
+          <a:endParaRPr lang="de-DE"/>
+        </a:p>
+      </dgm:t>
     </dgm:pt>
     <dgm:pt modelId="{282AE00F-4040-46F4-8BB3-CB1B64E04DB0}" type="pres">
       <dgm:prSet presAssocID="{7D4D3F03-1F50-435B-B268-7188694FB2D2}" presName="parTrans" presStyleLbl="bgSibTrans2D1" presStyleIdx="0" presStyleCnt="6"/>
       <dgm:spPr/>
+      <dgm:t>
+        <a:bodyPr/>
+        <a:lstStyle/>
+        <a:p>
+          <a:endParaRPr lang="de-DE"/>
+        </a:p>
+      </dgm:t>
     </dgm:pt>
     <dgm:pt modelId="{C3182516-56F2-440F-B166-3583C6D09D31}" type="pres">
       <dgm:prSet presAssocID="{D98431F8-145D-411B-97B7-C58B114C273B}" presName="node" presStyleLbl="node1" presStyleIdx="0" presStyleCnt="6">
@@ -9499,6 +9887,13 @@
         </dgm:presLayoutVars>
       </dgm:prSet>
       <dgm:spPr/>
+      <dgm:t>
+        <a:bodyPr/>
+        <a:lstStyle/>
+        <a:p>
+          <a:endParaRPr lang="de-DE"/>
+        </a:p>
+      </dgm:t>
     </dgm:pt>
     <dgm:pt modelId="{7B3A17F7-D5AD-494C-93A1-48B5EA493EAD}" type="pres">
       <dgm:prSet presAssocID="{9A63B6ED-A5B9-4CAE-8060-FBB964693B54}" presName="parTrans" presStyleLbl="bgSibTrans2D1" presStyleIdx="1" presStyleCnt="6"/>
@@ -9511,10 +9906,24 @@
         </dgm:presLayoutVars>
       </dgm:prSet>
       <dgm:spPr/>
+      <dgm:t>
+        <a:bodyPr/>
+        <a:lstStyle/>
+        <a:p>
+          <a:endParaRPr lang="de-DE"/>
+        </a:p>
+      </dgm:t>
     </dgm:pt>
     <dgm:pt modelId="{278A8865-DEE9-4869-B899-9C09597E5FAB}" type="pres">
       <dgm:prSet presAssocID="{6A812863-3600-4A4C-98FB-3AA0BBC6063B}" presName="parTrans" presStyleLbl="bgSibTrans2D1" presStyleIdx="2" presStyleCnt="6"/>
       <dgm:spPr/>
+      <dgm:t>
+        <a:bodyPr/>
+        <a:lstStyle/>
+        <a:p>
+          <a:endParaRPr lang="de-DE"/>
+        </a:p>
+      </dgm:t>
     </dgm:pt>
     <dgm:pt modelId="{0E1D211E-4A4E-49D3-9A54-C1B6F40DCA68}" type="pres">
       <dgm:prSet presAssocID="{2870FDFC-9108-4E75-ABC9-66BC9917D334}" presName="node" presStyleLbl="node1" presStyleIdx="2" presStyleCnt="6">
@@ -9523,10 +9932,24 @@
         </dgm:presLayoutVars>
       </dgm:prSet>
       <dgm:spPr/>
+      <dgm:t>
+        <a:bodyPr/>
+        <a:lstStyle/>
+        <a:p>
+          <a:endParaRPr lang="de-DE"/>
+        </a:p>
+      </dgm:t>
     </dgm:pt>
     <dgm:pt modelId="{6F96D524-13AB-4EBA-BC23-B7CB2D5DC5C9}" type="pres">
       <dgm:prSet presAssocID="{68A1E429-C542-4B03-B8E8-430C11C2204F}" presName="parTrans" presStyleLbl="bgSibTrans2D1" presStyleIdx="3" presStyleCnt="6"/>
       <dgm:spPr/>
+      <dgm:t>
+        <a:bodyPr/>
+        <a:lstStyle/>
+        <a:p>
+          <a:endParaRPr lang="de-DE"/>
+        </a:p>
+      </dgm:t>
     </dgm:pt>
     <dgm:pt modelId="{C490B8C4-50D2-48E6-B0D1-CA9A70DDDFC0}" type="pres">
       <dgm:prSet presAssocID="{E3E65B24-862E-45E8-8D9F-5ECEA26D10E5}" presName="node" presStyleLbl="node1" presStyleIdx="3" presStyleCnt="6">
@@ -9535,6 +9958,13 @@
         </dgm:presLayoutVars>
       </dgm:prSet>
       <dgm:spPr/>
+      <dgm:t>
+        <a:bodyPr/>
+        <a:lstStyle/>
+        <a:p>
+          <a:endParaRPr lang="de-DE"/>
+        </a:p>
+      </dgm:t>
     </dgm:pt>
     <dgm:pt modelId="{820C0B7B-2FCE-48AC-872D-0263D6DFE988}" type="pres">
       <dgm:prSet presAssocID="{643BAEC5-F7FC-4982-9407-1D7297DF5B88}" presName="parTrans" presStyleLbl="bgSibTrans2D1" presStyleIdx="4" presStyleCnt="6"/>
@@ -9547,6 +9977,13 @@
         </dgm:presLayoutVars>
       </dgm:prSet>
       <dgm:spPr/>
+      <dgm:t>
+        <a:bodyPr/>
+        <a:lstStyle/>
+        <a:p>
+          <a:endParaRPr lang="de-DE"/>
+        </a:p>
+      </dgm:t>
     </dgm:pt>
     <dgm:pt modelId="{9C66E5C0-B7AC-4F67-9EB9-CBBD96993DA7}" type="pres">
       <dgm:prSet presAssocID="{7D7A7806-31E2-402B-9E67-0D7336DDA317}" presName="parTrans" presStyleLbl="bgSibTrans2D1" presStyleIdx="5" presStyleCnt="6"/>
@@ -9559,6 +9996,13 @@
         </dgm:presLayoutVars>
       </dgm:prSet>
       <dgm:spPr/>
+      <dgm:t>
+        <a:bodyPr/>
+        <a:lstStyle/>
+        <a:p>
+          <a:endParaRPr lang="de-DE"/>
+        </a:p>
+      </dgm:t>
     </dgm:pt>
   </dgm:ptLst>
   <dgm:cxnLst>
@@ -9797,14 +10241,35 @@
         </dgm:presLayoutVars>
       </dgm:prSet>
       <dgm:spPr/>
+      <dgm:t>
+        <a:bodyPr/>
+        <a:lstStyle/>
+        <a:p>
+          <a:endParaRPr lang="de-DE"/>
+        </a:p>
+      </dgm:t>
     </dgm:pt>
     <dgm:pt modelId="{B3117A50-E8BF-46CF-8C14-1EBC00723B95}" type="pres">
       <dgm:prSet presAssocID="{561FE539-A991-4074-885A-1650A5A7F96C}" presName="centerShape" presStyleLbl="node0" presStyleIdx="0" presStyleCnt="1"/>
       <dgm:spPr/>
+      <dgm:t>
+        <a:bodyPr/>
+        <a:lstStyle/>
+        <a:p>
+          <a:endParaRPr lang="de-DE"/>
+        </a:p>
+      </dgm:t>
     </dgm:pt>
     <dgm:pt modelId="{916F4358-E35E-46DA-B4A9-76278C3F2E84}" type="pres">
       <dgm:prSet presAssocID="{0755A32A-A3E2-44C4-B55F-4FD0ADC823D1}" presName="parTrans" presStyleLbl="bgSibTrans2D1" presStyleIdx="0" presStyleCnt="4"/>
       <dgm:spPr/>
+      <dgm:t>
+        <a:bodyPr/>
+        <a:lstStyle/>
+        <a:p>
+          <a:endParaRPr lang="de-DE"/>
+        </a:p>
+      </dgm:t>
     </dgm:pt>
     <dgm:pt modelId="{4103098B-A997-472B-AE53-C7509EE15D97}" type="pres">
       <dgm:prSet presAssocID="{400F5DA8-4C98-4BAB-935B-8936E214EAEA}" presName="node" presStyleLbl="node1" presStyleIdx="0" presStyleCnt="4">
@@ -9813,10 +10278,24 @@
         </dgm:presLayoutVars>
       </dgm:prSet>
       <dgm:spPr/>
+      <dgm:t>
+        <a:bodyPr/>
+        <a:lstStyle/>
+        <a:p>
+          <a:endParaRPr lang="de-DE"/>
+        </a:p>
+      </dgm:t>
     </dgm:pt>
     <dgm:pt modelId="{5CDA4CB5-1201-4B0F-B3B2-A76FD6526EBE}" type="pres">
       <dgm:prSet presAssocID="{231CE4A1-1617-48DC-87AB-9461C325FE79}" presName="parTrans" presStyleLbl="bgSibTrans2D1" presStyleIdx="1" presStyleCnt="4"/>
       <dgm:spPr/>
+      <dgm:t>
+        <a:bodyPr/>
+        <a:lstStyle/>
+        <a:p>
+          <a:endParaRPr lang="de-DE"/>
+        </a:p>
+      </dgm:t>
     </dgm:pt>
     <dgm:pt modelId="{6C7C2A48-1D7F-4831-ABF3-A0BF4AAB4C06}" type="pres">
       <dgm:prSet presAssocID="{913A5083-9666-4336-AF40-AC23BF226603}" presName="node" presStyleLbl="node1" presStyleIdx="1" presStyleCnt="4">
@@ -9825,10 +10304,24 @@
         </dgm:presLayoutVars>
       </dgm:prSet>
       <dgm:spPr/>
+      <dgm:t>
+        <a:bodyPr/>
+        <a:lstStyle/>
+        <a:p>
+          <a:endParaRPr lang="de-DE"/>
+        </a:p>
+      </dgm:t>
     </dgm:pt>
     <dgm:pt modelId="{4CBB4B81-FEE7-4AE1-8CD0-8C351405FCD7}" type="pres">
       <dgm:prSet presAssocID="{B6997B91-8B9F-48D2-8787-9DA110490AAE}" presName="parTrans" presStyleLbl="bgSibTrans2D1" presStyleIdx="2" presStyleCnt="4"/>
       <dgm:spPr/>
+      <dgm:t>
+        <a:bodyPr/>
+        <a:lstStyle/>
+        <a:p>
+          <a:endParaRPr lang="de-DE"/>
+        </a:p>
+      </dgm:t>
     </dgm:pt>
     <dgm:pt modelId="{0BE08164-50A1-47F4-BDB3-0D30DCF4D43E}" type="pres">
       <dgm:prSet presAssocID="{79CDD4FA-DC9B-42B9-98F8-7738CD66D167}" presName="node" presStyleLbl="node1" presStyleIdx="2" presStyleCnt="4">
@@ -9837,6 +10330,13 @@
         </dgm:presLayoutVars>
       </dgm:prSet>
       <dgm:spPr/>
+      <dgm:t>
+        <a:bodyPr/>
+        <a:lstStyle/>
+        <a:p>
+          <a:endParaRPr lang="de-DE"/>
+        </a:p>
+      </dgm:t>
     </dgm:pt>
     <dgm:pt modelId="{86DD9E8C-AA05-4B70-B46F-4D4FE83ED5B3}" type="pres">
       <dgm:prSet presAssocID="{8DB662FB-25C2-4EE1-AFB2-729FD79C60D5}" presName="parTrans" presStyleLbl="bgSibTrans2D1" presStyleIdx="3" presStyleCnt="4"/>
@@ -9849,6 +10349,13 @@
         </dgm:presLayoutVars>
       </dgm:prSet>
       <dgm:spPr/>
+      <dgm:t>
+        <a:bodyPr/>
+        <a:lstStyle/>
+        <a:p>
+          <a:endParaRPr lang="de-DE"/>
+        </a:p>
+      </dgm:t>
     </dgm:pt>
   </dgm:ptLst>
   <dgm:cxnLst>
@@ -9938,16 +10445,21 @@
       </dgm:t>
     </dgm:pt>
     <dgm:pt modelId="{11688FA9-63E0-469F-8BD0-088A07034869}">
-      <dgm:prSet phldrT="[Text]"/>
+      <dgm:prSet phldrT="[Text]" custT="1"/>
       <dgm:spPr/>
       <dgm:t>
         <a:bodyPr/>
         <a:lstStyle/>
         <a:p>
           <a:r>
-            <a:rPr lang="de-DE" dirty="0"/>
-            <a:t>Qualitätsmanagement</a:t>
+            <a:rPr lang="de-DE" sz="2000" dirty="0" smtClean="0"/>
+            <a:t>Qualitäts- </a:t>
           </a:r>
+          <a:r>
+            <a:rPr lang="de-DE" sz="2000" dirty="0" err="1" smtClean="0"/>
+            <a:t>management</a:t>
+          </a:r>
+          <a:endParaRPr lang="de-DE" sz="2000" dirty="0"/>
         </a:p>
       </dgm:t>
     </dgm:pt>
@@ -9974,14 +10486,14 @@
       </dgm:t>
     </dgm:pt>
     <dgm:pt modelId="{D05D7831-E90F-48BB-8B63-A5409E6846C0}">
-      <dgm:prSet phldrT="[Text]"/>
+      <dgm:prSet phldrT="[Text]" custT="1"/>
       <dgm:spPr/>
       <dgm:t>
         <a:bodyPr/>
         <a:lstStyle/>
         <a:p>
           <a:r>
-            <a:rPr lang="de-DE" dirty="0"/>
+            <a:rPr lang="de-DE" sz="2000" dirty="0"/>
             <a:t>Qualitätskreisel</a:t>
           </a:r>
         </a:p>
@@ -10010,28 +10522,28 @@
       </dgm:t>
     </dgm:pt>
     <dgm:pt modelId="{9159C01F-816B-46CA-A151-ACCC50DCBC1E}">
-      <dgm:prSet phldrT="[Text]"/>
+      <dgm:prSet phldrT="[Text]" custT="1"/>
       <dgm:spPr/>
       <dgm:t>
         <a:bodyPr/>
         <a:lstStyle/>
         <a:p>
           <a:r>
-            <a:rPr lang="de-DE" dirty="0"/>
+            <a:rPr lang="de-DE" sz="2000" dirty="0"/>
             <a:t>Analyse von Fehlern</a:t>
           </a:r>
         </a:p>
         <a:p>
           <a:r>
-            <a:rPr lang="de-DE" dirty="0"/>
+            <a:rPr lang="de-DE" sz="2000" dirty="0"/>
             <a:t>(z.B. </a:t>
           </a:r>
           <a:r>
-            <a:rPr lang="de-DE" dirty="0" err="1"/>
+            <a:rPr lang="de-DE" sz="2000" dirty="0" err="1"/>
             <a:t>Ishikawa</a:t>
           </a:r>
           <a:r>
-            <a:rPr lang="de-DE" dirty="0"/>
+            <a:rPr lang="de-DE" sz="2000" dirty="0"/>
             <a:t> Diagramm)</a:t>
           </a:r>
         </a:p>
@@ -10060,16 +10572,17 @@
       </dgm:t>
     </dgm:pt>
     <dgm:pt modelId="{4EFD4A64-F8B4-40D2-9EFF-B46DD1A9D596}">
-      <dgm:prSet phldrT="[Text]"/>
+      <dgm:prSet phldrT="[Text]" custT="1"/>
       <dgm:spPr/>
       <dgm:t>
         <a:bodyPr/>
         <a:lstStyle/>
         <a:p>
           <a:r>
-            <a:rPr lang="de-DE" dirty="0"/>
-            <a:t>Fortschrittsermittlungen</a:t>
+            <a:rPr lang="de-DE" sz="2000" dirty="0" smtClean="0"/>
+            <a:t>Fortschritts-ermittlungen</a:t>
           </a:r>
+          <a:endParaRPr lang="de-DE" sz="2000" dirty="0"/>
         </a:p>
       </dgm:t>
     </dgm:pt>
@@ -10105,14 +10618,35 @@
         </dgm:presLayoutVars>
       </dgm:prSet>
       <dgm:spPr/>
+      <dgm:t>
+        <a:bodyPr/>
+        <a:lstStyle/>
+        <a:p>
+          <a:endParaRPr lang="de-DE"/>
+        </a:p>
+      </dgm:t>
     </dgm:pt>
     <dgm:pt modelId="{C43696EE-3BB3-4938-A44B-A95E856EDC76}" type="pres">
       <dgm:prSet presAssocID="{7D64BD01-F2F3-42B4-A85B-F6B7650D2A15}" presName="centerShape" presStyleLbl="node0" presStyleIdx="0" presStyleCnt="1"/>
       <dgm:spPr/>
+      <dgm:t>
+        <a:bodyPr/>
+        <a:lstStyle/>
+        <a:p>
+          <a:endParaRPr lang="de-DE"/>
+        </a:p>
+      </dgm:t>
     </dgm:pt>
     <dgm:pt modelId="{9715E5A8-2F5C-429F-A697-3013872FF4C6}" type="pres">
       <dgm:prSet presAssocID="{6E06F5D9-3C1E-4948-A43F-99770C631C27}" presName="parTrans" presStyleLbl="bgSibTrans2D1" presStyleIdx="0" presStyleCnt="4"/>
       <dgm:spPr/>
+      <dgm:t>
+        <a:bodyPr/>
+        <a:lstStyle/>
+        <a:p>
+          <a:endParaRPr lang="de-DE"/>
+        </a:p>
+      </dgm:t>
     </dgm:pt>
     <dgm:pt modelId="{A59FAD39-B0DF-4A5F-8563-BA88AC477DAD}" type="pres">
       <dgm:prSet presAssocID="{11688FA9-63E0-469F-8BD0-088A07034869}" presName="node" presStyleLbl="node1" presStyleIdx="0" presStyleCnt="4">
@@ -10121,10 +10655,24 @@
         </dgm:presLayoutVars>
       </dgm:prSet>
       <dgm:spPr/>
+      <dgm:t>
+        <a:bodyPr/>
+        <a:lstStyle/>
+        <a:p>
+          <a:endParaRPr lang="de-DE"/>
+        </a:p>
+      </dgm:t>
     </dgm:pt>
     <dgm:pt modelId="{1AD8D178-3145-4916-82B1-8D32FB4B90BD}" type="pres">
       <dgm:prSet presAssocID="{F0059158-5592-4DB2-9716-A3AF52AAEA27}" presName="parTrans" presStyleLbl="bgSibTrans2D1" presStyleIdx="1" presStyleCnt="4"/>
       <dgm:spPr/>
+      <dgm:t>
+        <a:bodyPr/>
+        <a:lstStyle/>
+        <a:p>
+          <a:endParaRPr lang="de-DE"/>
+        </a:p>
+      </dgm:t>
     </dgm:pt>
     <dgm:pt modelId="{B4F55543-BC9D-4791-AE45-19F06CE380B9}" type="pres">
       <dgm:prSet presAssocID="{D05D7831-E90F-48BB-8B63-A5409E6846C0}" presName="node" presStyleLbl="node1" presStyleIdx="1" presStyleCnt="4">
@@ -10133,10 +10681,24 @@
         </dgm:presLayoutVars>
       </dgm:prSet>
       <dgm:spPr/>
+      <dgm:t>
+        <a:bodyPr/>
+        <a:lstStyle/>
+        <a:p>
+          <a:endParaRPr lang="de-DE"/>
+        </a:p>
+      </dgm:t>
     </dgm:pt>
     <dgm:pt modelId="{1C8674FB-CF45-4C42-9F46-DD377618B6FB}" type="pres">
       <dgm:prSet presAssocID="{0F0138D7-79C2-4134-A99E-2B5893B66DEB}" presName="parTrans" presStyleLbl="bgSibTrans2D1" presStyleIdx="2" presStyleCnt="4"/>
       <dgm:spPr/>
+      <dgm:t>
+        <a:bodyPr/>
+        <a:lstStyle/>
+        <a:p>
+          <a:endParaRPr lang="de-DE"/>
+        </a:p>
+      </dgm:t>
     </dgm:pt>
     <dgm:pt modelId="{1D47C688-4EFB-4E18-9996-DEFE508D22D5}" type="pres">
       <dgm:prSet presAssocID="{9159C01F-816B-46CA-A151-ACCC50DCBC1E}" presName="node" presStyleLbl="node1" presStyleIdx="2" presStyleCnt="4">
@@ -10145,10 +10707,24 @@
         </dgm:presLayoutVars>
       </dgm:prSet>
       <dgm:spPr/>
+      <dgm:t>
+        <a:bodyPr/>
+        <a:lstStyle/>
+        <a:p>
+          <a:endParaRPr lang="de-DE"/>
+        </a:p>
+      </dgm:t>
     </dgm:pt>
     <dgm:pt modelId="{D96C1190-EB41-4103-9237-B84B7933F0EB}" type="pres">
       <dgm:prSet presAssocID="{7BC0CB46-75A2-421E-BC9A-C00622759EEE}" presName="parTrans" presStyleLbl="bgSibTrans2D1" presStyleIdx="3" presStyleCnt="4"/>
       <dgm:spPr/>
+      <dgm:t>
+        <a:bodyPr/>
+        <a:lstStyle/>
+        <a:p>
+          <a:endParaRPr lang="de-DE"/>
+        </a:p>
+      </dgm:t>
     </dgm:pt>
     <dgm:pt modelId="{FB1504C7-8869-42E3-873F-722A851BA5D6}" type="pres">
       <dgm:prSet presAssocID="{4EFD4A64-F8B4-40D2-9EFF-B46DD1A9D596}" presName="node" presStyleLbl="node1" presStyleIdx="3" presStyleCnt="4">
@@ -10157,6 +10733,13 @@
         </dgm:presLayoutVars>
       </dgm:prSet>
       <dgm:spPr/>
+      <dgm:t>
+        <a:bodyPr/>
+        <a:lstStyle/>
+        <a:p>
+          <a:endParaRPr lang="de-DE"/>
+        </a:p>
+      </dgm:t>
     </dgm:pt>
   </dgm:ptLst>
   <dgm:cxnLst>
@@ -10246,14 +10829,14 @@
       </dgm:t>
     </dgm:pt>
     <dgm:pt modelId="{CC8E65FC-ABD3-44F7-BAC3-94A5D4FB8480}">
-      <dgm:prSet phldrT="[Text]"/>
+      <dgm:prSet phldrT="[Text]" custT="1"/>
       <dgm:spPr/>
       <dgm:t>
         <a:bodyPr/>
         <a:lstStyle/>
         <a:p>
           <a:r>
-            <a:rPr lang="de-DE" dirty="0"/>
+            <a:rPr lang="de-DE" sz="2000" dirty="0"/>
             <a:t>Abnahme</a:t>
           </a:r>
         </a:p>
@@ -10282,16 +10865,17 @@
       </dgm:t>
     </dgm:pt>
     <dgm:pt modelId="{C519DA5C-901A-4348-99FF-5F94DB583CDE}">
-      <dgm:prSet phldrT="[Text]"/>
+      <dgm:prSet phldrT="[Text]" custT="1"/>
       <dgm:spPr/>
       <dgm:t>
         <a:bodyPr/>
         <a:lstStyle/>
         <a:p>
           <a:r>
-            <a:rPr lang="de-DE" dirty="0"/>
-            <a:t>Abschlussanalyse</a:t>
+            <a:rPr lang="de-DE" sz="2000" dirty="0" smtClean="0"/>
+            <a:t>Abschluss-analyse</a:t>
           </a:r>
+          <a:endParaRPr lang="de-DE" sz="2000" dirty="0"/>
         </a:p>
       </dgm:t>
     </dgm:pt>
@@ -10318,14 +10902,14 @@
       </dgm:t>
     </dgm:pt>
     <dgm:pt modelId="{83103570-1240-4290-82BE-9938133E4F97}">
-      <dgm:prSet phldrT="[Text]"/>
+      <dgm:prSet phldrT="[Text]" custT="1"/>
       <dgm:spPr/>
       <dgm:t>
         <a:bodyPr/>
         <a:lstStyle/>
         <a:p>
           <a:r>
-            <a:rPr lang="de-DE" dirty="0"/>
+            <a:rPr lang="de-DE" sz="2000" dirty="0"/>
             <a:t>Sicherung der Erfahrung</a:t>
           </a:r>
         </a:p>
@@ -10363,14 +10947,35 @@
         </dgm:presLayoutVars>
       </dgm:prSet>
       <dgm:spPr/>
+      <dgm:t>
+        <a:bodyPr/>
+        <a:lstStyle/>
+        <a:p>
+          <a:endParaRPr lang="de-DE"/>
+        </a:p>
+      </dgm:t>
     </dgm:pt>
     <dgm:pt modelId="{23779AC3-66F7-4A58-BE25-420133D06B36}" type="pres">
       <dgm:prSet presAssocID="{02483F89-4C27-41F5-A76C-D2D4DAAE3679}" presName="centerShape" presStyleLbl="node0" presStyleIdx="0" presStyleCnt="1"/>
       <dgm:spPr/>
+      <dgm:t>
+        <a:bodyPr/>
+        <a:lstStyle/>
+        <a:p>
+          <a:endParaRPr lang="de-DE"/>
+        </a:p>
+      </dgm:t>
     </dgm:pt>
     <dgm:pt modelId="{3CFC6120-F539-453E-BC6A-EBD4FB196DD0}" type="pres">
       <dgm:prSet presAssocID="{DF6631C4-475C-4FDD-9B09-523D372E0CAC}" presName="parTrans" presStyleLbl="bgSibTrans2D1" presStyleIdx="0" presStyleCnt="3"/>
       <dgm:spPr/>
+      <dgm:t>
+        <a:bodyPr/>
+        <a:lstStyle/>
+        <a:p>
+          <a:endParaRPr lang="de-DE"/>
+        </a:p>
+      </dgm:t>
     </dgm:pt>
     <dgm:pt modelId="{0FDFDA14-E88F-49AA-BC77-EEA504D8CDB7}" type="pres">
       <dgm:prSet presAssocID="{CC8E65FC-ABD3-44F7-BAC3-94A5D4FB8480}" presName="node" presStyleLbl="node1" presStyleIdx="0" presStyleCnt="3">
@@ -10379,10 +10984,24 @@
         </dgm:presLayoutVars>
       </dgm:prSet>
       <dgm:spPr/>
+      <dgm:t>
+        <a:bodyPr/>
+        <a:lstStyle/>
+        <a:p>
+          <a:endParaRPr lang="de-DE"/>
+        </a:p>
+      </dgm:t>
     </dgm:pt>
     <dgm:pt modelId="{583812C0-2B77-4222-8FC8-25253B621E0B}" type="pres">
       <dgm:prSet presAssocID="{6E3344F1-AE0A-4EAB-B69C-B14D64B73084}" presName="parTrans" presStyleLbl="bgSibTrans2D1" presStyleIdx="1" presStyleCnt="3"/>
       <dgm:spPr/>
+      <dgm:t>
+        <a:bodyPr/>
+        <a:lstStyle/>
+        <a:p>
+          <a:endParaRPr lang="de-DE"/>
+        </a:p>
+      </dgm:t>
     </dgm:pt>
     <dgm:pt modelId="{DCE777A3-A8A4-40DE-928A-171D85C9E949}" type="pres">
       <dgm:prSet presAssocID="{C519DA5C-901A-4348-99FF-5F94DB583CDE}" presName="node" presStyleLbl="node1" presStyleIdx="1" presStyleCnt="3">
@@ -10391,10 +11010,24 @@
         </dgm:presLayoutVars>
       </dgm:prSet>
       <dgm:spPr/>
+      <dgm:t>
+        <a:bodyPr/>
+        <a:lstStyle/>
+        <a:p>
+          <a:endParaRPr lang="de-DE"/>
+        </a:p>
+      </dgm:t>
     </dgm:pt>
     <dgm:pt modelId="{B5946B51-92E0-4161-A645-9D077247E9E9}" type="pres">
       <dgm:prSet presAssocID="{8ED2DC39-96AB-4DEE-81FB-D11839FD821D}" presName="parTrans" presStyleLbl="bgSibTrans2D1" presStyleIdx="2" presStyleCnt="3"/>
       <dgm:spPr/>
+      <dgm:t>
+        <a:bodyPr/>
+        <a:lstStyle/>
+        <a:p>
+          <a:endParaRPr lang="de-DE"/>
+        </a:p>
+      </dgm:t>
     </dgm:pt>
     <dgm:pt modelId="{3E452352-2B4A-4802-A7F6-C337B1825884}" type="pres">
       <dgm:prSet presAssocID="{83103570-1240-4290-82BE-9938133E4F97}" presName="node" presStyleLbl="node1" presStyleIdx="2" presStyleCnt="3">
@@ -10403,6 +11036,13 @@
         </dgm:presLayoutVars>
       </dgm:prSet>
       <dgm:spPr/>
+      <dgm:t>
+        <a:bodyPr/>
+        <a:lstStyle/>
+        <a:p>
+          <a:endParaRPr lang="de-DE"/>
+        </a:p>
+      </dgm:t>
     </dgm:pt>
   </dgm:ptLst>
   <dgm:cxnLst>
@@ -10451,10 +11091,10 @@
         <a:lstStyle/>
         <a:p>
           <a:r>
-            <a:rPr lang="de-DE" sz="1400" dirty="0" err="1"/>
-            <a:t>Responsivität</a:t>
+            <a:rPr lang="de-DE" sz="1800" dirty="0" err="1" smtClean="0"/>
+            <a:t>Respon-sivität</a:t>
           </a:r>
-          <a:endParaRPr lang="de-DE" sz="1400" dirty="0"/>
+          <a:endParaRPr lang="de-DE" sz="1800" dirty="0"/>
         </a:p>
       </dgm:t>
     </dgm:pt>
@@ -10488,9 +11128,10 @@
         <a:lstStyle/>
         <a:p>
           <a:r>
-            <a:rPr lang="de-DE" sz="1400" dirty="0"/>
-            <a:t>Zeitgerechtes Aussehen</a:t>
+            <a:rPr lang="de-DE" sz="1800" dirty="0" smtClean="0"/>
+            <a:t>Zeitgemäße Optik</a:t>
           </a:r>
+          <a:endParaRPr lang="de-DE" sz="1800" dirty="0"/>
         </a:p>
       </dgm:t>
     </dgm:pt>
@@ -10524,8 +11165,12 @@
         <a:lstStyle/>
         <a:p>
           <a:r>
-            <a:rPr lang="de-DE" sz="1400" dirty="0"/>
-            <a:t>Wartbares System</a:t>
+            <a:rPr lang="de-DE" sz="1800" dirty="0" smtClean="0"/>
+            <a:t>Wartbares </a:t>
+          </a:r>
+          <a:r>
+            <a:rPr lang="de-DE" sz="1800" dirty="0"/>
+            <a:t>System</a:t>
           </a:r>
         </a:p>
       </dgm:t>
@@ -10560,14 +11205,14 @@
         <a:lstStyle/>
         <a:p>
           <a:r>
-            <a:rPr lang="de-DE" sz="1400" dirty="0"/>
-            <a:t>Auswerte-möglich-</a:t>
+            <a:rPr lang="de-DE" sz="1800" dirty="0" smtClean="0"/>
+            <a:t>Auswertungs-möglich-</a:t>
           </a:r>
           <a:r>
-            <a:rPr lang="de-DE" sz="1400" dirty="0" err="1"/>
+            <a:rPr lang="de-DE" sz="1800" dirty="0" err="1" smtClean="0"/>
             <a:t>keiten</a:t>
           </a:r>
-          <a:endParaRPr lang="de-DE" sz="1400" dirty="0"/>
+          <a:endParaRPr lang="de-DE" sz="1800" dirty="0"/>
         </a:p>
       </dgm:t>
     </dgm:pt>
@@ -10601,9 +11246,22 @@
         <a:lstStyle/>
         <a:p>
           <a:r>
-            <a:rPr lang="de-DE" sz="1400" dirty="0"/>
-            <a:t>Berechtigungs-konzept</a:t>
+            <a:rPr lang="de-DE" sz="1800" dirty="0" err="1" smtClean="0"/>
+            <a:t>Berecht</a:t>
           </a:r>
+          <a:r>
+            <a:rPr lang="de-DE" sz="1800" dirty="0" smtClean="0"/>
+            <a:t>-</a:t>
+          </a:r>
+          <a:r>
+            <a:rPr lang="de-DE" sz="1800" dirty="0" err="1" smtClean="0"/>
+            <a:t>igungs</a:t>
+          </a:r>
+          <a:r>
+            <a:rPr lang="de-DE" sz="1800" dirty="0" smtClean="0"/>
+            <a:t>-konzept</a:t>
+          </a:r>
+          <a:endParaRPr lang="de-DE" sz="1800" dirty="0"/>
         </a:p>
       </dgm:t>
     </dgm:pt>
@@ -10637,7 +11295,7 @@
         <a:lstStyle/>
         <a:p>
           <a:r>
-            <a:rPr lang="de-DE" sz="1400" dirty="0"/>
+            <a:rPr lang="de-DE" sz="1800" dirty="0"/>
             <a:t>Genehmigungs-konzept</a:t>
           </a:r>
         </a:p>
@@ -10693,6 +11351,13 @@
         </dgm:presLayoutVars>
       </dgm:prSet>
       <dgm:spPr/>
+      <dgm:t>
+        <a:bodyPr/>
+        <a:lstStyle/>
+        <a:p>
+          <a:endParaRPr lang="de-DE"/>
+        </a:p>
+      </dgm:t>
     </dgm:pt>
     <dgm:pt modelId="{203A7782-CCF4-41E2-9634-123157B86D13}" type="pres">
       <dgm:prSet presAssocID="{CC6CBDEE-60C3-4661-B8E4-89B8D030373F}" presName="circleA" presStyleLbl="node1" presStyleIdx="0" presStyleCnt="6"/>
@@ -10717,6 +11382,13 @@
         </dgm:presLayoutVars>
       </dgm:prSet>
       <dgm:spPr/>
+      <dgm:t>
+        <a:bodyPr/>
+        <a:lstStyle/>
+        <a:p>
+          <a:endParaRPr lang="de-DE"/>
+        </a:p>
+      </dgm:t>
     </dgm:pt>
     <dgm:pt modelId="{4813D171-4C66-49AB-BC22-E316ABD695EC}" type="pres">
       <dgm:prSet presAssocID="{095C0132-3802-4D7D-98D1-6DA387EE4A21}" presName="circleB" presStyleLbl="node1" presStyleIdx="1" presStyleCnt="6"/>
@@ -10741,6 +11413,13 @@
         </dgm:presLayoutVars>
       </dgm:prSet>
       <dgm:spPr/>
+      <dgm:t>
+        <a:bodyPr/>
+        <a:lstStyle/>
+        <a:p>
+          <a:endParaRPr lang="de-DE"/>
+        </a:p>
+      </dgm:t>
     </dgm:pt>
     <dgm:pt modelId="{DA06B61F-0654-4746-A058-664127D0D43C}" type="pres">
       <dgm:prSet presAssocID="{3802C7D7-5C6D-4841-B248-16900F5B4D23}" presName="circleA" presStyleLbl="node1" presStyleIdx="2" presStyleCnt="6"/>
@@ -10765,6 +11444,13 @@
         </dgm:presLayoutVars>
       </dgm:prSet>
       <dgm:spPr/>
+      <dgm:t>
+        <a:bodyPr/>
+        <a:lstStyle/>
+        <a:p>
+          <a:endParaRPr lang="de-DE"/>
+        </a:p>
+      </dgm:t>
     </dgm:pt>
     <dgm:pt modelId="{7E2E8543-0D7C-4008-BD8C-3D256F7C25F5}" type="pres">
       <dgm:prSet presAssocID="{6D278E1D-1986-409C-950A-4B65D0BB53BA}" presName="circleB" presStyleLbl="node1" presStyleIdx="3" presStyleCnt="6"/>
@@ -10789,6 +11475,13 @@
         </dgm:presLayoutVars>
       </dgm:prSet>
       <dgm:spPr/>
+      <dgm:t>
+        <a:bodyPr/>
+        <a:lstStyle/>
+        <a:p>
+          <a:endParaRPr lang="de-DE"/>
+        </a:p>
+      </dgm:t>
     </dgm:pt>
     <dgm:pt modelId="{7CB73C22-AC05-45AC-AFB7-61AE3E3320DA}" type="pres">
       <dgm:prSet presAssocID="{0B513B94-3213-41A1-AEFE-52232191C456}" presName="circleA" presStyleLbl="node1" presStyleIdx="4" presStyleCnt="6"/>
@@ -10813,6 +11506,13 @@
         </dgm:presLayoutVars>
       </dgm:prSet>
       <dgm:spPr/>
+      <dgm:t>
+        <a:bodyPr/>
+        <a:lstStyle/>
+        <a:p>
+          <a:endParaRPr lang="de-DE"/>
+        </a:p>
+      </dgm:t>
     </dgm:pt>
     <dgm:pt modelId="{8977AAD3-F2CC-4EFA-850E-13D2EF96D176}" type="pres">
       <dgm:prSet presAssocID="{B0625C4A-9A50-414B-9344-808CA61DF517}" presName="circleB" presStyleLbl="node1" presStyleIdx="5" presStyleCnt="6"/>
@@ -11002,9 +11702,10 @@
         <a:lstStyle/>
         <a:p>
           <a:r>
-            <a:rPr lang="de-DE" sz="1200" b="1" dirty="0"/>
-            <a:t>Implementierung</a:t>
+            <a:rPr lang="de-DE" sz="2000" b="1" dirty="0" err="1" smtClean="0"/>
+            <a:t>Imple-men-tierung</a:t>
           </a:r>
+          <a:endParaRPr lang="de-DE" sz="2000" b="1" dirty="0"/>
         </a:p>
       </dgm:t>
     </dgm:pt>
@@ -11130,6 +11831,13 @@
         </dgm:presLayoutVars>
       </dgm:prSet>
       <dgm:spPr/>
+      <dgm:t>
+        <a:bodyPr/>
+        <a:lstStyle/>
+        <a:p>
+          <a:endParaRPr lang="de-DE"/>
+        </a:p>
+      </dgm:t>
     </dgm:pt>
     <dgm:pt modelId="{6E7284F9-4A79-4A07-850F-77B26DA11FDE}" type="pres">
       <dgm:prSet presAssocID="{F425A819-C6B6-416B-A3EE-0ADBCC80AE4C}" presName="circleA" presStyleLbl="node1" presStyleIdx="0" presStyleCnt="6"/>
@@ -11154,6 +11862,13 @@
         </dgm:presLayoutVars>
       </dgm:prSet>
       <dgm:spPr/>
+      <dgm:t>
+        <a:bodyPr/>
+        <a:lstStyle/>
+        <a:p>
+          <a:endParaRPr lang="de-DE"/>
+        </a:p>
+      </dgm:t>
     </dgm:pt>
     <dgm:pt modelId="{4920143E-C946-44ED-815B-983F02B8DDE0}" type="pres">
       <dgm:prSet presAssocID="{FBC29A02-6A70-491D-AAF1-BDB9EFD345F1}" presName="circleB" presStyleLbl="node1" presStyleIdx="1" presStyleCnt="6"/>
@@ -11178,6 +11893,13 @@
         </dgm:presLayoutVars>
       </dgm:prSet>
       <dgm:spPr/>
+      <dgm:t>
+        <a:bodyPr/>
+        <a:lstStyle/>
+        <a:p>
+          <a:endParaRPr lang="de-DE"/>
+        </a:p>
+      </dgm:t>
     </dgm:pt>
     <dgm:pt modelId="{A19AA833-E368-481A-B405-B15DAA8C9FB5}" type="pres">
       <dgm:prSet presAssocID="{F6F416EC-AC70-43E5-855A-EEB792133AE0}" presName="circleA" presStyleLbl="node1" presStyleIdx="2" presStyleCnt="6"/>
@@ -11202,6 +11924,13 @@
         </dgm:presLayoutVars>
       </dgm:prSet>
       <dgm:spPr/>
+      <dgm:t>
+        <a:bodyPr/>
+        <a:lstStyle/>
+        <a:p>
+          <a:endParaRPr lang="de-DE"/>
+        </a:p>
+      </dgm:t>
     </dgm:pt>
     <dgm:pt modelId="{07DA2D36-211C-46BA-8554-0CD0D3B05FA7}" type="pres">
       <dgm:prSet presAssocID="{610571DF-179E-4DF9-BE61-4E05F41788F0}" presName="circleB" presStyleLbl="node1" presStyleIdx="3" presStyleCnt="6"/>
@@ -11226,6 +11955,13 @@
         </dgm:presLayoutVars>
       </dgm:prSet>
       <dgm:spPr/>
+      <dgm:t>
+        <a:bodyPr/>
+        <a:lstStyle/>
+        <a:p>
+          <a:endParaRPr lang="de-DE"/>
+        </a:p>
+      </dgm:t>
     </dgm:pt>
     <dgm:pt modelId="{0F7D4D9C-D024-4B50-9CEF-A7B9BED1A59E}" type="pres">
       <dgm:prSet presAssocID="{8A9AFEC9-F5C6-4A80-BDB1-ED904F198DEB}" presName="circleA" presStyleLbl="node1" presStyleIdx="4" presStyleCnt="6"/>
@@ -11250,6 +11986,13 @@
         </dgm:presLayoutVars>
       </dgm:prSet>
       <dgm:spPr/>
+      <dgm:t>
+        <a:bodyPr/>
+        <a:lstStyle/>
+        <a:p>
+          <a:endParaRPr lang="de-DE"/>
+        </a:p>
+      </dgm:t>
     </dgm:pt>
     <dgm:pt modelId="{780E75BD-E781-4CA5-8721-23933D136A97}" type="pres">
       <dgm:prSet presAssocID="{F53AFE4B-A238-4100-A800-B446C49863A0}" presName="circleB" presStyleLbl="node1" presStyleIdx="5" presStyleCnt="6"/>
@@ -11627,7 +12370,7 @@
         </a:bodyPr>
         <a:lstStyle/>
         <a:p>
-          <a:pPr marL="0" lvl="0" indent="0" algn="ctr" defTabSz="1200150">
+          <a:pPr lvl="0" algn="ctr" defTabSz="1200150">
             <a:lnSpc>
               <a:spcPct val="90000"/>
             </a:lnSpc>
@@ -11637,7 +12380,6 @@
             <a:spcAft>
               <a:spcPct val="35000"/>
             </a:spcAft>
-            <a:buNone/>
           </a:pPr>
           <a:r>
             <a:rPr lang="de-DE" sz="2700" kern="1200" dirty="0"/>
@@ -11704,7 +12446,7 @@
         </a:bodyPr>
         <a:lstStyle/>
         <a:p>
-          <a:pPr marL="0" lvl="0" indent="0" algn="r" defTabSz="977900">
+          <a:pPr lvl="0" algn="r" defTabSz="977900">
             <a:lnSpc>
               <a:spcPct val="90000"/>
             </a:lnSpc>
@@ -11714,7 +12456,6 @@
             <a:spcAft>
               <a:spcPct val="35000"/>
             </a:spcAft>
-            <a:buNone/>
           </a:pPr>
           <a:r>
             <a:rPr lang="de-DE" sz="2200" kern="1200" dirty="0"/>
@@ -11782,7 +12523,7 @@
         </a:bodyPr>
         <a:lstStyle/>
         <a:p>
-          <a:pPr marL="0" lvl="0" indent="0" algn="ctr" defTabSz="1200150">
+          <a:pPr lvl="0" algn="ctr" defTabSz="1200150">
             <a:lnSpc>
               <a:spcPct val="90000"/>
             </a:lnSpc>
@@ -11792,7 +12533,6 @@
             <a:spcAft>
               <a:spcPct val="35000"/>
             </a:spcAft>
-            <a:buNone/>
           </a:pPr>
           <a:r>
             <a:rPr lang="de-DE" sz="2700" kern="1200" dirty="0"/>
@@ -11859,7 +12599,7 @@
         </a:bodyPr>
         <a:lstStyle/>
         <a:p>
-          <a:pPr marL="0" lvl="0" indent="0" algn="r" defTabSz="933450">
+          <a:pPr lvl="0" algn="r" defTabSz="933450">
             <a:lnSpc>
               <a:spcPct val="90000"/>
             </a:lnSpc>
@@ -11869,7 +12609,6 @@
             <a:spcAft>
               <a:spcPct val="35000"/>
             </a:spcAft>
-            <a:buNone/>
           </a:pPr>
           <a:r>
             <a:rPr lang="de-DE" sz="2100" kern="1200" dirty="0"/>
@@ -11942,7 +12681,7 @@
         </a:bodyPr>
         <a:lstStyle/>
         <a:p>
-          <a:pPr marL="0" lvl="0" indent="0" algn="ctr" defTabSz="1200150">
+          <a:pPr lvl="0" algn="ctr" defTabSz="1200150">
             <a:lnSpc>
               <a:spcPct val="90000"/>
             </a:lnSpc>
@@ -11952,7 +12691,6 @@
             <a:spcAft>
               <a:spcPct val="35000"/>
             </a:spcAft>
-            <a:buNone/>
           </a:pPr>
           <a:r>
             <a:rPr lang="de-DE" sz="2700" kern="1200" dirty="0"/>
@@ -12019,7 +12757,7 @@
         </a:bodyPr>
         <a:lstStyle/>
         <a:p>
-          <a:pPr marL="0" lvl="0" indent="0" algn="r" defTabSz="800100">
+          <a:pPr lvl="0" algn="r" defTabSz="800100">
             <a:lnSpc>
               <a:spcPct val="90000"/>
             </a:lnSpc>
@@ -12029,7 +12767,6 @@
             <a:spcAft>
               <a:spcPct val="35000"/>
             </a:spcAft>
-            <a:buNone/>
           </a:pPr>
           <a:r>
             <a:rPr lang="de-DE" sz="1800" kern="1200" dirty="0"/>
@@ -12102,7 +12839,7 @@
         </a:bodyPr>
         <a:lstStyle/>
         <a:p>
-          <a:pPr marL="0" lvl="0" indent="0" algn="ctr" defTabSz="1200150">
+          <a:pPr lvl="0" algn="ctr" defTabSz="1200150">
             <a:lnSpc>
               <a:spcPct val="90000"/>
             </a:lnSpc>
@@ -12112,7 +12849,6 @@
             <a:spcAft>
               <a:spcPct val="35000"/>
             </a:spcAft>
-            <a:buNone/>
           </a:pPr>
           <a:r>
             <a:rPr lang="de-DE" sz="2700" kern="1200" dirty="0"/>
@@ -12179,7 +12915,7 @@
         </a:bodyPr>
         <a:lstStyle/>
         <a:p>
-          <a:pPr marL="0" lvl="0" indent="0" algn="r" defTabSz="977900">
+          <a:pPr lvl="0" algn="r" defTabSz="977900">
             <a:lnSpc>
               <a:spcPct val="90000"/>
             </a:lnSpc>
@@ -12189,7 +12925,6 @@
             <a:spcAft>
               <a:spcPct val="35000"/>
             </a:spcAft>
-            <a:buNone/>
           </a:pPr>
           <a:r>
             <a:rPr lang="de-DE" sz="2200" kern="1200" dirty="0"/>
@@ -12257,7 +12992,7 @@
         </a:bodyPr>
         <a:lstStyle/>
         <a:p>
-          <a:pPr marL="0" lvl="0" indent="0" algn="ctr" defTabSz="1200150">
+          <a:pPr lvl="0" algn="ctr" defTabSz="1200150">
             <a:lnSpc>
               <a:spcPct val="90000"/>
             </a:lnSpc>
@@ -12267,7 +13002,6 @@
             <a:spcAft>
               <a:spcPct val="35000"/>
             </a:spcAft>
-            <a:buNone/>
           </a:pPr>
           <a:r>
             <a:rPr lang="de-DE" sz="2700" kern="1200" dirty="0"/>
@@ -12334,7 +13068,7 @@
         </a:bodyPr>
         <a:lstStyle/>
         <a:p>
-          <a:pPr marL="0" lvl="0" indent="0" algn="r" defTabSz="933450">
+          <a:pPr lvl="0" algn="r" defTabSz="933450">
             <a:lnSpc>
               <a:spcPct val="90000"/>
             </a:lnSpc>
@@ -12344,7 +13078,6 @@
             <a:spcAft>
               <a:spcPct val="35000"/>
             </a:spcAft>
-            <a:buNone/>
           </a:pPr>
           <a:r>
             <a:rPr lang="de-DE" sz="2100" kern="1200" dirty="0"/>
@@ -12431,7 +13164,7 @@
         </a:bodyPr>
         <a:lstStyle/>
         <a:p>
-          <a:pPr marL="0" lvl="0" indent="0" algn="ctr" defTabSz="844550">
+          <a:pPr lvl="0" algn="ctr" defTabSz="844550">
             <a:lnSpc>
               <a:spcPct val="90000"/>
             </a:lnSpc>
@@ -12441,7 +13174,6 @@
             <a:spcAft>
               <a:spcPct val="35000"/>
             </a:spcAft>
-            <a:buNone/>
           </a:pPr>
           <a:r>
             <a:rPr lang="de-DE" sz="1900" kern="1200" dirty="0"/>
@@ -12503,7 +13235,7 @@
         </a:bodyPr>
         <a:lstStyle/>
         <a:p>
-          <a:pPr marL="0" lvl="0" indent="0" algn="ctr" defTabSz="711200">
+          <a:pPr lvl="0" algn="ctr" defTabSz="711200">
             <a:lnSpc>
               <a:spcPct val="90000"/>
             </a:lnSpc>
@@ -12513,7 +13245,6 @@
             <a:spcAft>
               <a:spcPct val="35000"/>
             </a:spcAft>
-            <a:buNone/>
           </a:pPr>
           <a:endParaRPr lang="de-DE" sz="1600" kern="1200"/>
         </a:p>
@@ -12580,7 +13311,7 @@
         </a:bodyPr>
         <a:lstStyle/>
         <a:p>
-          <a:pPr marL="0" lvl="0" indent="0" algn="ctr" defTabSz="844550">
+          <a:pPr lvl="0" algn="ctr" defTabSz="844550">
             <a:lnSpc>
               <a:spcPct val="90000"/>
             </a:lnSpc>
@@ -12590,7 +13321,6 @@
             <a:spcAft>
               <a:spcPct val="35000"/>
             </a:spcAft>
-            <a:buNone/>
           </a:pPr>
           <a:r>
             <a:rPr lang="de-DE" sz="1900" kern="1200" dirty="0"/>
@@ -12652,7 +13382,7 @@
         </a:bodyPr>
         <a:lstStyle/>
         <a:p>
-          <a:pPr marL="0" lvl="0" indent="0" algn="ctr" defTabSz="711200">
+          <a:pPr lvl="0" algn="ctr" defTabSz="711200">
             <a:lnSpc>
               <a:spcPct val="90000"/>
             </a:lnSpc>
@@ -12662,7 +13392,6 @@
             <a:spcAft>
               <a:spcPct val="35000"/>
             </a:spcAft>
-            <a:buNone/>
           </a:pPr>
           <a:endParaRPr lang="de-DE" sz="1600" kern="1200"/>
         </a:p>
@@ -12729,7 +13458,7 @@
         </a:bodyPr>
         <a:lstStyle/>
         <a:p>
-          <a:pPr marL="0" lvl="0" indent="0" algn="ctr" defTabSz="844550">
+          <a:pPr lvl="0" algn="ctr" defTabSz="844550">
             <a:lnSpc>
               <a:spcPct val="90000"/>
             </a:lnSpc>
@@ -12739,7 +13468,6 @@
             <a:spcAft>
               <a:spcPct val="35000"/>
             </a:spcAft>
-            <a:buNone/>
           </a:pPr>
           <a:r>
             <a:rPr lang="de-DE" sz="1900" kern="1200" dirty="0"/>
@@ -12801,7 +13529,7 @@
         </a:bodyPr>
         <a:lstStyle/>
         <a:p>
-          <a:pPr marL="0" lvl="0" indent="0" algn="ctr" defTabSz="711200">
+          <a:pPr lvl="0" algn="ctr" defTabSz="711200">
             <a:lnSpc>
               <a:spcPct val="90000"/>
             </a:lnSpc>
@@ -12811,7 +13539,6 @@
             <a:spcAft>
               <a:spcPct val="35000"/>
             </a:spcAft>
-            <a:buNone/>
           </a:pPr>
           <a:endParaRPr lang="de-DE" sz="1600" kern="1200"/>
         </a:p>
@@ -12878,7 +13605,7 @@
         </a:bodyPr>
         <a:lstStyle/>
         <a:p>
-          <a:pPr marL="0" lvl="0" indent="0" algn="ctr" defTabSz="844550">
+          <a:pPr lvl="0" algn="ctr" defTabSz="844550">
             <a:lnSpc>
               <a:spcPct val="90000"/>
             </a:lnSpc>
@@ -12888,7 +13615,6 @@
             <a:spcAft>
               <a:spcPct val="35000"/>
             </a:spcAft>
-            <a:buNone/>
           </a:pPr>
           <a:r>
             <a:rPr lang="de-DE" sz="1900" kern="1200" dirty="0"/>
@@ -12950,7 +13676,7 @@
         </a:bodyPr>
         <a:lstStyle/>
         <a:p>
-          <a:pPr marL="0" lvl="0" indent="0" algn="ctr" defTabSz="711200">
+          <a:pPr lvl="0" algn="ctr" defTabSz="711200">
             <a:lnSpc>
               <a:spcPct val="90000"/>
             </a:lnSpc>
@@ -12960,7 +13686,6 @@
             <a:spcAft>
               <a:spcPct val="35000"/>
             </a:spcAft>
-            <a:buNone/>
           </a:pPr>
           <a:endParaRPr lang="de-DE" sz="1600" kern="1200"/>
         </a:p>
@@ -13027,7 +13752,7 @@
         </a:bodyPr>
         <a:lstStyle/>
         <a:p>
-          <a:pPr marL="0" lvl="0" indent="0" algn="ctr" defTabSz="844550">
+          <a:pPr lvl="0" algn="ctr" defTabSz="844550">
             <a:lnSpc>
               <a:spcPct val="90000"/>
             </a:lnSpc>
@@ -13037,7 +13762,6 @@
             <a:spcAft>
               <a:spcPct val="35000"/>
             </a:spcAft>
-            <a:buNone/>
           </a:pPr>
           <a:r>
             <a:rPr lang="de-DE" sz="1900" kern="1200" dirty="0"/>
@@ -13117,7 +13841,7 @@
         </a:bodyPr>
         <a:lstStyle/>
         <a:p>
-          <a:pPr marL="0" lvl="0" indent="0" algn="ctr" defTabSz="933450">
+          <a:pPr lvl="0" algn="ctr" defTabSz="933450">
             <a:lnSpc>
               <a:spcPct val="90000"/>
             </a:lnSpc>
@@ -13127,7 +13851,6 @@
             <a:spcAft>
               <a:spcPct val="35000"/>
             </a:spcAft>
-            <a:buNone/>
           </a:pPr>
           <a:r>
             <a:rPr lang="de-DE" sz="2100" kern="1200" dirty="0"/>
@@ -13241,7 +13964,7 @@
         </a:bodyPr>
         <a:lstStyle/>
         <a:p>
-          <a:pPr marL="0" lvl="0" indent="0" algn="ctr" defTabSz="844550">
+          <a:pPr lvl="0" algn="ctr" defTabSz="844550">
             <a:lnSpc>
               <a:spcPct val="90000"/>
             </a:lnSpc>
@@ -13251,7 +13974,6 @@
             <a:spcAft>
               <a:spcPct val="35000"/>
             </a:spcAft>
-            <a:buNone/>
           </a:pPr>
           <a:r>
             <a:rPr lang="de-DE" sz="1900" kern="1200" dirty="0"/>
@@ -13365,7 +14087,7 @@
         </a:bodyPr>
         <a:lstStyle/>
         <a:p>
-          <a:pPr marL="0" lvl="0" indent="0" algn="ctr" defTabSz="844550">
+          <a:pPr lvl="0" algn="ctr" defTabSz="844550">
             <a:lnSpc>
               <a:spcPct val="90000"/>
             </a:lnSpc>
@@ -13375,7 +14097,6 @@
             <a:spcAft>
               <a:spcPct val="35000"/>
             </a:spcAft>
-            <a:buNone/>
           </a:pPr>
           <a:r>
             <a:rPr lang="de-DE" sz="1900" kern="1200" dirty="0"/>
@@ -13489,7 +14210,7 @@
         </a:bodyPr>
         <a:lstStyle/>
         <a:p>
-          <a:pPr marL="0" lvl="0" indent="0" algn="ctr" defTabSz="844550">
+          <a:pPr lvl="0" algn="ctr" defTabSz="844550">
             <a:lnSpc>
               <a:spcPct val="90000"/>
             </a:lnSpc>
@@ -13499,7 +14220,6 @@
             <a:spcAft>
               <a:spcPct val="35000"/>
             </a:spcAft>
-            <a:buNone/>
           </a:pPr>
           <a:r>
             <a:rPr lang="de-DE" sz="1900" kern="1200" dirty="0"/>
@@ -13613,7 +14333,7 @@
         </a:bodyPr>
         <a:lstStyle/>
         <a:p>
-          <a:pPr marL="0" lvl="0" indent="0" algn="ctr" defTabSz="844550">
+          <a:pPr lvl="0" algn="ctr" defTabSz="844550">
             <a:lnSpc>
               <a:spcPct val="90000"/>
             </a:lnSpc>
@@ -13623,7 +14343,6 @@
             <a:spcAft>
               <a:spcPct val="35000"/>
             </a:spcAft>
-            <a:buNone/>
           </a:pPr>
           <a:r>
             <a:rPr lang="de-DE" sz="1900" kern="1200" dirty="0"/>
@@ -13703,7 +14422,7 @@
         </a:bodyPr>
         <a:lstStyle/>
         <a:p>
-          <a:pPr marL="0" lvl="0" indent="0" algn="ctr" defTabSz="1155700">
+          <a:pPr lvl="0" algn="ctr" defTabSz="1155700">
             <a:lnSpc>
               <a:spcPct val="90000"/>
             </a:lnSpc>
@@ -13713,7 +14432,6 @@
             <a:spcAft>
               <a:spcPct val="35000"/>
             </a:spcAft>
-            <a:buNone/>
           </a:pPr>
           <a:r>
             <a:rPr lang="de-DE" sz="2600" kern="1200" dirty="0"/>
@@ -13822,12 +14540,12 @@
         </a:fontRef>
       </dsp:style>
       <dsp:txBody>
-        <a:bodyPr spcFirstLastPara="0" vert="horz" wrap="square" lIns="17145" tIns="17145" rIns="17145" bIns="17145" numCol="1" spcCol="1270" anchor="ctr" anchorCtr="0">
+        <a:bodyPr spcFirstLastPara="0" vert="horz" wrap="square" lIns="38100" tIns="38100" rIns="38100" bIns="38100" numCol="1" spcCol="1270" anchor="ctr" anchorCtr="0">
           <a:noAutofit/>
         </a:bodyPr>
         <a:lstStyle/>
         <a:p>
-          <a:pPr marL="0" lvl="0" indent="0" algn="ctr" defTabSz="400050">
+          <a:pPr lvl="0" algn="ctr" defTabSz="889000">
             <a:lnSpc>
               <a:spcPct val="90000"/>
             </a:lnSpc>
@@ -13837,15 +14555,14 @@
             <a:spcAft>
               <a:spcPct val="35000"/>
             </a:spcAft>
-            <a:buNone/>
           </a:pPr>
           <a:r>
-            <a:rPr lang="de-DE" sz="900" kern="1200" dirty="0"/>
+            <a:rPr lang="de-DE" sz="2000" kern="1200" dirty="0"/>
             <a:t>Ziele</a:t>
           </a:r>
         </a:p>
         <a:p>
-          <a:pPr marL="0" lvl="0" indent="0" algn="ctr" defTabSz="400050">
+          <a:pPr lvl="0" algn="ctr" defTabSz="889000">
             <a:lnSpc>
               <a:spcPct val="90000"/>
             </a:lnSpc>
@@ -13855,10 +14572,9 @@
             <a:spcAft>
               <a:spcPct val="35000"/>
             </a:spcAft>
-            <a:buNone/>
           </a:pPr>
           <a:r>
-            <a:rPr lang="de-DE" sz="900" kern="1200" dirty="0"/>
+            <a:rPr lang="de-DE" sz="2000" kern="1200" dirty="0"/>
             <a:t>(SMART)</a:t>
           </a:r>
         </a:p>
@@ -13964,12 +14680,12 @@
         </a:fontRef>
       </dsp:style>
       <dsp:txBody>
-        <a:bodyPr spcFirstLastPara="0" vert="horz" wrap="square" lIns="17145" tIns="17145" rIns="17145" bIns="17145" numCol="1" spcCol="1270" anchor="ctr" anchorCtr="0">
+        <a:bodyPr spcFirstLastPara="0" vert="horz" wrap="square" lIns="38100" tIns="38100" rIns="38100" bIns="38100" numCol="1" spcCol="1270" anchor="ctr" anchorCtr="0">
           <a:noAutofit/>
         </a:bodyPr>
         <a:lstStyle/>
         <a:p>
-          <a:pPr marL="0" lvl="0" indent="0" algn="ctr" defTabSz="400050">
+          <a:pPr lvl="0" algn="ctr" defTabSz="889000">
             <a:lnSpc>
               <a:spcPct val="90000"/>
             </a:lnSpc>
@@ -13979,12 +14695,28 @@
             <a:spcAft>
               <a:spcPct val="35000"/>
             </a:spcAft>
-            <a:buNone/>
           </a:pPr>
           <a:r>
+            <a:rPr lang="de-DE" sz="2000" kern="1200" dirty="0"/>
+            <a:t>Erstellung</a:t>
+          </a:r>
+          <a:r>
             <a:rPr lang="de-DE" sz="900" kern="1200" dirty="0"/>
-            <a:t>Erstellung des Phasenplans</a:t>
+            <a:t> </a:t>
           </a:r>
+          <a:r>
+            <a:rPr lang="de-DE" sz="2000" kern="1200" dirty="0"/>
+            <a:t>des</a:t>
+          </a:r>
+          <a:r>
+            <a:rPr lang="de-DE" sz="900" kern="1200" dirty="0"/>
+            <a:t> </a:t>
+          </a:r>
+          <a:r>
+            <a:rPr lang="de-DE" sz="2000" kern="1200" dirty="0" smtClean="0"/>
+            <a:t>Phasen-plans</a:t>
+          </a:r>
+          <a:endParaRPr lang="de-DE" sz="2000" kern="1200" dirty="0"/>
         </a:p>
       </dsp:txBody>
       <dsp:txXfrm>
@@ -14088,12 +14820,12 @@
         </a:fontRef>
       </dsp:style>
       <dsp:txBody>
-        <a:bodyPr spcFirstLastPara="0" vert="horz" wrap="square" lIns="17145" tIns="17145" rIns="17145" bIns="17145" numCol="1" spcCol="1270" anchor="ctr" anchorCtr="0">
+        <a:bodyPr spcFirstLastPara="0" vert="horz" wrap="square" lIns="38100" tIns="38100" rIns="38100" bIns="38100" numCol="1" spcCol="1270" anchor="ctr" anchorCtr="0">
           <a:noAutofit/>
         </a:bodyPr>
         <a:lstStyle/>
         <a:p>
-          <a:pPr marL="0" lvl="0" indent="0" algn="ctr" defTabSz="400050">
+          <a:pPr lvl="0" algn="ctr" defTabSz="889000">
             <a:lnSpc>
               <a:spcPct val="90000"/>
             </a:lnSpc>
@@ -14103,13 +14835,12 @@
             <a:spcAft>
               <a:spcPct val="35000"/>
             </a:spcAft>
-            <a:buNone/>
           </a:pPr>
           <a:r>
-            <a:rPr lang="de-DE" sz="900" kern="1200" dirty="0" err="1"/>
+            <a:rPr lang="de-DE" sz="2000" kern="1200" dirty="0" err="1"/>
             <a:t>Stakeholderanalyse</a:t>
           </a:r>
-          <a:endParaRPr lang="de-DE" sz="900" kern="1200" dirty="0"/>
+          <a:endParaRPr lang="de-DE" sz="2000" kern="1200" dirty="0"/>
         </a:p>
       </dsp:txBody>
       <dsp:txXfrm>
@@ -14213,12 +14944,12 @@
         </a:fontRef>
       </dsp:style>
       <dsp:txBody>
-        <a:bodyPr spcFirstLastPara="0" vert="horz" wrap="square" lIns="17145" tIns="17145" rIns="17145" bIns="17145" numCol="1" spcCol="1270" anchor="ctr" anchorCtr="0">
+        <a:bodyPr spcFirstLastPara="0" vert="horz" wrap="square" lIns="38100" tIns="38100" rIns="38100" bIns="38100" numCol="1" spcCol="1270" anchor="ctr" anchorCtr="0">
           <a:noAutofit/>
         </a:bodyPr>
         <a:lstStyle/>
         <a:p>
-          <a:pPr marL="0" lvl="0" indent="0" algn="ctr" defTabSz="400050">
+          <a:pPr lvl="0" algn="ctr" defTabSz="889000">
             <a:lnSpc>
               <a:spcPct val="90000"/>
             </a:lnSpc>
@@ -14228,12 +14959,12 @@
             <a:spcAft>
               <a:spcPct val="35000"/>
             </a:spcAft>
-            <a:buNone/>
           </a:pPr>
           <a:r>
-            <a:rPr lang="de-DE" sz="900" kern="1200" dirty="0"/>
-            <a:t>Risikoanalyse</a:t>
+            <a:rPr lang="de-DE" sz="2000" kern="1200" dirty="0" smtClean="0"/>
+            <a:t>Risiko-analyse</a:t>
           </a:r>
+          <a:endParaRPr lang="de-DE" sz="2000" kern="1200" dirty="0"/>
         </a:p>
       </dsp:txBody>
       <dsp:txXfrm>
@@ -14337,12 +15068,12 @@
         </a:fontRef>
       </dsp:style>
       <dsp:txBody>
-        <a:bodyPr spcFirstLastPara="0" vert="horz" wrap="square" lIns="17145" tIns="17145" rIns="17145" bIns="17145" numCol="1" spcCol="1270" anchor="ctr" anchorCtr="0">
+        <a:bodyPr spcFirstLastPara="0" vert="horz" wrap="square" lIns="38100" tIns="38100" rIns="38100" bIns="38100" numCol="1" spcCol="1270" anchor="ctr" anchorCtr="0">
           <a:noAutofit/>
         </a:bodyPr>
         <a:lstStyle/>
         <a:p>
-          <a:pPr marL="0" lvl="0" indent="0" algn="ctr" defTabSz="400050">
+          <a:pPr lvl="0" algn="ctr" defTabSz="889000">
             <a:lnSpc>
               <a:spcPct val="90000"/>
             </a:lnSpc>
@@ -14352,12 +15083,16 @@
             <a:spcAft>
               <a:spcPct val="35000"/>
             </a:spcAft>
-            <a:buNone/>
           </a:pPr>
           <a:r>
-            <a:rPr lang="de-DE" sz="900" kern="1200" dirty="0"/>
-            <a:t>Kommunikationskonzept</a:t>
+            <a:rPr lang="de-DE" sz="2000" kern="1200" dirty="0" err="1" smtClean="0"/>
+            <a:t>Kommuni</a:t>
           </a:r>
+          <a:r>
+            <a:rPr lang="de-DE" sz="2000" kern="1200" dirty="0" smtClean="0"/>
+            <a:t>-kations-konzept</a:t>
+          </a:r>
+          <a:endParaRPr lang="de-DE" sz="2000" kern="1200" dirty="0"/>
         </a:p>
       </dsp:txBody>
       <dsp:txXfrm>
@@ -14461,12 +15196,12 @@
         </a:fontRef>
       </dsp:style>
       <dsp:txBody>
-        <a:bodyPr spcFirstLastPara="0" vert="horz" wrap="square" lIns="17145" tIns="17145" rIns="17145" bIns="17145" numCol="1" spcCol="1270" anchor="ctr" anchorCtr="0">
+        <a:bodyPr spcFirstLastPara="0" vert="horz" wrap="square" lIns="38100" tIns="38100" rIns="38100" bIns="38100" numCol="1" spcCol="1270" anchor="ctr" anchorCtr="0">
           <a:noAutofit/>
         </a:bodyPr>
         <a:lstStyle/>
         <a:p>
-          <a:pPr marL="0" lvl="0" indent="0" algn="ctr" defTabSz="400050">
+          <a:pPr lvl="0" algn="ctr" defTabSz="889000">
             <a:lnSpc>
               <a:spcPct val="90000"/>
             </a:lnSpc>
@@ -14476,12 +15211,12 @@
             <a:spcAft>
               <a:spcPct val="35000"/>
             </a:spcAft>
-            <a:buNone/>
           </a:pPr>
           <a:r>
-            <a:rPr lang="de-DE" sz="900" kern="1200" dirty="0"/>
-            <a:t>Projektauftrag</a:t>
+            <a:rPr lang="de-DE" sz="2000" kern="1200" dirty="0" smtClean="0"/>
+            <a:t>Projekt-auftrag</a:t>
           </a:r>
+          <a:endParaRPr lang="de-DE" sz="2000" kern="1200" dirty="0"/>
         </a:p>
       </dsp:txBody>
       <dsp:txXfrm>
@@ -14556,7 +15291,7 @@
         </a:bodyPr>
         <a:lstStyle/>
         <a:p>
-          <a:pPr marL="0" lvl="0" indent="0" algn="ctr" defTabSz="1555750">
+          <a:pPr lvl="0" algn="ctr" defTabSz="1555750">
             <a:lnSpc>
               <a:spcPct val="90000"/>
             </a:lnSpc>
@@ -14566,7 +15301,6 @@
             <a:spcAft>
               <a:spcPct val="35000"/>
             </a:spcAft>
-            <a:buNone/>
           </a:pPr>
           <a:r>
             <a:rPr lang="de-DE" sz="3500" kern="1200" dirty="0"/>
@@ -14680,7 +15414,7 @@
         </a:bodyPr>
         <a:lstStyle/>
         <a:p>
-          <a:pPr marL="0" lvl="0" indent="0" algn="ctr" defTabSz="889000">
+          <a:pPr lvl="0" algn="ctr" defTabSz="889000">
             <a:lnSpc>
               <a:spcPct val="90000"/>
             </a:lnSpc>
@@ -14690,7 +15424,6 @@
             <a:spcAft>
               <a:spcPct val="35000"/>
             </a:spcAft>
-            <a:buNone/>
           </a:pPr>
           <a:r>
             <a:rPr lang="de-DE" sz="2000" kern="1200" dirty="0"/>
@@ -14804,7 +15537,7 @@
         </a:bodyPr>
         <a:lstStyle/>
         <a:p>
-          <a:pPr marL="0" lvl="0" indent="0" algn="ctr" defTabSz="889000">
+          <a:pPr lvl="0" algn="ctr" defTabSz="889000">
             <a:lnSpc>
               <a:spcPct val="90000"/>
             </a:lnSpc>
@@ -14814,7 +15547,6 @@
             <a:spcAft>
               <a:spcPct val="35000"/>
             </a:spcAft>
-            <a:buNone/>
           </a:pPr>
           <a:r>
             <a:rPr lang="de-DE" sz="2000" kern="1200" dirty="0"/>
@@ -14928,7 +15660,7 @@
         </a:bodyPr>
         <a:lstStyle/>
         <a:p>
-          <a:pPr marL="0" lvl="0" indent="0" algn="ctr" defTabSz="889000">
+          <a:pPr lvl="0" algn="ctr" defTabSz="889000">
             <a:lnSpc>
               <a:spcPct val="90000"/>
             </a:lnSpc>
@@ -14938,7 +15670,6 @@
             <a:spcAft>
               <a:spcPct val="35000"/>
             </a:spcAft>
-            <a:buNone/>
           </a:pPr>
           <a:r>
             <a:rPr lang="de-DE" sz="2000" kern="1200" dirty="0"/>
@@ -15052,7 +15783,7 @@
         </a:bodyPr>
         <a:lstStyle/>
         <a:p>
-          <a:pPr marL="0" lvl="0" indent="0" algn="ctr" defTabSz="889000">
+          <a:pPr lvl="0" algn="ctr" defTabSz="889000">
             <a:lnSpc>
               <a:spcPct val="90000"/>
             </a:lnSpc>
@@ -15062,7 +15793,6 @@
             <a:spcAft>
               <a:spcPct val="35000"/>
             </a:spcAft>
-            <a:buNone/>
           </a:pPr>
           <a:r>
             <a:rPr lang="de-DE" sz="2000" kern="1200" dirty="0"/>
@@ -15142,7 +15872,7 @@
         </a:bodyPr>
         <a:lstStyle/>
         <a:p>
-          <a:pPr marL="0" lvl="0" indent="0" algn="ctr" defTabSz="1200150">
+          <a:pPr lvl="0" algn="ctr" defTabSz="1200150">
             <a:lnSpc>
               <a:spcPct val="90000"/>
             </a:lnSpc>
@@ -15152,7 +15882,6 @@
             <a:spcAft>
               <a:spcPct val="35000"/>
             </a:spcAft>
-            <a:buNone/>
           </a:pPr>
           <a:r>
             <a:rPr lang="de-DE" sz="2700" kern="1200" dirty="0"/>
@@ -15261,12 +15990,12 @@
         </a:fontRef>
       </dsp:style>
       <dsp:txBody>
-        <a:bodyPr spcFirstLastPara="0" vert="horz" wrap="square" lIns="26670" tIns="26670" rIns="26670" bIns="26670" numCol="1" spcCol="1270" anchor="ctr" anchorCtr="0">
+        <a:bodyPr spcFirstLastPara="0" vert="horz" wrap="square" lIns="38100" tIns="38100" rIns="38100" bIns="38100" numCol="1" spcCol="1270" anchor="ctr" anchorCtr="0">
           <a:noAutofit/>
         </a:bodyPr>
         <a:lstStyle/>
         <a:p>
-          <a:pPr marL="0" lvl="0" indent="0" algn="ctr" defTabSz="622300">
+          <a:pPr lvl="0" algn="ctr" defTabSz="889000">
             <a:lnSpc>
               <a:spcPct val="90000"/>
             </a:lnSpc>
@@ -15276,12 +16005,16 @@
             <a:spcAft>
               <a:spcPct val="35000"/>
             </a:spcAft>
-            <a:buNone/>
           </a:pPr>
           <a:r>
-            <a:rPr lang="de-DE" sz="1400" kern="1200" dirty="0"/>
-            <a:t>Qualitätsmanagement</a:t>
+            <a:rPr lang="de-DE" sz="2000" kern="1200" dirty="0" smtClean="0"/>
+            <a:t>Qualitäts- </a:t>
           </a:r>
+          <a:r>
+            <a:rPr lang="de-DE" sz="2000" kern="1200" dirty="0" err="1" smtClean="0"/>
+            <a:t>management</a:t>
+          </a:r>
+          <a:endParaRPr lang="de-DE" sz="2000" kern="1200" dirty="0"/>
         </a:p>
       </dsp:txBody>
       <dsp:txXfrm>
@@ -15385,12 +16118,12 @@
         </a:fontRef>
       </dsp:style>
       <dsp:txBody>
-        <a:bodyPr spcFirstLastPara="0" vert="horz" wrap="square" lIns="26670" tIns="26670" rIns="26670" bIns="26670" numCol="1" spcCol="1270" anchor="ctr" anchorCtr="0">
+        <a:bodyPr spcFirstLastPara="0" vert="horz" wrap="square" lIns="38100" tIns="38100" rIns="38100" bIns="38100" numCol="1" spcCol="1270" anchor="ctr" anchorCtr="0">
           <a:noAutofit/>
         </a:bodyPr>
         <a:lstStyle/>
         <a:p>
-          <a:pPr marL="0" lvl="0" indent="0" algn="ctr" defTabSz="622300">
+          <a:pPr lvl="0" algn="ctr" defTabSz="889000">
             <a:lnSpc>
               <a:spcPct val="90000"/>
             </a:lnSpc>
@@ -15400,10 +16133,9 @@
             <a:spcAft>
               <a:spcPct val="35000"/>
             </a:spcAft>
-            <a:buNone/>
           </a:pPr>
           <a:r>
-            <a:rPr lang="de-DE" sz="1400" kern="1200" dirty="0"/>
+            <a:rPr lang="de-DE" sz="2000" kern="1200" dirty="0"/>
             <a:t>Qualitätskreisel</a:t>
           </a:r>
         </a:p>
@@ -15509,12 +16241,12 @@
         </a:fontRef>
       </dsp:style>
       <dsp:txBody>
-        <a:bodyPr spcFirstLastPara="0" vert="horz" wrap="square" lIns="26670" tIns="26670" rIns="26670" bIns="26670" numCol="1" spcCol="1270" anchor="ctr" anchorCtr="0">
+        <a:bodyPr spcFirstLastPara="0" vert="horz" wrap="square" lIns="38100" tIns="38100" rIns="38100" bIns="38100" numCol="1" spcCol="1270" anchor="ctr" anchorCtr="0">
           <a:noAutofit/>
         </a:bodyPr>
         <a:lstStyle/>
         <a:p>
-          <a:pPr marL="0" lvl="0" indent="0" algn="ctr" defTabSz="622300">
+          <a:pPr lvl="0" algn="ctr" defTabSz="889000">
             <a:lnSpc>
               <a:spcPct val="90000"/>
             </a:lnSpc>
@@ -15524,15 +16256,14 @@
             <a:spcAft>
               <a:spcPct val="35000"/>
             </a:spcAft>
-            <a:buNone/>
           </a:pPr>
           <a:r>
-            <a:rPr lang="de-DE" sz="1400" kern="1200" dirty="0"/>
+            <a:rPr lang="de-DE" sz="2000" kern="1200" dirty="0"/>
             <a:t>Analyse von Fehlern</a:t>
           </a:r>
         </a:p>
         <a:p>
-          <a:pPr marL="0" lvl="0" indent="0" algn="ctr" defTabSz="622300">
+          <a:pPr lvl="0" algn="ctr" defTabSz="889000">
             <a:lnSpc>
               <a:spcPct val="90000"/>
             </a:lnSpc>
@@ -15542,18 +16273,17 @@
             <a:spcAft>
               <a:spcPct val="35000"/>
             </a:spcAft>
-            <a:buNone/>
           </a:pPr>
           <a:r>
-            <a:rPr lang="de-DE" sz="1400" kern="1200" dirty="0"/>
+            <a:rPr lang="de-DE" sz="2000" kern="1200" dirty="0"/>
             <a:t>(z.B. </a:t>
           </a:r>
           <a:r>
-            <a:rPr lang="de-DE" sz="1400" kern="1200" dirty="0" err="1"/>
+            <a:rPr lang="de-DE" sz="2000" kern="1200" dirty="0" err="1"/>
             <a:t>Ishikawa</a:t>
           </a:r>
           <a:r>
-            <a:rPr lang="de-DE" sz="1400" kern="1200" dirty="0"/>
+            <a:rPr lang="de-DE" sz="2000" kern="1200" dirty="0"/>
             <a:t> Diagramm)</a:t>
           </a:r>
         </a:p>
@@ -15659,12 +16389,12 @@
         </a:fontRef>
       </dsp:style>
       <dsp:txBody>
-        <a:bodyPr spcFirstLastPara="0" vert="horz" wrap="square" lIns="26670" tIns="26670" rIns="26670" bIns="26670" numCol="1" spcCol="1270" anchor="ctr" anchorCtr="0">
+        <a:bodyPr spcFirstLastPara="0" vert="horz" wrap="square" lIns="38100" tIns="38100" rIns="38100" bIns="38100" numCol="1" spcCol="1270" anchor="ctr" anchorCtr="0">
           <a:noAutofit/>
         </a:bodyPr>
         <a:lstStyle/>
         <a:p>
-          <a:pPr marL="0" lvl="0" indent="0" algn="ctr" defTabSz="622300">
+          <a:pPr lvl="0" algn="ctr" defTabSz="889000">
             <a:lnSpc>
               <a:spcPct val="90000"/>
             </a:lnSpc>
@@ -15674,12 +16404,12 @@
             <a:spcAft>
               <a:spcPct val="35000"/>
             </a:spcAft>
-            <a:buNone/>
           </a:pPr>
           <a:r>
-            <a:rPr lang="de-DE" sz="1400" kern="1200" dirty="0"/>
-            <a:t>Fortschrittsermittlungen</a:t>
+            <a:rPr lang="de-DE" sz="2000" kern="1200" dirty="0" smtClean="0"/>
+            <a:t>Fortschritts-ermittlungen</a:t>
           </a:r>
+          <a:endParaRPr lang="de-DE" sz="2000" kern="1200" dirty="0"/>
         </a:p>
       </dsp:txBody>
       <dsp:txXfrm>
@@ -15754,7 +16484,7 @@
         </a:bodyPr>
         <a:lstStyle/>
         <a:p>
-          <a:pPr marL="0" lvl="0" indent="0" algn="ctr" defTabSz="1200150">
+          <a:pPr lvl="0" algn="ctr" defTabSz="1200150">
             <a:lnSpc>
               <a:spcPct val="90000"/>
             </a:lnSpc>
@@ -15764,7 +16494,6 @@
             <a:spcAft>
               <a:spcPct val="35000"/>
             </a:spcAft>
-            <a:buNone/>
           </a:pPr>
           <a:r>
             <a:rPr lang="de-DE" sz="2700" kern="1200" dirty="0"/>
@@ -15873,12 +16602,12 @@
         </a:fontRef>
       </dsp:style>
       <dsp:txBody>
-        <a:bodyPr spcFirstLastPara="0" vert="horz" wrap="square" lIns="36195" tIns="36195" rIns="36195" bIns="36195" numCol="1" spcCol="1270" anchor="ctr" anchorCtr="0">
+        <a:bodyPr spcFirstLastPara="0" vert="horz" wrap="square" lIns="38100" tIns="38100" rIns="38100" bIns="38100" numCol="1" spcCol="1270" anchor="ctr" anchorCtr="0">
           <a:noAutofit/>
         </a:bodyPr>
         <a:lstStyle/>
         <a:p>
-          <a:pPr marL="0" lvl="0" indent="0" algn="ctr" defTabSz="844550">
+          <a:pPr lvl="0" algn="ctr" defTabSz="889000">
             <a:lnSpc>
               <a:spcPct val="90000"/>
             </a:lnSpc>
@@ -15888,10 +16617,9 @@
             <a:spcAft>
               <a:spcPct val="35000"/>
             </a:spcAft>
-            <a:buNone/>
           </a:pPr>
           <a:r>
-            <a:rPr lang="de-DE" sz="1900" kern="1200" dirty="0"/>
+            <a:rPr lang="de-DE" sz="2000" kern="1200" dirty="0"/>
             <a:t>Abnahme</a:t>
           </a:r>
         </a:p>
@@ -15997,12 +16725,12 @@
         </a:fontRef>
       </dsp:style>
       <dsp:txBody>
-        <a:bodyPr spcFirstLastPara="0" vert="horz" wrap="square" lIns="36195" tIns="36195" rIns="36195" bIns="36195" numCol="1" spcCol="1270" anchor="ctr" anchorCtr="0">
+        <a:bodyPr spcFirstLastPara="0" vert="horz" wrap="square" lIns="38100" tIns="38100" rIns="38100" bIns="38100" numCol="1" spcCol="1270" anchor="ctr" anchorCtr="0">
           <a:noAutofit/>
         </a:bodyPr>
         <a:lstStyle/>
         <a:p>
-          <a:pPr marL="0" lvl="0" indent="0" algn="ctr" defTabSz="844550">
+          <a:pPr lvl="0" algn="ctr" defTabSz="889000">
             <a:lnSpc>
               <a:spcPct val="90000"/>
             </a:lnSpc>
@@ -16012,12 +16740,12 @@
             <a:spcAft>
               <a:spcPct val="35000"/>
             </a:spcAft>
-            <a:buNone/>
           </a:pPr>
           <a:r>
-            <a:rPr lang="de-DE" sz="1900" kern="1200" dirty="0"/>
-            <a:t>Abschlussanalyse</a:t>
+            <a:rPr lang="de-DE" sz="2000" kern="1200" dirty="0" smtClean="0"/>
+            <a:t>Abschluss-analyse</a:t>
           </a:r>
+          <a:endParaRPr lang="de-DE" sz="2000" kern="1200" dirty="0"/>
         </a:p>
       </dsp:txBody>
       <dsp:txXfrm>
@@ -16121,12 +16849,12 @@
         </a:fontRef>
       </dsp:style>
       <dsp:txBody>
-        <a:bodyPr spcFirstLastPara="0" vert="horz" wrap="square" lIns="36195" tIns="36195" rIns="36195" bIns="36195" numCol="1" spcCol="1270" anchor="ctr" anchorCtr="0">
+        <a:bodyPr spcFirstLastPara="0" vert="horz" wrap="square" lIns="38100" tIns="38100" rIns="38100" bIns="38100" numCol="1" spcCol="1270" anchor="ctr" anchorCtr="0">
           <a:noAutofit/>
         </a:bodyPr>
         <a:lstStyle/>
         <a:p>
-          <a:pPr marL="0" lvl="0" indent="0" algn="ctr" defTabSz="844550">
+          <a:pPr lvl="0" algn="ctr" defTabSz="889000">
             <a:lnSpc>
               <a:spcPct val="90000"/>
             </a:lnSpc>
@@ -16136,10 +16864,9 @@
             <a:spcAft>
               <a:spcPct val="35000"/>
             </a:spcAft>
-            <a:buNone/>
           </a:pPr>
           <a:r>
-            <a:rPr lang="de-DE" sz="1900" kern="1200" dirty="0"/>
+            <a:rPr lang="de-DE" sz="2000" kern="1200" dirty="0"/>
             <a:t>Sicherung der Erfahrung</a:t>
           </a:r>
         </a:p>
@@ -16233,12 +16960,12 @@
         <a:fontRef idx="minor"/>
       </dsp:style>
       <dsp:txBody>
-        <a:bodyPr spcFirstLastPara="0" vert="horz" wrap="square" lIns="99568" tIns="99568" rIns="99568" bIns="99568" numCol="1" spcCol="1270" anchor="b" anchorCtr="0">
+        <a:bodyPr spcFirstLastPara="0" vert="horz" wrap="square" lIns="128016" tIns="128016" rIns="128016" bIns="128016" numCol="1" spcCol="1270" anchor="b" anchorCtr="0">
           <a:noAutofit/>
         </a:bodyPr>
         <a:lstStyle/>
         <a:p>
-          <a:pPr marL="0" lvl="0" indent="0" algn="ctr" defTabSz="622300">
+          <a:pPr lvl="0" algn="ctr" defTabSz="800100">
             <a:lnSpc>
               <a:spcPct val="90000"/>
             </a:lnSpc>
@@ -16248,13 +16975,12 @@
             <a:spcAft>
               <a:spcPct val="35000"/>
             </a:spcAft>
-            <a:buNone/>
           </a:pPr>
           <a:r>
-            <a:rPr lang="de-DE" sz="1400" kern="1200" dirty="0" err="1"/>
-            <a:t>Responsivität</a:t>
+            <a:rPr lang="de-DE" sz="1800" kern="1200" dirty="0" err="1" smtClean="0"/>
+            <a:t>Respon-sivität</a:t>
           </a:r>
-          <a:endParaRPr lang="de-DE" sz="1400" kern="1200" dirty="0"/>
+          <a:endParaRPr lang="de-DE" sz="1800" kern="1200" dirty="0"/>
         </a:p>
       </dsp:txBody>
       <dsp:txXfrm>
@@ -16344,12 +17070,12 @@
         <a:fontRef idx="minor"/>
       </dsp:style>
       <dsp:txBody>
-        <a:bodyPr spcFirstLastPara="0" vert="horz" wrap="square" lIns="99568" tIns="99568" rIns="99568" bIns="99568" numCol="1" spcCol="1270" anchor="t" anchorCtr="0">
+        <a:bodyPr spcFirstLastPara="0" vert="horz" wrap="square" lIns="128016" tIns="128016" rIns="128016" bIns="128016" numCol="1" spcCol="1270" anchor="t" anchorCtr="0">
           <a:noAutofit/>
         </a:bodyPr>
         <a:lstStyle/>
         <a:p>
-          <a:pPr marL="0" lvl="0" indent="0" algn="ctr" defTabSz="622300">
+          <a:pPr lvl="0" algn="ctr" defTabSz="800100">
             <a:lnSpc>
               <a:spcPct val="90000"/>
             </a:lnSpc>
@@ -16359,12 +17085,12 @@
             <a:spcAft>
               <a:spcPct val="35000"/>
             </a:spcAft>
-            <a:buNone/>
           </a:pPr>
           <a:r>
-            <a:rPr lang="de-DE" sz="1400" kern="1200" dirty="0"/>
-            <a:t>Zeitgerechtes Aussehen</a:t>
+            <a:rPr lang="de-DE" sz="1800" kern="1200" dirty="0" smtClean="0"/>
+            <a:t>Zeitgemäße Optik</a:t>
           </a:r>
+          <a:endParaRPr lang="de-DE" sz="1800" kern="1200" dirty="0"/>
         </a:p>
       </dsp:txBody>
       <dsp:txXfrm>
@@ -16454,12 +17180,12 @@
         <a:fontRef idx="minor"/>
       </dsp:style>
       <dsp:txBody>
-        <a:bodyPr spcFirstLastPara="0" vert="horz" wrap="square" lIns="99568" tIns="99568" rIns="99568" bIns="99568" numCol="1" spcCol="1270" anchor="b" anchorCtr="0">
+        <a:bodyPr spcFirstLastPara="0" vert="horz" wrap="square" lIns="128016" tIns="128016" rIns="128016" bIns="128016" numCol="1" spcCol="1270" anchor="b" anchorCtr="0">
           <a:noAutofit/>
         </a:bodyPr>
         <a:lstStyle/>
         <a:p>
-          <a:pPr marL="0" lvl="0" indent="0" algn="ctr" defTabSz="622300">
+          <a:pPr lvl="0" algn="ctr" defTabSz="800100">
             <a:lnSpc>
               <a:spcPct val="90000"/>
             </a:lnSpc>
@@ -16469,11 +17195,14 @@
             <a:spcAft>
               <a:spcPct val="35000"/>
             </a:spcAft>
-            <a:buNone/>
           </a:pPr>
           <a:r>
-            <a:rPr lang="de-DE" sz="1400" kern="1200" dirty="0"/>
-            <a:t>Wartbares System</a:t>
+            <a:rPr lang="de-DE" sz="1800" kern="1200" dirty="0" smtClean="0"/>
+            <a:t>Wartbares </a:t>
+          </a:r>
+          <a:r>
+            <a:rPr lang="de-DE" sz="1800" kern="1200" dirty="0"/>
+            <a:t>System</a:t>
           </a:r>
         </a:p>
       </dsp:txBody>
@@ -16564,12 +17293,12 @@
         <a:fontRef idx="minor"/>
       </dsp:style>
       <dsp:txBody>
-        <a:bodyPr spcFirstLastPara="0" vert="horz" wrap="square" lIns="99568" tIns="99568" rIns="99568" bIns="99568" numCol="1" spcCol="1270" anchor="t" anchorCtr="0">
+        <a:bodyPr spcFirstLastPara="0" vert="horz" wrap="square" lIns="128016" tIns="128016" rIns="128016" bIns="128016" numCol="1" spcCol="1270" anchor="t" anchorCtr="0">
           <a:noAutofit/>
         </a:bodyPr>
         <a:lstStyle/>
         <a:p>
-          <a:pPr marL="0" lvl="0" indent="0" algn="ctr" defTabSz="622300">
+          <a:pPr lvl="0" algn="ctr" defTabSz="800100">
             <a:lnSpc>
               <a:spcPct val="90000"/>
             </a:lnSpc>
@@ -16579,17 +17308,16 @@
             <a:spcAft>
               <a:spcPct val="35000"/>
             </a:spcAft>
-            <a:buNone/>
           </a:pPr>
           <a:r>
-            <a:rPr lang="de-DE" sz="1400" kern="1200" dirty="0"/>
-            <a:t>Auswerte-möglich-</a:t>
+            <a:rPr lang="de-DE" sz="1800" kern="1200" dirty="0" smtClean="0"/>
+            <a:t>Auswertungs-möglich-</a:t>
           </a:r>
           <a:r>
-            <a:rPr lang="de-DE" sz="1400" kern="1200" dirty="0" err="1"/>
+            <a:rPr lang="de-DE" sz="1800" kern="1200" dirty="0" err="1" smtClean="0"/>
             <a:t>keiten</a:t>
           </a:r>
-          <a:endParaRPr lang="de-DE" sz="1400" kern="1200" dirty="0"/>
+          <a:endParaRPr lang="de-DE" sz="1800" kern="1200" dirty="0"/>
         </a:p>
       </dsp:txBody>
       <dsp:txXfrm>
@@ -16679,12 +17407,12 @@
         <a:fontRef idx="minor"/>
       </dsp:style>
       <dsp:txBody>
-        <a:bodyPr spcFirstLastPara="0" vert="horz" wrap="square" lIns="99568" tIns="99568" rIns="99568" bIns="99568" numCol="1" spcCol="1270" anchor="b" anchorCtr="0">
+        <a:bodyPr spcFirstLastPara="0" vert="horz" wrap="square" lIns="128016" tIns="128016" rIns="128016" bIns="128016" numCol="1" spcCol="1270" anchor="b" anchorCtr="0">
           <a:noAutofit/>
         </a:bodyPr>
         <a:lstStyle/>
         <a:p>
-          <a:pPr marL="0" lvl="0" indent="0" algn="ctr" defTabSz="622300">
+          <a:pPr lvl="0" algn="ctr" defTabSz="800100">
             <a:lnSpc>
               <a:spcPct val="90000"/>
             </a:lnSpc>
@@ -16694,12 +17422,24 @@
             <a:spcAft>
               <a:spcPct val="35000"/>
             </a:spcAft>
-            <a:buNone/>
           </a:pPr>
           <a:r>
-            <a:rPr lang="de-DE" sz="1400" kern="1200" dirty="0"/>
-            <a:t>Berechtigungs-konzept</a:t>
+            <a:rPr lang="de-DE" sz="1800" kern="1200" dirty="0" err="1" smtClean="0"/>
+            <a:t>Berecht</a:t>
           </a:r>
+          <a:r>
+            <a:rPr lang="de-DE" sz="1800" kern="1200" dirty="0" smtClean="0"/>
+            <a:t>-</a:t>
+          </a:r>
+          <a:r>
+            <a:rPr lang="de-DE" sz="1800" kern="1200" dirty="0" err="1" smtClean="0"/>
+            <a:t>igungs</a:t>
+          </a:r>
+          <a:r>
+            <a:rPr lang="de-DE" sz="1800" kern="1200" dirty="0" smtClean="0"/>
+            <a:t>-konzept</a:t>
+          </a:r>
+          <a:endParaRPr lang="de-DE" sz="1800" kern="1200" dirty="0"/>
         </a:p>
       </dsp:txBody>
       <dsp:txXfrm>
@@ -16789,12 +17529,12 @@
         <a:fontRef idx="minor"/>
       </dsp:style>
       <dsp:txBody>
-        <a:bodyPr spcFirstLastPara="0" vert="horz" wrap="square" lIns="99568" tIns="99568" rIns="99568" bIns="99568" numCol="1" spcCol="1270" anchor="t" anchorCtr="0">
+        <a:bodyPr spcFirstLastPara="0" vert="horz" wrap="square" lIns="128016" tIns="128016" rIns="128016" bIns="128016" numCol="1" spcCol="1270" anchor="t" anchorCtr="0">
           <a:noAutofit/>
         </a:bodyPr>
         <a:lstStyle/>
         <a:p>
-          <a:pPr marL="0" lvl="0" indent="0" algn="ctr" defTabSz="622300">
+          <a:pPr lvl="0" algn="ctr" defTabSz="800100">
             <a:lnSpc>
               <a:spcPct val="90000"/>
             </a:lnSpc>
@@ -16804,10 +17544,9 @@
             <a:spcAft>
               <a:spcPct val="35000"/>
             </a:spcAft>
-            <a:buNone/>
           </a:pPr>
           <a:r>
-            <a:rPr lang="de-DE" sz="1400" kern="1200" dirty="0"/>
+            <a:rPr lang="de-DE" sz="1800" kern="1200" dirty="0"/>
             <a:t>Genehmigungs-konzept</a:t>
           </a:r>
         </a:p>
@@ -16956,7 +17695,7 @@
         </a:bodyPr>
         <a:lstStyle/>
         <a:p>
-          <a:pPr marL="0" lvl="0" indent="0" algn="ctr" defTabSz="755650">
+          <a:pPr lvl="0" algn="ctr" defTabSz="755650">
             <a:lnSpc>
               <a:spcPct val="90000"/>
             </a:lnSpc>
@@ -16966,7 +17705,6 @@
             <a:spcAft>
               <a:spcPct val="35000"/>
             </a:spcAft>
-            <a:buNone/>
           </a:pPr>
           <a:r>
             <a:rPr lang="de-DE" sz="1700" kern="1200" dirty="0"/>
@@ -17066,7 +17804,7 @@
         </a:bodyPr>
         <a:lstStyle/>
         <a:p>
-          <a:pPr marL="0" lvl="0" indent="0" algn="ctr" defTabSz="755650">
+          <a:pPr lvl="0" algn="ctr" defTabSz="755650">
             <a:lnSpc>
               <a:spcPct val="90000"/>
             </a:lnSpc>
@@ -17076,7 +17814,6 @@
             <a:spcAft>
               <a:spcPct val="35000"/>
             </a:spcAft>
-            <a:buNone/>
           </a:pPr>
           <a:r>
             <a:rPr lang="de-DE" sz="1700" kern="1200" dirty="0"/>
@@ -17176,7 +17913,7 @@
         </a:bodyPr>
         <a:lstStyle/>
         <a:p>
-          <a:pPr marL="0" lvl="0" indent="0" algn="ctr" defTabSz="755650">
+          <a:pPr lvl="0" algn="ctr" defTabSz="755650">
             <a:lnSpc>
               <a:spcPct val="90000"/>
             </a:lnSpc>
@@ -17186,7 +17923,6 @@
             <a:spcAft>
               <a:spcPct val="35000"/>
             </a:spcAft>
-            <a:buNone/>
           </a:pPr>
           <a:r>
             <a:rPr lang="de-DE" sz="1700" kern="1200" dirty="0"/>
@@ -17281,12 +18017,12 @@
         <a:fontRef idx="minor"/>
       </dsp:style>
       <dsp:txBody>
-        <a:bodyPr spcFirstLastPara="0" vert="horz" wrap="square" lIns="85344" tIns="85344" rIns="85344" bIns="85344" numCol="1" spcCol="1270" anchor="t" anchorCtr="0">
+        <a:bodyPr spcFirstLastPara="0" vert="horz" wrap="square" lIns="142240" tIns="142240" rIns="142240" bIns="142240" numCol="1" spcCol="1270" anchor="t" anchorCtr="0">
           <a:noAutofit/>
         </a:bodyPr>
         <a:lstStyle/>
         <a:p>
-          <a:pPr marL="0" lvl="0" indent="0" algn="ctr" defTabSz="533400">
+          <a:pPr lvl="0" algn="ctr" defTabSz="889000">
             <a:lnSpc>
               <a:spcPct val="90000"/>
             </a:lnSpc>
@@ -17296,12 +18032,12 @@
             <a:spcAft>
               <a:spcPct val="35000"/>
             </a:spcAft>
-            <a:buNone/>
           </a:pPr>
           <a:r>
-            <a:rPr lang="de-DE" sz="1200" b="1" kern="1200" dirty="0"/>
-            <a:t>Implementierung</a:t>
+            <a:rPr lang="de-DE" sz="2000" b="1" kern="1200" dirty="0" err="1" smtClean="0"/>
+            <a:t>Imple-men-tierung</a:t>
           </a:r>
+          <a:endParaRPr lang="de-DE" sz="2000" b="1" kern="1200" dirty="0"/>
         </a:p>
       </dsp:txBody>
       <dsp:txXfrm>
@@ -17396,7 +18132,7 @@
         </a:bodyPr>
         <a:lstStyle/>
         <a:p>
-          <a:pPr marL="0" lvl="0" indent="0" algn="ctr" defTabSz="755650">
+          <a:pPr lvl="0" algn="ctr" defTabSz="755650">
             <a:lnSpc>
               <a:spcPct val="90000"/>
             </a:lnSpc>
@@ -17406,7 +18142,6 @@
             <a:spcAft>
               <a:spcPct val="35000"/>
             </a:spcAft>
-            <a:buNone/>
           </a:pPr>
           <a:r>
             <a:rPr lang="de-DE" sz="1700" kern="1200" dirty="0"/>
@@ -17506,7 +18241,7 @@
         </a:bodyPr>
         <a:lstStyle/>
         <a:p>
-          <a:pPr marL="0" lvl="0" indent="0" algn="ctr" defTabSz="755650">
+          <a:pPr lvl="0" algn="ctr" defTabSz="755650">
             <a:lnSpc>
               <a:spcPct val="90000"/>
             </a:lnSpc>
@@ -17516,7 +18251,6 @@
             <a:spcAft>
               <a:spcPct val="35000"/>
             </a:spcAft>
-            <a:buNone/>
           </a:pPr>
           <a:r>
             <a:rPr lang="de-DE" sz="1700" kern="1200" dirty="0"/>
@@ -33293,7 +34027,7 @@
           <p:nvPr>
             <p:extLst>
               <p:ext uri="{386F3935-93C4-4BCD-93E2-E3B085C9AB24}">
-                <p16:designElem xmlns:p16="http://schemas.microsoft.com/office/powerpoint/2015/main" val="1"/>
+                <p16:designElem xmlns:p16="http://schemas.microsoft.com/office/powerpoint/2015/main" xmlns="" val="1"/>
               </p:ext>
             </p:extLst>
           </p:nvPr>
@@ -33426,7 +34160,7 @@
           <p:nvPr>
             <p:extLst>
               <p:ext uri="{386F3935-93C4-4BCD-93E2-E3B085C9AB24}">
-                <p16:designElem xmlns:p16="http://schemas.microsoft.com/office/powerpoint/2015/main" val="1"/>
+                <p16:designElem xmlns:p16="http://schemas.microsoft.com/office/powerpoint/2015/main" xmlns="" val="1"/>
               </p:ext>
             </p:extLst>
           </p:nvPr>
@@ -33748,7 +34482,7 @@
             <p:ph idx="1"/>
             <p:extLst>
               <p:ext uri="{D42A27DB-BD31-4B8C-83A1-F6EECF244321}">
-                <p14:modId xmlns:p14="http://schemas.microsoft.com/office/powerpoint/2010/main" val="1512438542"/>
+                <p14:modId xmlns:p14="http://schemas.microsoft.com/office/powerpoint/2010/main" val="1897114775"/>
               </p:ext>
             </p:extLst>
           </p:nvPr>
@@ -33825,7 +34559,7 @@
             <p:ph idx="1"/>
             <p:extLst>
               <p:ext uri="{D42A27DB-BD31-4B8C-83A1-F6EECF244321}">
-                <p14:modId xmlns:p14="http://schemas.microsoft.com/office/powerpoint/2010/main" val="2871799780"/>
+                <p14:modId xmlns:p14="http://schemas.microsoft.com/office/powerpoint/2010/main" val="3036088037"/>
               </p:ext>
             </p:extLst>
           </p:nvPr>
@@ -34135,7 +34869,7 @@
             <p:ph idx="1"/>
             <p:extLst>
               <p:ext uri="{D42A27DB-BD31-4B8C-83A1-F6EECF244321}">
-                <p14:modId xmlns:p14="http://schemas.microsoft.com/office/powerpoint/2010/main" val="566094777"/>
+                <p14:modId xmlns:p14="http://schemas.microsoft.com/office/powerpoint/2010/main" val="1585522498"/>
               </p:ext>
             </p:extLst>
           </p:nvPr>
@@ -34461,7 +35195,7 @@
             <p:ph idx="1"/>
             <p:extLst>
               <p:ext uri="{D42A27DB-BD31-4B8C-83A1-F6EECF244321}">
-                <p14:modId xmlns:p14="http://schemas.microsoft.com/office/powerpoint/2010/main" val="1951602689"/>
+                <p14:modId xmlns:p14="http://schemas.microsoft.com/office/powerpoint/2010/main" val="2385386761"/>
               </p:ext>
             </p:extLst>
           </p:nvPr>
@@ -34538,7 +35272,7 @@
           <p:nvPr/>
         </p:nvPicPr>
         <p:blipFill>
-          <a:blip r:embed="rId7">
+          <a:blip r:embed="rId7" cstate="print">
             <a:extLst>
               <a:ext uri="{28A0092B-C50C-407E-A947-70E740481C1C}">
                 <a14:useLocalDpi xmlns:a14="http://schemas.microsoft.com/office/drawing/2010/main" val="0"/>
@@ -34579,7 +35313,7 @@
           <p:nvPr/>
         </p:nvPicPr>
         <p:blipFill>
-          <a:blip r:embed="rId7">
+          <a:blip r:embed="rId7" cstate="print">
             <a:extLst>
               <a:ext uri="{28A0092B-C50C-407E-A947-70E740481C1C}">
                 <a14:useLocalDpi xmlns:a14="http://schemas.microsoft.com/office/drawing/2010/main" val="0"/>
@@ -34620,7 +35354,7 @@
           <p:nvPr/>
         </p:nvPicPr>
         <p:blipFill>
-          <a:blip r:embed="rId7">
+          <a:blip r:embed="rId7" cstate="print">
             <a:extLst>
               <a:ext uri="{28A0092B-C50C-407E-A947-70E740481C1C}">
                 <a14:useLocalDpi xmlns:a14="http://schemas.microsoft.com/office/drawing/2010/main" val="0"/>
@@ -35027,7 +35761,7 @@
           <p:nvPr>
             <p:extLst>
               <p:ext uri="{386F3935-93C4-4BCD-93E2-E3B085C9AB24}">
-                <p16:designElem xmlns:p16="http://schemas.microsoft.com/office/powerpoint/2015/main" val="1"/>
+                <p16:designElem xmlns:p16="http://schemas.microsoft.com/office/powerpoint/2015/main" xmlns="" val="1"/>
               </p:ext>
             </p:extLst>
           </p:nvPr>
@@ -35853,7 +36587,7 @@
             <p:ph idx="1"/>
             <p:extLst>
               <p:ext uri="{D42A27DB-BD31-4B8C-83A1-F6EECF244321}">
-                <p14:modId xmlns:p14="http://schemas.microsoft.com/office/powerpoint/2010/main" val="4188666868"/>
+                <p14:modId xmlns:p14="http://schemas.microsoft.com/office/powerpoint/2010/main" val="2849612794"/>
               </p:ext>
             </p:extLst>
           </p:nvPr>

</xml_diff>